<commit_message>
colour coded project names and added more functions to modules
</commit_message>
<xml_diff>
--- a/ee521/plan_for_ee521_in_julia/ee521_julia_plan.pptx
+++ b/ee521/plan_for_ee521_in_julia/ee521_julia_plan.pptx
@@ -5,7 +5,7 @@
     <p:sldMasterId id="2147483648" r:id="rId1"/>
   </p:sldMasterIdLst>
   <p:sldIdLst>
-    <p:sldId id="261" r:id="rId2"/>
+    <p:sldId id="265" r:id="rId2"/>
     <p:sldId id="259" r:id="rId3"/>
     <p:sldId id="264" r:id="rId4"/>
     <p:sldId id="263" r:id="rId5"/>
@@ -3225,7 +3225,7 @@
           <a:p>
             <a:fld id="{CD0EE7A6-4846-4730-80C3-BA00371415CC}" type="datetimeFigureOut">
               <a:rPr lang="en-IN" smtClean="0"/>
-              <a:t>14-05-2023</a:t>
+              <a:t>15-05-2023</a:t>
             </a:fld>
             <a:endParaRPr lang="en-IN"/>
           </a:p>
@@ -3425,7 +3425,7 @@
           <a:p>
             <a:fld id="{CD0EE7A6-4846-4730-80C3-BA00371415CC}" type="datetimeFigureOut">
               <a:rPr lang="en-IN" smtClean="0"/>
-              <a:t>14-05-2023</a:t>
+              <a:t>15-05-2023</a:t>
             </a:fld>
             <a:endParaRPr lang="en-IN"/>
           </a:p>
@@ -3635,7 +3635,7 @@
           <a:p>
             <a:fld id="{CD0EE7A6-4846-4730-80C3-BA00371415CC}" type="datetimeFigureOut">
               <a:rPr lang="en-IN" smtClean="0"/>
-              <a:t>14-05-2023</a:t>
+              <a:t>15-05-2023</a:t>
             </a:fld>
             <a:endParaRPr lang="en-IN"/>
           </a:p>
@@ -3835,7 +3835,7 @@
           <a:p>
             <a:fld id="{CD0EE7A6-4846-4730-80C3-BA00371415CC}" type="datetimeFigureOut">
               <a:rPr lang="en-IN" smtClean="0"/>
-              <a:t>14-05-2023</a:t>
+              <a:t>15-05-2023</a:t>
             </a:fld>
             <a:endParaRPr lang="en-IN"/>
           </a:p>
@@ -4111,7 +4111,7 @@
           <a:p>
             <a:fld id="{CD0EE7A6-4846-4730-80C3-BA00371415CC}" type="datetimeFigureOut">
               <a:rPr lang="en-IN" smtClean="0"/>
-              <a:t>14-05-2023</a:t>
+              <a:t>15-05-2023</a:t>
             </a:fld>
             <a:endParaRPr lang="en-IN"/>
           </a:p>
@@ -4379,7 +4379,7 @@
           <a:p>
             <a:fld id="{CD0EE7A6-4846-4730-80C3-BA00371415CC}" type="datetimeFigureOut">
               <a:rPr lang="en-IN" smtClean="0"/>
-              <a:t>14-05-2023</a:t>
+              <a:t>15-05-2023</a:t>
             </a:fld>
             <a:endParaRPr lang="en-IN"/>
           </a:p>
@@ -4794,7 +4794,7 @@
           <a:p>
             <a:fld id="{CD0EE7A6-4846-4730-80C3-BA00371415CC}" type="datetimeFigureOut">
               <a:rPr lang="en-IN" smtClean="0"/>
-              <a:t>14-05-2023</a:t>
+              <a:t>15-05-2023</a:t>
             </a:fld>
             <a:endParaRPr lang="en-IN"/>
           </a:p>
@@ -4936,7 +4936,7 @@
           <a:p>
             <a:fld id="{CD0EE7A6-4846-4730-80C3-BA00371415CC}" type="datetimeFigureOut">
               <a:rPr lang="en-IN" smtClean="0"/>
-              <a:t>14-05-2023</a:t>
+              <a:t>15-05-2023</a:t>
             </a:fld>
             <a:endParaRPr lang="en-IN"/>
           </a:p>
@@ -5049,7 +5049,7 @@
           <a:p>
             <a:fld id="{CD0EE7A6-4846-4730-80C3-BA00371415CC}" type="datetimeFigureOut">
               <a:rPr lang="en-IN" smtClean="0"/>
-              <a:t>14-05-2023</a:t>
+              <a:t>15-05-2023</a:t>
             </a:fld>
             <a:endParaRPr lang="en-IN"/>
           </a:p>
@@ -5362,7 +5362,7 @@
           <a:p>
             <a:fld id="{CD0EE7A6-4846-4730-80C3-BA00371415CC}" type="datetimeFigureOut">
               <a:rPr lang="en-IN" smtClean="0"/>
-              <a:t>14-05-2023</a:t>
+              <a:t>15-05-2023</a:t>
             </a:fld>
             <a:endParaRPr lang="en-IN"/>
           </a:p>
@@ -5651,7 +5651,7 @@
           <a:p>
             <a:fld id="{CD0EE7A6-4846-4730-80C3-BA00371415CC}" type="datetimeFigureOut">
               <a:rPr lang="en-IN" smtClean="0"/>
-              <a:t>14-05-2023</a:t>
+              <a:t>15-05-2023</a:t>
             </a:fld>
             <a:endParaRPr lang="en-IN"/>
           </a:p>
@@ -5894,7 +5894,7 @@
           <a:p>
             <a:fld id="{CD0EE7A6-4846-4730-80C3-BA00371415CC}" type="datetimeFigureOut">
               <a:rPr lang="en-IN" smtClean="0"/>
-              <a:t>14-05-2023</a:t>
+              <a:t>15-05-2023</a:t>
             </a:fld>
             <a:endParaRPr lang="en-IN"/>
           </a:p>
@@ -6334,7 +6334,7 @@
           <a:p>
             <a:r>
               <a:rPr lang="en-IN" dirty="0"/>
-              <a:t>Starting Workflow</a:t>
+              <a:t>Starting Workflow – Project Interdependencies</a:t>
             </a:r>
           </a:p>
         </p:txBody>
@@ -6362,58 +6362,259 @@
           <a:p>
             <a:r>
               <a:rPr lang="en-IN" dirty="0"/>
-              <a:t>Having a working P1: </a:t>
-            </a:r>
-            <a:r>
-              <a:rPr lang="en-IN" dirty="0" err="1"/>
+              <a:t>Having a working </a:t>
+            </a:r>
+            <a:r>
+              <a:rPr lang="en-IN" b="1" dirty="0">
+                <a:solidFill>
+                  <a:srgbClr val="002060"/>
+                </a:solidFill>
+              </a:rPr>
+              <a:t>P1: </a:t>
+            </a:r>
+            <a:r>
+              <a:rPr lang="en-IN" b="1" dirty="0" err="1">
+                <a:solidFill>
+                  <a:srgbClr val="002060"/>
+                </a:solidFill>
+              </a:rPr>
               <a:t>PowerFlow</a:t>
             </a:r>
             <a:r>
+              <a:rPr lang="en-IN" b="1" dirty="0">
+                <a:solidFill>
+                  <a:srgbClr val="002060"/>
+                </a:solidFill>
+              </a:rPr>
+              <a:t> </a:t>
+            </a:r>
+            <a:r>
               <a:rPr lang="en-IN" dirty="0"/>
-              <a:t> code (NRPF only for all other tasks) is mostly a prerequisite for most other tasks (P3: ContinuationPowerFlow, P4: </a:t>
-            </a:r>
-            <a:r>
-              <a:rPr lang="en-IN" dirty="0" err="1"/>
+              <a:t>code is a prerequisite for a couple of other tasks: (</a:t>
+            </a:r>
+            <a:r>
+              <a:rPr lang="en-IN" b="1" dirty="0">
+                <a:solidFill>
+                  <a:schemeClr val="accent6">
+                    <a:lumMod val="75000"/>
+                  </a:schemeClr>
+                </a:solidFill>
+              </a:rPr>
+              <a:t>P4: </a:t>
+            </a:r>
+            <a:r>
+              <a:rPr lang="en-IN" b="1" dirty="0" err="1">
+                <a:solidFill>
+                  <a:schemeClr val="accent6">
+                    <a:lumMod val="75000"/>
+                  </a:schemeClr>
+                </a:solidFill>
+              </a:rPr>
               <a:t>StateEstimation</a:t>
             </a:r>
             <a:r>
-              <a:rPr lang="en-IN" dirty="0"/>
+              <a:rPr lang="en-IN" b="1" dirty="0">
+                <a:solidFill>
+                  <a:schemeClr val="accent2">
+                    <a:lumMod val="75000"/>
+                  </a:schemeClr>
+                </a:solidFill>
+              </a:rPr>
               <a:t>, P5: </a:t>
             </a:r>
             <a:r>
-              <a:rPr lang="en-IN" dirty="0" err="1"/>
+              <a:rPr lang="en-IN" b="1" dirty="0" err="1">
+                <a:solidFill>
+                  <a:schemeClr val="accent2">
+                    <a:lumMod val="75000"/>
+                  </a:schemeClr>
+                </a:solidFill>
+              </a:rPr>
               <a:t>OptimalPowerFlow</a:t>
             </a:r>
             <a:r>
               <a:rPr lang="en-IN" dirty="0"/>
               <a:t>). </a:t>
             </a:r>
-          </a:p>
-          <a:p>
+            <a:r>
+              <a:rPr lang="en-IN" sz="1400" dirty="0"/>
+              <a:t>NRPF only though.</a:t>
+            </a:r>
+            <a:endParaRPr lang="en-IN" dirty="0"/>
+          </a:p>
+          <a:p>
+            <a:r>
+              <a:rPr lang="en-IN" b="1" dirty="0">
+                <a:solidFill>
+                  <a:srgbClr val="C00000"/>
+                </a:solidFill>
+              </a:rPr>
+              <a:t>P3: ContinuationPowerFlow </a:t>
+            </a:r>
             <a:r>
               <a:rPr lang="en-IN" dirty="0"/>
-              <a:t>Only P2: </a:t>
-            </a:r>
-            <a:r>
-              <a:rPr lang="en-IN" dirty="0" err="1"/>
+              <a:t>does NOT require the full implementation of </a:t>
+            </a:r>
+            <a:r>
+              <a:rPr lang="en-IN" b="1" dirty="0">
+                <a:solidFill>
+                  <a:srgbClr val="002060"/>
+                </a:solidFill>
+              </a:rPr>
+              <a:t>P1</a:t>
+            </a:r>
+            <a:r>
+              <a:rPr lang="en-IN" dirty="0"/>
+              <a:t>, and can be done in parallel. </a:t>
+            </a:r>
+            <a:r>
+              <a:rPr lang="en-IN" sz="1600" dirty="0"/>
+              <a:t>Some functions from </a:t>
+            </a:r>
+            <a:r>
+              <a:rPr lang="en-IN" sz="1600" dirty="0">
+                <a:solidFill>
+                  <a:srgbClr val="002060"/>
+                </a:solidFill>
+              </a:rPr>
+              <a:t>P1</a:t>
+            </a:r>
+            <a:r>
+              <a:rPr lang="en-IN" sz="1600" dirty="0"/>
+              <a:t> are required though.</a:t>
+            </a:r>
+            <a:endParaRPr lang="en-IN" dirty="0"/>
+          </a:p>
+          <a:p>
+            <a:r>
+              <a:rPr lang="en-IN" dirty="0"/>
+              <a:t>Only </a:t>
+            </a:r>
+            <a:r>
+              <a:rPr lang="en-IN" b="1" dirty="0">
+                <a:solidFill>
+                  <a:schemeClr val="bg2">
+                    <a:lumMod val="50000"/>
+                  </a:schemeClr>
+                </a:solidFill>
+              </a:rPr>
+              <a:t>P2: </a:t>
+            </a:r>
+            <a:r>
+              <a:rPr lang="en-IN" b="1" dirty="0" err="1">
+                <a:solidFill>
+                  <a:schemeClr val="bg2">
+                    <a:lumMod val="50000"/>
+                  </a:schemeClr>
+                </a:solidFill>
+              </a:rPr>
               <a:t>SparsePowerFlow</a:t>
             </a:r>
             <a:r>
+              <a:rPr lang="en-IN" b="1" dirty="0">
+                <a:solidFill>
+                  <a:schemeClr val="bg2">
+                    <a:lumMod val="50000"/>
+                  </a:schemeClr>
+                </a:solidFill>
+              </a:rPr>
+              <a:t> </a:t>
+            </a:r>
+            <a:r>
               <a:rPr lang="en-IN" dirty="0"/>
-              <a:t> is an independent task. </a:t>
+              <a:t>is a completely independent task, and can be done in parallel. </a:t>
             </a:r>
             <a:r>
               <a:rPr lang="en-IN" sz="2000" dirty="0"/>
               <a:t>In fact it is not permissible to use any assets from the other projects.</a:t>
             </a:r>
-            <a:endParaRPr lang="en-IN" dirty="0"/>
+          </a:p>
+          <a:p>
+            <a:r>
+              <a:rPr lang="en-IN" dirty="0"/>
+              <a:t>Once </a:t>
+            </a:r>
+            <a:r>
+              <a:rPr lang="en-IN" b="1" dirty="0">
+                <a:solidFill>
+                  <a:srgbClr val="002060"/>
+                </a:solidFill>
+              </a:rPr>
+              <a:t>P1</a:t>
+            </a:r>
+            <a:r>
+              <a:rPr lang="en-IN" dirty="0"/>
+              <a:t> is completed ALL other projects can be completed in parallel, </a:t>
+            </a:r>
+            <a:r>
+              <a:rPr lang="en-IN" dirty="0" err="1"/>
+              <a:t>i.e</a:t>
+            </a:r>
+            <a:r>
+              <a:rPr lang="en-IN" dirty="0"/>
+              <a:t> </a:t>
+            </a:r>
+            <a:r>
+              <a:rPr lang="en-IN" b="1" dirty="0">
+                <a:solidFill>
+                  <a:schemeClr val="bg2">
+                    <a:lumMod val="50000"/>
+                  </a:schemeClr>
+                </a:solidFill>
+              </a:rPr>
+              <a:t>P2</a:t>
+            </a:r>
+            <a:r>
+              <a:rPr lang="en-IN" dirty="0"/>
+              <a:t>, </a:t>
+            </a:r>
+            <a:r>
+              <a:rPr lang="en-IN" b="1" dirty="0">
+                <a:solidFill>
+                  <a:srgbClr val="C00000"/>
+                </a:solidFill>
+              </a:rPr>
+              <a:t>P3</a:t>
+            </a:r>
+            <a:r>
+              <a:rPr lang="en-IN" dirty="0"/>
+              <a:t>, </a:t>
+            </a:r>
+            <a:r>
+              <a:rPr lang="en-IN" b="1" dirty="0">
+                <a:solidFill>
+                  <a:schemeClr val="accent6">
+                    <a:lumMod val="75000"/>
+                  </a:schemeClr>
+                </a:solidFill>
+              </a:rPr>
+              <a:t>P4</a:t>
+            </a:r>
+            <a:r>
+              <a:rPr lang="en-IN" dirty="0"/>
+              <a:t> and </a:t>
+            </a:r>
+            <a:r>
+              <a:rPr lang="en-IN" b="1" dirty="0">
+                <a:solidFill>
+                  <a:schemeClr val="accent2">
+                    <a:lumMod val="75000"/>
+                  </a:schemeClr>
+                </a:solidFill>
+              </a:rPr>
+              <a:t>P5</a:t>
+            </a:r>
+            <a:r>
+              <a:rPr lang="en-IN" dirty="0"/>
+              <a:t> do NOT have any interdependencies.</a:t>
+            </a:r>
           </a:p>
         </p:txBody>
       </p:sp>
     </p:spTree>
     <p:extLst>
       <p:ext uri="{BB962C8B-B14F-4D97-AF65-F5344CB8AC3E}">
-        <p14:creationId xmlns:p14="http://schemas.microsoft.com/office/powerpoint/2010/main" val="2417330378"/>
+        <p14:creationId xmlns:p14="http://schemas.microsoft.com/office/powerpoint/2010/main" val="3614275470"/>
       </p:ext>
     </p:extLst>
   </p:cSld>
@@ -6486,7 +6687,9 @@
         </p:nvSpPr>
         <p:spPr/>
         <p:txBody>
-          <a:bodyPr/>
+          <a:bodyPr>
+            <a:normAutofit fontScale="77500" lnSpcReduction="20000"/>
+          </a:bodyPr>
           <a:lstStyle/>
           <a:p>
             <a:r>
@@ -6503,7 +6706,7 @@
             </a:r>
             <a:r>
               <a:rPr lang="en-IN" sz="1800" dirty="0"/>
-              <a:t>This file should only contain meta information, like whether to </a:t>
+              <a:t>This file should only contain meta information, like user defined variables. E.g. whether to </a:t>
             </a:r>
             <a:r>
               <a:rPr lang="en-IN" sz="1800" dirty="0" err="1"/>
@@ -6519,7 +6722,7 @@
             </a:r>
             <a:r>
               <a:rPr lang="en-IN" sz="1800" dirty="0"/>
-              <a:t>, Jacobians, </a:t>
+              <a:t>, save Jacobians, </a:t>
             </a:r>
             <a:r>
               <a:rPr lang="en-IN" sz="1800" dirty="0" err="1"/>
@@ -6527,7 +6730,7 @@
             </a:r>
             <a:r>
               <a:rPr lang="en-IN" sz="1800" dirty="0"/>
-              <a:t> curves, chosen CPF bus, showing some symbolic formulae, saving results, etc.</a:t>
+              <a:t> curves, which is the chosen CPF bus, showing some symbolic formulae, saving tables, etc.</a:t>
             </a:r>
           </a:p>
           <a:p>
@@ -6571,7 +6774,11 @@
               <a:t>Write functions in modules. Modules can be </a:t>
             </a:r>
             <a:r>
-              <a:rPr lang="en-IN" b="1" dirty="0" err="1"/>
+              <a:rPr lang="en-IN" b="1" dirty="0" err="1">
+                <a:solidFill>
+                  <a:srgbClr val="002060"/>
+                </a:solidFill>
+              </a:rPr>
               <a:t>NKGPowerFlow</a:t>
             </a:r>
             <a:r>
@@ -6579,7 +6786,13 @@
               <a:t>, </a:t>
             </a:r>
             <a:r>
-              <a:rPr lang="en-IN" b="1" dirty="0" err="1"/>
+              <a:rPr lang="en-IN" b="1" dirty="0" err="1">
+                <a:solidFill>
+                  <a:schemeClr val="bg2">
+                    <a:lumMod val="50000"/>
+                  </a:schemeClr>
+                </a:solidFill>
+              </a:rPr>
               <a:t>NKGSparsePowerFlow</a:t>
             </a:r>
             <a:r>
@@ -6587,7 +6800,11 @@
               <a:t>, </a:t>
             </a:r>
             <a:r>
-              <a:rPr lang="en-IN" b="1" dirty="0" err="1"/>
+              <a:rPr lang="en-IN" b="1" dirty="0" err="1">
+                <a:solidFill>
+                  <a:srgbClr val="C00000"/>
+                </a:solidFill>
+              </a:rPr>
               <a:t>NKGContinuationPowerFlow</a:t>
             </a:r>
             <a:r>
@@ -6595,7 +6812,13 @@
               <a:t>, </a:t>
             </a:r>
             <a:r>
-              <a:rPr lang="en-IN" b="1" dirty="0" err="1"/>
+              <a:rPr lang="en-IN" b="1" dirty="0" err="1">
+                <a:solidFill>
+                  <a:schemeClr val="accent6">
+                    <a:lumMod val="75000"/>
+                  </a:schemeClr>
+                </a:solidFill>
+              </a:rPr>
               <a:t>NKGStateEstimation</a:t>
             </a:r>
             <a:r>
@@ -6603,7 +6826,13 @@
               <a:t> and </a:t>
             </a:r>
             <a:r>
-              <a:rPr lang="en-IN" b="1" dirty="0" err="1"/>
+              <a:rPr lang="en-IN" b="1" dirty="0" err="1">
+                <a:solidFill>
+                  <a:schemeClr val="accent2">
+                    <a:lumMod val="75000"/>
+                  </a:schemeClr>
+                </a:solidFill>
+              </a:rPr>
               <a:t>NKGOptimization</a:t>
             </a:r>
             <a:r>
@@ -6612,9 +6841,57 @@
             </a:r>
             <a:r>
               <a:rPr lang="en-IN" sz="1400" dirty="0"/>
-              <a:t>Unlike MATLAB where it is standard to write a single function in a single .m/.mlx file.</a:t>
-            </a:r>
-            <a:endParaRPr lang="en-IN" dirty="0"/>
+              <a:t>Unlike MATLAB where it is standard to write a single function in a single .m/.mlx file and just </a:t>
+            </a:r>
+            <a:r>
+              <a:rPr lang="en-IN" sz="1400" dirty="0" err="1"/>
+              <a:t>addpath</a:t>
+            </a:r>
+            <a:r>
+              <a:rPr lang="en-IN" sz="1400" dirty="0"/>
+              <a:t> the address of all the functions.</a:t>
+            </a:r>
+          </a:p>
+          <a:p>
+            <a:r>
+              <a:rPr lang="en-IN" dirty="0"/>
+              <a:t>Many (smaller) functions instead of grand scripts.</a:t>
+            </a:r>
+          </a:p>
+          <a:p>
+            <a:r>
+              <a:rPr lang="en-IN" dirty="0"/>
+              <a:t>If you have to scroll too much to check a bug in your script, your script could probably use some refactoring.</a:t>
+            </a:r>
+          </a:p>
+          <a:p>
+            <a:r>
+              <a:rPr lang="en-IN" dirty="0"/>
+              <a:t>Try to commit and push your code whenever you feel that your code is:</a:t>
+            </a:r>
+          </a:p>
+          <a:p>
+            <a:pPr lvl="1"/>
+            <a:r>
+              <a:rPr lang="en-IN" dirty="0"/>
+              <a:t>1) Even slightly, but tangibly different in its current state compared to its previous state* </a:t>
+            </a:r>
+          </a:p>
+          <a:p>
+            <a:pPr lvl="1"/>
+            <a:r>
+              <a:rPr lang="en-IN" dirty="0"/>
+              <a:t>2) It runs correctly and hasn’t altered any previous correct results*.</a:t>
+            </a:r>
+          </a:p>
+          <a:p>
+            <a:pPr marL="457200" lvl="1" indent="0">
+              <a:buNone/>
+            </a:pPr>
+            <a:r>
+              <a:rPr lang="en-IN" sz="1600" dirty="0"/>
+              <a:t>* It’s not possible to follow these rules every time, but do minimize such exceptions.</a:t>
+            </a:r>
           </a:p>
         </p:txBody>
       </p:sp>
@@ -6695,7 +6972,7 @@
         <p:spPr/>
         <p:txBody>
           <a:bodyPr>
-            <a:normAutofit lnSpcReduction="10000"/>
+            <a:normAutofit fontScale="85000" lnSpcReduction="20000"/>
           </a:bodyPr>
           <a:lstStyle/>
           <a:p>
@@ -6819,7 +7096,7 @@
             </a:r>
             <a:r>
               <a:rPr lang="en-IN" dirty="0"/>
-              <a:t>: NRPF/FDPF a simple function which calculates mismatches (for every Powerflow iteration) by first computing power injections.</a:t>
+              <a:t>: NRPF/FDPF a simple function which calculates mismatches (for every Powerflow iteration) by first computing power injections. Helpful in creation of diagonal Jacobian elements too.</a:t>
             </a:r>
           </a:p>
           <a:p>
@@ -6906,7 +7183,45 @@
               <a:rPr lang="en-IN" dirty="0" err="1"/>
               <a:t>solveUsingBackwardSubstituion</a:t>
             </a:r>
-            <a:endParaRPr lang="en-IN" dirty="0"/>
+            <a:endParaRPr lang="en-IN" i="1" dirty="0"/>
+          </a:p>
+          <a:p>
+            <a:pPr lvl="1"/>
+            <a:r>
+              <a:rPr lang="en-IN" i="1" dirty="0" err="1"/>
+              <a:t>displayPowerFlowResults</a:t>
+            </a:r>
+            <a:r>
+              <a:rPr lang="en-IN" i="1" dirty="0"/>
+              <a:t>: </a:t>
+            </a:r>
+            <a:r>
+              <a:rPr lang="en-IN" dirty="0"/>
+              <a:t>A neat table containing [V, delta, P, Q] with easy to see rows called as ‘Bus 01’, ‘Bus 02’ …</a:t>
+            </a:r>
+          </a:p>
+          <a:p>
+            <a:pPr lvl="1"/>
+            <a:r>
+              <a:rPr lang="en-IN" i="1" dirty="0" err="1"/>
+              <a:t>plotPowerFlowResults</a:t>
+            </a:r>
+            <a:r>
+              <a:rPr lang="en-IN" i="1" dirty="0"/>
+              <a:t>: </a:t>
+            </a:r>
+            <a:r>
+              <a:rPr lang="en-IN" dirty="0"/>
+              <a:t>Compare your own results to the results in the CDF file ,via two plots: Relative percentage difference in </a:t>
+            </a:r>
+            <a:r>
+              <a:rPr lang="en-IN" dirty="0" err="1"/>
+              <a:t>pu</a:t>
+            </a:r>
+            <a:r>
+              <a:rPr lang="en-IN" dirty="0"/>
+              <a:t> Voltages and absolute difference in delta values.</a:t>
+            </a:r>
           </a:p>
         </p:txBody>
       </p:sp>
@@ -6987,7 +7302,7 @@
         <p:spPr/>
         <p:txBody>
           <a:bodyPr>
-            <a:normAutofit fontScale="92500" lnSpcReduction="10000"/>
+            <a:normAutofit/>
           </a:bodyPr>
           <a:lstStyle/>
           <a:p>
@@ -7001,7 +7316,7 @@
             <a:pPr lvl="1"/>
             <a:r>
               <a:rPr lang="en-IN" dirty="0"/>
-              <a:t>Dependency: </a:t>
+              <a:t>Dependencies: </a:t>
             </a:r>
             <a:r>
               <a:rPr lang="en-IN" b="1" dirty="0" err="1"/>
@@ -7009,7 +7324,7 @@
             </a:r>
             <a:r>
               <a:rPr lang="en-IN" dirty="0"/>
-              <a:t>, for functions: </a:t>
+              <a:t>: </a:t>
             </a:r>
             <a:r>
               <a:rPr lang="en-IN" i="1" dirty="0" err="1"/>
@@ -7027,200 +7342,14 @@
               <a:rPr lang="en-IN" i="1" dirty="0"/>
               <a:t>,  </a:t>
             </a:r>
-          </a:p>
-          <a:p>
-            <a:pPr lvl="1"/>
-            <a:r>
-              <a:rPr lang="en-IN" i="1" dirty="0" err="1"/>
-              <a:t>solveUsingPowerFlow</a:t>
-            </a:r>
-            <a:r>
-              <a:rPr lang="en-IN" dirty="0"/>
-              <a:t>: NRPF/FDPF  We can make it work for both </a:t>
-            </a:r>
-            <a:r>
-              <a:rPr lang="en-IN" dirty="0" err="1"/>
-              <a:t>powerFlowMethods</a:t>
-            </a:r>
-            <a:r>
-              <a:rPr lang="en-IN" dirty="0"/>
-              <a:t>: “NRPF” or “FDPF”.</a:t>
-            </a:r>
-          </a:p>
-          <a:p>
-            <a:pPr lvl="2"/>
-            <a:r>
-              <a:rPr lang="en-IN" i="1" dirty="0" err="1"/>
-              <a:t>initializeVectors</a:t>
-            </a:r>
-            <a:r>
-              <a:rPr lang="en-IN" i="1" dirty="0"/>
-              <a:t>: </a:t>
-            </a:r>
-            <a:r>
-              <a:rPr lang="en-IN" dirty="0"/>
-              <a:t>Handy function which reads [</a:t>
-            </a:r>
-            <a:r>
-              <a:rPr lang="en-IN" dirty="0" err="1"/>
-              <a:t>busData</a:t>
-            </a:r>
-            <a:r>
-              <a:rPr lang="en-IN" dirty="0"/>
-              <a:t>, </a:t>
-            </a:r>
-            <a:r>
-              <a:rPr lang="en-IN" dirty="0" err="1"/>
-              <a:t>branchData</a:t>
-            </a:r>
-            <a:r>
-              <a:rPr lang="en-IN" dirty="0"/>
-              <a:t>] and can retrieve highly used parameter values like </a:t>
-            </a:r>
-            <a:r>
-              <a:rPr lang="en-IN" dirty="0" err="1"/>
-              <a:t>listOfPVBuses</a:t>
-            </a:r>
-            <a:r>
-              <a:rPr lang="en-IN" dirty="0"/>
-              <a:t>, </a:t>
-            </a:r>
-            <a:r>
-              <a:rPr lang="en-IN" dirty="0" err="1"/>
-              <a:t>nPQ</a:t>
-            </a:r>
-            <a:r>
-              <a:rPr lang="en-IN" dirty="0"/>
-              <a:t>, </a:t>
-            </a:r>
-            <a:r>
-              <a:rPr lang="en-IN" dirty="0" err="1"/>
-              <a:t>PSpecified</a:t>
-            </a:r>
-            <a:r>
-              <a:rPr lang="en-IN" dirty="0"/>
-              <a:t>, etc.</a:t>
-            </a:r>
-          </a:p>
-          <a:p>
-            <a:pPr lvl="2"/>
-            <a:r>
-              <a:rPr lang="en-IN" i="1" dirty="0" err="1"/>
-              <a:t>computeBusInjections</a:t>
-            </a:r>
-            <a:r>
-              <a:rPr lang="en-IN" i="1" dirty="0"/>
-              <a:t>: calculate </a:t>
-            </a:r>
-            <a:r>
-              <a:rPr lang="en-IN" i="1" dirty="0" err="1"/>
-              <a:t>P_i</a:t>
-            </a:r>
-            <a:r>
-              <a:rPr lang="en-IN" i="1" dirty="0"/>
-              <a:t> and </a:t>
-            </a:r>
-            <a:r>
-              <a:rPr lang="en-IN" i="1" dirty="0" err="1"/>
-              <a:t>Q_i</a:t>
-            </a:r>
-            <a:endParaRPr lang="en-IN" i="1" dirty="0"/>
-          </a:p>
-          <a:p>
-            <a:pPr lvl="2"/>
-            <a:r>
-              <a:rPr lang="en-IN" i="1" dirty="0" err="1"/>
-              <a:t>computeMismatches</a:t>
-            </a:r>
-            <a:r>
-              <a:rPr lang="en-IN" dirty="0"/>
-              <a:t>: NRPF/FDPF a simple function which calculates mismatches (for every Powerflow iteration) by first computing power injections.</a:t>
-            </a:r>
-          </a:p>
-          <a:p>
-            <a:pPr lvl="2"/>
-            <a:r>
-              <a:rPr lang="en-IN" i="1" dirty="0" err="1"/>
-              <a:t>constructJacobian</a:t>
-            </a:r>
-            <a:r>
-              <a:rPr lang="en-IN" dirty="0"/>
-              <a:t>: NRPF/FDPF Compute J11, J22 (and J12, J21 and J in case of NRPF)</a:t>
-            </a:r>
-          </a:p>
-          <a:p>
-            <a:pPr lvl="2"/>
             <a:r>
               <a:rPr lang="en-IN" i="1" dirty="0" err="1"/>
               <a:t>solveUsingLU</a:t>
             </a:r>
-            <a:r>
-              <a:rPr lang="en-IN" dirty="0"/>
-              <a:t>: Using given Jacobian (J11/J) and mismatch vector (</a:t>
-            </a:r>
-            <a:r>
-              <a:rPr lang="en-IN" dirty="0" err="1"/>
-              <a:t>delP</a:t>
-            </a:r>
-            <a:r>
-              <a:rPr lang="en-IN" dirty="0"/>
-              <a:t>/[</a:t>
-            </a:r>
-            <a:r>
-              <a:rPr lang="en-IN" dirty="0" err="1"/>
-              <a:t>delP</a:t>
-            </a:r>
-            <a:r>
-              <a:rPr lang="en-IN" dirty="0"/>
-              <a:t>; </a:t>
-            </a:r>
-            <a:r>
-              <a:rPr lang="en-IN" dirty="0" err="1"/>
-              <a:t>delQ</a:t>
-            </a:r>
-            <a:r>
-              <a:rPr lang="en-IN" dirty="0"/>
-              <a:t>]), compute correction vector (</a:t>
-            </a:r>
-            <a:r>
-              <a:rPr lang="en-IN" dirty="0" err="1"/>
-              <a:t>delDelta</a:t>
-            </a:r>
-            <a:r>
-              <a:rPr lang="en-IN" dirty="0"/>
-              <a:t>/[</a:t>
-            </a:r>
-            <a:r>
-              <a:rPr lang="en-IN" dirty="0" err="1"/>
-              <a:t>delDeltas</a:t>
-            </a:r>
-            <a:r>
-              <a:rPr lang="en-IN" dirty="0"/>
-              <a:t>; </a:t>
-            </a:r>
-            <a:r>
-              <a:rPr lang="en-IN" dirty="0" err="1"/>
-              <a:t>delV</a:t>
-            </a:r>
-            <a:r>
-              <a:rPr lang="en-IN" dirty="0"/>
-              <a:t>]).</a:t>
-            </a:r>
-          </a:p>
-          <a:p>
-            <a:pPr lvl="3"/>
-            <a:r>
-              <a:rPr lang="en-IN" dirty="0" err="1"/>
-              <a:t>solveUsingForwardSubstitution</a:t>
-            </a:r>
-            <a:endParaRPr lang="en-IN" dirty="0"/>
-          </a:p>
-          <a:p>
-            <a:pPr lvl="3"/>
-            <a:r>
-              <a:rPr lang="en-IN" dirty="0" err="1"/>
-              <a:t>solveUsingBackwardSubstituion</a:t>
-            </a:r>
+            <a:endParaRPr lang="en-IN" i="1" dirty="0"/>
+          </a:p>
+          <a:p>
+            <a:pPr lvl="1"/>
             <a:endParaRPr lang="en-IN" dirty="0"/>
           </a:p>
         </p:txBody>

</xml_diff>

<commit_message>
meeting notes added for tonight.
</commit_message>
<xml_diff>
--- a/ee521/plan_for_ee521_in_julia/ee521_julia_plan.pptx
+++ b/ee521/plan_for_ee521_in_julia/ee521_julia_plan.pptx
@@ -6,20 +6,21 @@
   </p:sldMasterIdLst>
   <p:sldIdLst>
     <p:sldId id="274" r:id="rId2"/>
-    <p:sldId id="265" r:id="rId3"/>
-    <p:sldId id="259" r:id="rId4"/>
-    <p:sldId id="266" r:id="rId5"/>
-    <p:sldId id="270" r:id="rId6"/>
-    <p:sldId id="267" r:id="rId7"/>
-    <p:sldId id="264" r:id="rId8"/>
-    <p:sldId id="271" r:id="rId9"/>
-    <p:sldId id="268" r:id="rId10"/>
-    <p:sldId id="263" r:id="rId11"/>
-    <p:sldId id="269" r:id="rId12"/>
-    <p:sldId id="262" r:id="rId13"/>
-    <p:sldId id="272" r:id="rId14"/>
-    <p:sldId id="258" r:id="rId15"/>
-    <p:sldId id="273" r:id="rId16"/>
+    <p:sldId id="275" r:id="rId3"/>
+    <p:sldId id="265" r:id="rId4"/>
+    <p:sldId id="259" r:id="rId5"/>
+    <p:sldId id="266" r:id="rId6"/>
+    <p:sldId id="270" r:id="rId7"/>
+    <p:sldId id="267" r:id="rId8"/>
+    <p:sldId id="264" r:id="rId9"/>
+    <p:sldId id="271" r:id="rId10"/>
+    <p:sldId id="268" r:id="rId11"/>
+    <p:sldId id="263" r:id="rId12"/>
+    <p:sldId id="269" r:id="rId13"/>
+    <p:sldId id="262" r:id="rId14"/>
+    <p:sldId id="272" r:id="rId15"/>
+    <p:sldId id="258" r:id="rId16"/>
+    <p:sldId id="273" r:id="rId17"/>
   </p:sldIdLst>
   <p:sldSz cx="12192000" cy="6858000"/>
   <p:notesSz cx="6858000" cy="9144000"/>
@@ -3318,7 +3319,7 @@
           <a:p>
             <a:fld id="{CD0EE7A6-4846-4730-80C3-BA00371415CC}" type="datetimeFigureOut">
               <a:rPr lang="en-IN" smtClean="0"/>
-              <a:t>15-05-2023</a:t>
+              <a:t>22-05-2023</a:t>
             </a:fld>
             <a:endParaRPr lang="en-IN"/>
           </a:p>
@@ -3518,7 +3519,7 @@
           <a:p>
             <a:fld id="{CD0EE7A6-4846-4730-80C3-BA00371415CC}" type="datetimeFigureOut">
               <a:rPr lang="en-IN" smtClean="0"/>
-              <a:t>15-05-2023</a:t>
+              <a:t>22-05-2023</a:t>
             </a:fld>
             <a:endParaRPr lang="en-IN"/>
           </a:p>
@@ -3728,7 +3729,7 @@
           <a:p>
             <a:fld id="{CD0EE7A6-4846-4730-80C3-BA00371415CC}" type="datetimeFigureOut">
               <a:rPr lang="en-IN" smtClean="0"/>
-              <a:t>15-05-2023</a:t>
+              <a:t>22-05-2023</a:t>
             </a:fld>
             <a:endParaRPr lang="en-IN"/>
           </a:p>
@@ -3928,7 +3929,7 @@
           <a:p>
             <a:fld id="{CD0EE7A6-4846-4730-80C3-BA00371415CC}" type="datetimeFigureOut">
               <a:rPr lang="en-IN" smtClean="0"/>
-              <a:t>15-05-2023</a:t>
+              <a:t>22-05-2023</a:t>
             </a:fld>
             <a:endParaRPr lang="en-IN"/>
           </a:p>
@@ -4204,7 +4205,7 @@
           <a:p>
             <a:fld id="{CD0EE7A6-4846-4730-80C3-BA00371415CC}" type="datetimeFigureOut">
               <a:rPr lang="en-IN" smtClean="0"/>
-              <a:t>15-05-2023</a:t>
+              <a:t>22-05-2023</a:t>
             </a:fld>
             <a:endParaRPr lang="en-IN"/>
           </a:p>
@@ -4472,7 +4473,7 @@
           <a:p>
             <a:fld id="{CD0EE7A6-4846-4730-80C3-BA00371415CC}" type="datetimeFigureOut">
               <a:rPr lang="en-IN" smtClean="0"/>
-              <a:t>15-05-2023</a:t>
+              <a:t>22-05-2023</a:t>
             </a:fld>
             <a:endParaRPr lang="en-IN"/>
           </a:p>
@@ -4887,7 +4888,7 @@
           <a:p>
             <a:fld id="{CD0EE7A6-4846-4730-80C3-BA00371415CC}" type="datetimeFigureOut">
               <a:rPr lang="en-IN" smtClean="0"/>
-              <a:t>15-05-2023</a:t>
+              <a:t>22-05-2023</a:t>
             </a:fld>
             <a:endParaRPr lang="en-IN"/>
           </a:p>
@@ -5029,7 +5030,7 @@
           <a:p>
             <a:fld id="{CD0EE7A6-4846-4730-80C3-BA00371415CC}" type="datetimeFigureOut">
               <a:rPr lang="en-IN" smtClean="0"/>
-              <a:t>15-05-2023</a:t>
+              <a:t>22-05-2023</a:t>
             </a:fld>
             <a:endParaRPr lang="en-IN"/>
           </a:p>
@@ -5142,7 +5143,7 @@
           <a:p>
             <a:fld id="{CD0EE7A6-4846-4730-80C3-BA00371415CC}" type="datetimeFigureOut">
               <a:rPr lang="en-IN" smtClean="0"/>
-              <a:t>15-05-2023</a:t>
+              <a:t>22-05-2023</a:t>
             </a:fld>
             <a:endParaRPr lang="en-IN"/>
           </a:p>
@@ -5455,7 +5456,7 @@
           <a:p>
             <a:fld id="{CD0EE7A6-4846-4730-80C3-BA00371415CC}" type="datetimeFigureOut">
               <a:rPr lang="en-IN" smtClean="0"/>
-              <a:t>15-05-2023</a:t>
+              <a:t>22-05-2023</a:t>
             </a:fld>
             <a:endParaRPr lang="en-IN"/>
           </a:p>
@@ -5744,7 +5745,7 @@
           <a:p>
             <a:fld id="{CD0EE7A6-4846-4730-80C3-BA00371415CC}" type="datetimeFigureOut">
               <a:rPr lang="en-IN" smtClean="0"/>
-              <a:t>15-05-2023</a:t>
+              <a:t>22-05-2023</a:t>
             </a:fld>
             <a:endParaRPr lang="en-IN"/>
           </a:p>
@@ -5987,7 +5988,7 @@
           <a:p>
             <a:fld id="{CD0EE7A6-4846-4730-80C3-BA00371415CC}" type="datetimeFigureOut">
               <a:rPr lang="en-IN" smtClean="0"/>
-              <a:t>15-05-2023</a:t>
+              <a:t>22-05-2023</a:t>
             </a:fld>
             <a:endParaRPr lang="en-IN"/>
           </a:p>
@@ -7747,126 +7748,346 @@
         <p:spPr/>
         <p:txBody>
           <a:bodyPr>
-            <a:normAutofit/>
+            <a:normAutofit fontScale="70000" lnSpcReduction="20000"/>
           </a:bodyPr>
           <a:lstStyle/>
           <a:p>
             <a:r>
               <a:rPr lang="en-IN" b="1" dirty="0">
                 <a:solidFill>
-                  <a:srgbClr val="FF0000"/>
+                  <a:schemeClr val="bg2">
+                    <a:lumMod val="50000"/>
+                  </a:schemeClr>
                 </a:solidFill>
               </a:rPr>
-              <a:t>P3: </a:t>
+              <a:t>P2: </a:t>
             </a:r>
             <a:r>
               <a:rPr lang="en-IN" b="1" dirty="0" err="1">
                 <a:solidFill>
-                  <a:srgbClr val="FF0000"/>
+                  <a:schemeClr val="bg2">
+                    <a:lumMod val="50000"/>
+                  </a:schemeClr>
                 </a:solidFill>
               </a:rPr>
-              <a:t>NKGContinuationPowerFlow</a:t>
+              <a:t>NKGSparsePowerFlow</a:t>
             </a:r>
             <a:endParaRPr lang="en-IN" b="1" dirty="0">
               <a:solidFill>
-                <a:srgbClr val="FF0000"/>
+                <a:schemeClr val="bg2">
+                  <a:lumMod val="50000"/>
+                </a:schemeClr>
               </a:solidFill>
             </a:endParaRPr>
           </a:p>
           <a:p>
+            <a:r>
+              <a:rPr lang="en-IN" dirty="0"/>
+              <a:t>Need to rethink all implementations (check Caveat).</a:t>
+            </a:r>
+          </a:p>
+          <a:p>
+            <a:r>
+              <a:rPr lang="en-IN" dirty="0"/>
+              <a:t>function</a:t>
+            </a:r>
+            <a:r>
+              <a:rPr lang="en-IN" i="1" dirty="0"/>
+              <a:t> [</a:t>
+            </a:r>
+            <a:r>
+              <a:rPr lang="en-IN" i="1" dirty="0" err="1"/>
+              <a:t>nnzYBus</a:t>
+            </a:r>
+            <a:r>
+              <a:rPr lang="en-IN" i="1" dirty="0"/>
+              <a:t>, </a:t>
+            </a:r>
+            <a:r>
+              <a:rPr lang="en-IN" i="1" dirty="0" err="1"/>
+              <a:t>NYBus</a:t>
+            </a:r>
+            <a:r>
+              <a:rPr lang="en-IN" i="1" dirty="0"/>
+              <a:t>] = </a:t>
+            </a:r>
+            <a:r>
+              <a:rPr lang="en-IN" i="1" dirty="0" err="1"/>
+              <a:t>makeSparseYBus</a:t>
+            </a:r>
+            <a:r>
+              <a:rPr lang="en-IN" i="1" dirty="0"/>
+              <a:t>(</a:t>
+            </a:r>
+            <a:r>
+              <a:rPr lang="en-IN" i="1" dirty="0" err="1"/>
+              <a:t>busData</a:t>
+            </a:r>
+            <a:r>
+              <a:rPr lang="en-IN" i="1" dirty="0"/>
+              <a:t>, </a:t>
+            </a:r>
+            <a:r>
+              <a:rPr lang="en-IN" i="1" dirty="0" err="1"/>
+              <a:t>branchData</a:t>
+            </a:r>
+            <a:r>
+              <a:rPr lang="en-IN" i="1" dirty="0"/>
+              <a:t>)</a:t>
+            </a:r>
+          </a:p>
+          <a:p>
             <a:pPr lvl="1"/>
             <a:r>
+              <a:rPr lang="en-IN" i="1" dirty="0"/>
+              <a:t>[</a:t>
+            </a:r>
+            <a:r>
+              <a:rPr lang="en-IN" i="1" dirty="0" err="1"/>
+              <a:t>iYBus</a:t>
+            </a:r>
+            <a:r>
+              <a:rPr lang="en-IN" i="1" dirty="0"/>
+              <a:t>, </a:t>
+            </a:r>
+            <a:r>
+              <a:rPr lang="en-IN" i="1" dirty="0" err="1"/>
+              <a:t>jYBus</a:t>
+            </a:r>
+            <a:r>
+              <a:rPr lang="en-IN" i="1" dirty="0"/>
+              <a:t>, </a:t>
+            </a:r>
+            <a:r>
+              <a:rPr lang="en-IN" i="1" dirty="0" err="1"/>
+              <a:t>valYBus</a:t>
+            </a:r>
+            <a:r>
+              <a:rPr lang="en-IN" i="1" dirty="0"/>
+              <a:t>] = </a:t>
+            </a:r>
+            <a:r>
+              <a:rPr lang="en-IN" i="1" dirty="0" err="1"/>
+              <a:t>constructSparseYBusTable</a:t>
+            </a:r>
+            <a:r>
+              <a:rPr lang="en-IN" i="1" dirty="0"/>
+              <a:t>(</a:t>
+            </a:r>
+            <a:r>
+              <a:rPr lang="en-IN" i="1" dirty="0" err="1"/>
+              <a:t>busData</a:t>
+            </a:r>
+            <a:r>
+              <a:rPr lang="en-IN" i="1" dirty="0"/>
+              <a:t>, </a:t>
+            </a:r>
+            <a:r>
+              <a:rPr lang="en-IN" i="1" dirty="0" err="1"/>
+              <a:t>branchData</a:t>
+            </a:r>
+            <a:r>
+              <a:rPr lang="en-IN" i="1" dirty="0"/>
+              <a:t>)</a:t>
+            </a:r>
+          </a:p>
+          <a:p>
+            <a:pPr lvl="1"/>
+            <a:r>
+              <a:rPr lang="en-IN" i="1" dirty="0"/>
+              <a:t>[</a:t>
+            </a:r>
+            <a:r>
+              <a:rPr lang="en-IN" i="1" dirty="0" err="1"/>
+              <a:t>nnz</a:t>
+            </a:r>
+            <a:r>
+              <a:rPr lang="en-IN" i="1" dirty="0"/>
+              <a:t>, N] = </a:t>
+            </a:r>
+            <a:r>
+              <a:rPr lang="en-IN" i="1" dirty="0" err="1"/>
+              <a:t>sparmat</a:t>
+            </a:r>
+            <a:r>
+              <a:rPr lang="en-IN" i="1" dirty="0"/>
+              <a:t>([</a:t>
+            </a:r>
+            <a:r>
+              <a:rPr lang="en-IN" i="1" dirty="0" err="1"/>
+              <a:t>i</a:t>
+            </a:r>
+            <a:r>
+              <a:rPr lang="en-IN" i="1" dirty="0"/>
+              <a:t>, j, </a:t>
+            </a:r>
+            <a:r>
+              <a:rPr lang="en-IN" i="1" dirty="0" err="1"/>
+              <a:t>val</a:t>
+            </a:r>
+            <a:r>
+              <a:rPr lang="en-IN" i="1" dirty="0"/>
+              <a:t>])</a:t>
+            </a:r>
+          </a:p>
+          <a:p>
+            <a:r>
               <a:rPr lang="en-IN" dirty="0"/>
-              <a:t>Dependencies: </a:t>
-            </a:r>
-            <a:r>
-              <a:rPr lang="en-IN" b="1" dirty="0" err="1">
+              <a:t>function </a:t>
+            </a:r>
+            <a:r>
+              <a:rPr lang="en-IN" i="1" dirty="0"/>
+              <a:t>[</a:t>
+            </a:r>
+            <a:r>
+              <a:rPr lang="en-IN" i="1" dirty="0" err="1"/>
+              <a:t>deltaP</a:t>
+            </a:r>
+            <a:r>
+              <a:rPr lang="en-IN" i="1" dirty="0"/>
+              <a:t>, </a:t>
+            </a:r>
+            <a:r>
+              <a:rPr lang="en-IN" i="1" dirty="0" err="1"/>
+              <a:t>deltaQ</a:t>
+            </a:r>
+            <a:r>
+              <a:rPr lang="en-IN" i="1" dirty="0"/>
+              <a:t>] = </a:t>
+            </a:r>
+            <a:r>
+              <a:rPr lang="en-IN" i="1" dirty="0" err="1"/>
+              <a:t>computeMismatchesViaSparseYBus</a:t>
+            </a:r>
+            <a:r>
+              <a:rPr lang="en-IN" i="1" dirty="0"/>
+              <a:t>(</a:t>
+            </a:r>
+            <a:r>
+              <a:rPr lang="en-IN" i="1" dirty="0" err="1"/>
+              <a:t>nnzYBus</a:t>
+            </a:r>
+            <a:r>
+              <a:rPr lang="en-IN" i="1" dirty="0"/>
+              <a:t>, </a:t>
+            </a:r>
+            <a:r>
+              <a:rPr lang="en-IN" i="1" dirty="0" err="1"/>
+              <a:t>NYBus</a:t>
+            </a:r>
+            <a:r>
+              <a:rPr lang="en-IN" i="1" dirty="0"/>
+              <a:t>, ..)</a:t>
+            </a:r>
+          </a:p>
+          <a:p>
+            <a:r>
+              <a:rPr lang="en-IN" i="1" dirty="0"/>
+              <a:t>function [</a:t>
+            </a:r>
+            <a:r>
+              <a:rPr lang="en-IN" i="1" dirty="0" err="1"/>
+              <a:t>nnzJ</a:t>
+            </a:r>
+            <a:r>
+              <a:rPr lang="en-IN" i="1" dirty="0"/>
+              <a:t>, NJ] = </a:t>
+            </a:r>
+            <a:r>
+              <a:rPr lang="en-IN" i="1" dirty="0" err="1"/>
+              <a:t>constructSparseJacobian</a:t>
+            </a:r>
+            <a:r>
+              <a:rPr lang="en-IN" i="1" dirty="0"/>
+              <a:t>(</a:t>
+            </a:r>
+            <a:r>
+              <a:rPr lang="en-IN" i="1" dirty="0" err="1"/>
+              <a:t>nnzYBus</a:t>
+            </a:r>
+            <a:r>
+              <a:rPr lang="en-IN" i="1" dirty="0"/>
+              <a:t>, </a:t>
+            </a:r>
+            <a:r>
+              <a:rPr lang="en-IN" i="1" dirty="0" err="1"/>
+              <a:t>NYBus</a:t>
+            </a:r>
+            <a:r>
+              <a:rPr lang="en-IN" i="1" dirty="0"/>
+              <a:t>, …)</a:t>
+            </a:r>
+          </a:p>
+          <a:p>
+            <a:r>
+              <a:rPr lang="en-IN" i="1" dirty="0"/>
+              <a:t>[</a:t>
+            </a:r>
+            <a:r>
+              <a:rPr lang="en-IN" i="1" dirty="0" err="1"/>
+              <a:t>nnzL</a:t>
+            </a:r>
+            <a:r>
+              <a:rPr lang="en-IN" i="1" dirty="0"/>
+              <a:t>, NL, </a:t>
+            </a:r>
+            <a:r>
+              <a:rPr lang="en-IN" i="1" dirty="0" err="1"/>
+              <a:t>nnzU</a:t>
+            </a:r>
+            <a:r>
+              <a:rPr lang="en-IN" i="1" dirty="0"/>
+              <a:t>, NU] = </a:t>
+            </a:r>
+            <a:r>
+              <a:rPr lang="en-IN" i="1" dirty="0" err="1"/>
+              <a:t>factorizeSparseLU</a:t>
+            </a:r>
+            <a:r>
+              <a:rPr lang="en-IN" i="1" dirty="0"/>
+              <a:t>(</a:t>
+            </a:r>
+            <a:r>
+              <a:rPr lang="en-IN" i="1" dirty="0" err="1"/>
+              <a:t>nnzJ</a:t>
+            </a:r>
+            <a:r>
+              <a:rPr lang="en-IN" i="1" dirty="0"/>
+              <a:t>, NJ)</a:t>
+            </a:r>
+          </a:p>
+          <a:p>
+            <a:pPr lvl="1"/>
+            <a:r>
+              <a:rPr lang="en-IN" i="1" dirty="0" err="1"/>
+              <a:t>updateSparseMatrix</a:t>
+            </a:r>
+            <a:endParaRPr lang="en-IN" i="1" dirty="0"/>
+          </a:p>
+          <a:p>
+            <a:pPr lvl="1"/>
+            <a:r>
+              <a:rPr lang="en-IN" i="1" dirty="0" err="1"/>
+              <a:t>computeSparseTriangularProduct</a:t>
+            </a:r>
+            <a:endParaRPr lang="en-IN" i="1" dirty="0"/>
+          </a:p>
+          <a:p>
+            <a:r>
+              <a:rPr lang="en-IN" dirty="0">
                 <a:solidFill>
-                  <a:srgbClr val="002060"/>
+                  <a:srgbClr val="C00000"/>
                 </a:solidFill>
               </a:rPr>
-              <a:t>NKGPowerFlow</a:t>
-            </a:r>
-            <a:r>
-              <a:rPr lang="en-IN" dirty="0"/>
-              <a:t>: </a:t>
-            </a:r>
-            <a:r>
-              <a:rPr lang="en-IN" i="1" dirty="0" err="1"/>
-              <a:t>initializeVectors</a:t>
-            </a:r>
-            <a:r>
-              <a:rPr lang="en-IN" dirty="0"/>
-              <a:t>, </a:t>
-            </a:r>
-            <a:r>
-              <a:rPr lang="en-IN" i="1" dirty="0" err="1"/>
-              <a:t>computeBusInjections</a:t>
-            </a:r>
-            <a:r>
-              <a:rPr lang="en-IN" i="1" dirty="0"/>
-              <a:t>,  </a:t>
-            </a:r>
-            <a:r>
-              <a:rPr lang="en-IN" i="1" dirty="0" err="1"/>
-              <a:t>solveUsingLU</a:t>
-            </a:r>
-            <a:endParaRPr lang="en-IN" i="1" dirty="0"/>
-          </a:p>
-          <a:p>
-            <a:pPr lvl="1"/>
-            <a:r>
-              <a:rPr lang="en-IN" dirty="0"/>
-              <a:t>A few more functions, like </a:t>
-            </a:r>
-            <a:r>
-              <a:rPr lang="en-IN" i="1" dirty="0" err="1"/>
-              <a:t>PredictorFunction</a:t>
-            </a:r>
-            <a:r>
-              <a:rPr lang="en-IN" i="1" dirty="0"/>
-              <a:t> </a:t>
-            </a:r>
-            <a:r>
-              <a:rPr lang="en-IN" dirty="0"/>
-              <a:t>and </a:t>
-            </a:r>
-            <a:r>
-              <a:rPr lang="en-IN" i="1" dirty="0" err="1"/>
-              <a:t>CorrectorFunction</a:t>
-            </a:r>
-            <a:r>
-              <a:rPr lang="en-IN" dirty="0"/>
-              <a:t> </a:t>
-            </a:r>
-            <a:r>
-              <a:rPr lang="en-IN" sz="1600" dirty="0"/>
-              <a:t>(I just refactored a whole script by my project team mate, so for me it’s still in just one script, not too long.)</a:t>
-            </a:r>
-            <a:endParaRPr lang="en-IN" dirty="0"/>
-          </a:p>
-          <a:p>
-            <a:pPr lvl="1"/>
-            <a:r>
-              <a:rPr lang="en-IN" i="1" dirty="0" err="1"/>
-              <a:t>plotCPFPlots</a:t>
-            </a:r>
-            <a:endParaRPr lang="en-IN" i="1" dirty="0"/>
-          </a:p>
-          <a:p>
-            <a:pPr lvl="1"/>
-            <a:r>
-              <a:rPr lang="en-IN" i="1" dirty="0" err="1"/>
-              <a:t>displayCPFResults</a:t>
-            </a:r>
-            <a:endParaRPr lang="en-IN" i="1" dirty="0"/>
+              <a:t>Caveat: My own implementations were awkward. They were not adaptive to new inputs (i.e. they required all of the sparse inputs to be stated up front, no mechanism to make updates to existing sparse data structures). This later led to complications for performing even simple algorithms like LU Factorization (which is the last requirement as far as evaluation is concerned).</a:t>
+            </a:r>
           </a:p>
         </p:txBody>
       </p:sp>
     </p:spTree>
     <p:extLst>
       <p:ext uri="{BB962C8B-B14F-4D97-AF65-F5344CB8AC3E}">
-        <p14:creationId xmlns:p14="http://schemas.microsoft.com/office/powerpoint/2010/main" val="2938050309"/>
+        <p14:creationId xmlns:p14="http://schemas.microsoft.com/office/powerpoint/2010/main" val="943132824"/>
       </p:ext>
     </p:extLst>
   </p:cSld>
@@ -7947,82 +8168,119 @@
             <a:r>
               <a:rPr lang="en-IN" b="1" dirty="0">
                 <a:solidFill>
-                  <a:schemeClr val="accent6">
-                    <a:lumMod val="75000"/>
-                  </a:schemeClr>
+                  <a:srgbClr val="FF0000"/>
                 </a:solidFill>
               </a:rPr>
-              <a:t>P4: </a:t>
+              <a:t>P3: </a:t>
             </a:r>
             <a:r>
               <a:rPr lang="en-IN" b="1" dirty="0" err="1">
                 <a:solidFill>
-                  <a:schemeClr val="accent6">
-                    <a:lumMod val="75000"/>
-                  </a:schemeClr>
+                  <a:srgbClr val="FF0000"/>
                 </a:solidFill>
               </a:rPr>
-              <a:t>NKGStateEstimation</a:t>
+              <a:t>NKGContinuationPowerFlow</a:t>
             </a:r>
             <a:endParaRPr lang="en-IN" b="1" dirty="0">
               <a:solidFill>
-                <a:schemeClr val="accent6">
-                  <a:lumMod val="75000"/>
-                </a:schemeClr>
+                <a:srgbClr val="FF0000"/>
               </a:solidFill>
             </a:endParaRPr>
           </a:p>
           <a:p>
+            <a:pPr lvl="1"/>
             <a:r>
               <a:rPr lang="en-IN" dirty="0"/>
-              <a:t>(My project partner completely did it.)</a:t>
-            </a:r>
-          </a:p>
-          <a:p>
-            <a:r>
-              <a:rPr lang="en-IN" dirty="0"/>
-              <a:t>Requires Powerflow results from </a:t>
-            </a:r>
-            <a:r>
-              <a:rPr lang="en-IN" b="1" dirty="0">
+              <a:t>Dependencies: </a:t>
+            </a:r>
+            <a:r>
+              <a:rPr lang="en-IN" b="1" dirty="0" err="1">
                 <a:solidFill>
                   <a:srgbClr val="002060"/>
                 </a:solidFill>
               </a:rPr>
-              <a:t>P1 </a:t>
+              <a:t>NKGPowerFlow</a:t>
             </a:r>
             <a:r>
               <a:rPr lang="en-IN" dirty="0"/>
-              <a:t>for branch currents.</a:t>
-            </a:r>
-          </a:p>
-          <a:p>
+              <a:t>: </a:t>
+            </a:r>
+            <a:r>
+              <a:rPr lang="en-IN" i="1" dirty="0" err="1"/>
+              <a:t>initializeVectors</a:t>
+            </a:r>
             <a:r>
               <a:rPr lang="en-IN" dirty="0"/>
-              <a:t>Likely requires using a lot of symbolic variables. Although he did it by literally writing out all of the derivative equations.</a:t>
-            </a:r>
-          </a:p>
-          <a:p>
+              <a:t>, </a:t>
+            </a:r>
+            <a:r>
+              <a:rPr lang="en-IN" i="1" dirty="0" err="1"/>
+              <a:t>computeBusInjections</a:t>
+            </a:r>
+            <a:r>
+              <a:rPr lang="en-IN" i="1" dirty="0"/>
+              <a:t>,  </a:t>
+            </a:r>
+            <a:r>
+              <a:rPr lang="en-IN" i="1" dirty="0" err="1"/>
+              <a:t>solveUsingLU</a:t>
+            </a:r>
+            <a:endParaRPr lang="en-IN" i="1" dirty="0"/>
+          </a:p>
+          <a:p>
+            <a:pPr lvl="1"/>
             <a:r>
               <a:rPr lang="en-IN" dirty="0"/>
-              <a:t>Then some addition of noise to the currents.</a:t>
-            </a:r>
-          </a:p>
-          <a:p>
+              <a:t>A few more functions, like </a:t>
+            </a:r>
+            <a:r>
+              <a:rPr lang="en-IN" i="1" dirty="0" err="1"/>
+              <a:t>PredictorFunction</a:t>
+            </a:r>
+            <a:r>
+              <a:rPr lang="en-IN" i="1" dirty="0"/>
+              <a:t> </a:t>
+            </a:r>
             <a:r>
               <a:rPr lang="en-IN" dirty="0"/>
-              <a:t>Then formation of H matrix, to be used in an iterative computation.</a:t>
-            </a:r>
-          </a:p>
-          <a:p>
+              <a:t>and </a:t>
+            </a:r>
+            <a:r>
+              <a:rPr lang="en-IN" i="1" dirty="0" err="1"/>
+              <a:t>CorrectorFunction</a:t>
+            </a:r>
+            <a:r>
+              <a:rPr lang="en-IN" dirty="0"/>
+              <a:t> </a:t>
+            </a:r>
+            <a:r>
+              <a:rPr lang="en-IN" sz="1600" dirty="0"/>
+              <a:t>(I just refactored a whole script by my project team mate, so for me it’s still in just one script, not too long.)</a:t>
+            </a:r>
             <a:endParaRPr lang="en-IN" dirty="0"/>
+          </a:p>
+          <a:p>
+            <a:pPr lvl="1"/>
+            <a:r>
+              <a:rPr lang="en-IN" i="1" dirty="0" err="1"/>
+              <a:t>plotCPFPlots</a:t>
+            </a:r>
+            <a:endParaRPr lang="en-IN" i="1" dirty="0"/>
+          </a:p>
+          <a:p>
+            <a:pPr lvl="1"/>
+            <a:r>
+              <a:rPr lang="en-IN" i="1" dirty="0" err="1"/>
+              <a:t>displayCPFResults</a:t>
+            </a:r>
+            <a:endParaRPr lang="en-IN" i="1" dirty="0"/>
           </a:p>
         </p:txBody>
       </p:sp>
     </p:spTree>
     <p:extLst>
       <p:ext uri="{BB962C8B-B14F-4D97-AF65-F5344CB8AC3E}">
-        <p14:creationId xmlns:p14="http://schemas.microsoft.com/office/powerpoint/2010/main" val="1123651161"/>
+        <p14:creationId xmlns:p14="http://schemas.microsoft.com/office/powerpoint/2010/main" val="2938050309"/>
       </p:ext>
     </p:extLst>
   </p:cSld>
@@ -8103,6 +8361,162 @@
             <a:r>
               <a:rPr lang="en-IN" b="1" dirty="0">
                 <a:solidFill>
+                  <a:schemeClr val="accent6">
+                    <a:lumMod val="75000"/>
+                  </a:schemeClr>
+                </a:solidFill>
+              </a:rPr>
+              <a:t>P4: </a:t>
+            </a:r>
+            <a:r>
+              <a:rPr lang="en-IN" b="1" dirty="0" err="1">
+                <a:solidFill>
+                  <a:schemeClr val="accent6">
+                    <a:lumMod val="75000"/>
+                  </a:schemeClr>
+                </a:solidFill>
+              </a:rPr>
+              <a:t>NKGStateEstimation</a:t>
+            </a:r>
+            <a:endParaRPr lang="en-IN" b="1" dirty="0">
+              <a:solidFill>
+                <a:schemeClr val="accent6">
+                  <a:lumMod val="75000"/>
+                </a:schemeClr>
+              </a:solidFill>
+            </a:endParaRPr>
+          </a:p>
+          <a:p>
+            <a:r>
+              <a:rPr lang="en-IN" dirty="0"/>
+              <a:t>(My project partner completely did it.)</a:t>
+            </a:r>
+          </a:p>
+          <a:p>
+            <a:r>
+              <a:rPr lang="en-IN" dirty="0"/>
+              <a:t>Requires Powerflow results from </a:t>
+            </a:r>
+            <a:r>
+              <a:rPr lang="en-IN" b="1" dirty="0">
+                <a:solidFill>
+                  <a:srgbClr val="002060"/>
+                </a:solidFill>
+              </a:rPr>
+              <a:t>P1 </a:t>
+            </a:r>
+            <a:r>
+              <a:rPr lang="en-IN" dirty="0"/>
+              <a:t>for branch currents.</a:t>
+            </a:r>
+          </a:p>
+          <a:p>
+            <a:r>
+              <a:rPr lang="en-IN" dirty="0"/>
+              <a:t>Likely requires using a lot of symbolic variables. Although he did it by literally writing out all of the derivative equations.</a:t>
+            </a:r>
+          </a:p>
+          <a:p>
+            <a:r>
+              <a:rPr lang="en-IN" dirty="0"/>
+              <a:t>Then some addition of noise to the currents.</a:t>
+            </a:r>
+          </a:p>
+          <a:p>
+            <a:r>
+              <a:rPr lang="en-IN" dirty="0"/>
+              <a:t>Then formation of H matrix, to be used in an iterative computation.</a:t>
+            </a:r>
+          </a:p>
+          <a:p>
+            <a:endParaRPr lang="en-IN" dirty="0"/>
+          </a:p>
+        </p:txBody>
+      </p:sp>
+    </p:spTree>
+    <p:extLst>
+      <p:ext uri="{BB962C8B-B14F-4D97-AF65-F5344CB8AC3E}">
+        <p14:creationId xmlns:p14="http://schemas.microsoft.com/office/powerpoint/2010/main" val="1123651161"/>
+      </p:ext>
+    </p:extLst>
+  </p:cSld>
+  <p:clrMapOvr>
+    <a:masterClrMapping/>
+  </p:clrMapOvr>
+</p:sld>
+</file>
+
+<file path=ppt/slides/slide13.xml><?xml version="1.0" encoding="utf-8"?>
+<p:sld xmlns:a="http://schemas.openxmlformats.org/drawingml/2006/main" xmlns:r="http://schemas.openxmlformats.org/officeDocument/2006/relationships" xmlns:p="http://schemas.openxmlformats.org/presentationml/2006/main">
+  <p:cSld>
+    <p:spTree>
+      <p:nvGrpSpPr>
+        <p:cNvPr id="1" name=""/>
+        <p:cNvGrpSpPr/>
+        <p:nvPr/>
+      </p:nvGrpSpPr>
+      <p:grpSpPr>
+        <a:xfrm>
+          <a:off x="0" y="0"/>
+          <a:ext cx="0" cy="0"/>
+          <a:chOff x="0" y="0"/>
+          <a:chExt cx="0" cy="0"/>
+        </a:xfrm>
+      </p:grpSpPr>
+      <p:sp>
+        <p:nvSpPr>
+          <p:cNvPr id="2" name="Title 1">
+            <a:extLst>
+              <a:ext uri="{FF2B5EF4-FFF2-40B4-BE49-F238E27FC236}">
+                <a16:creationId xmlns:a16="http://schemas.microsoft.com/office/drawing/2014/main" id="{A907B655-ADC6-0DB3-D40C-B4A4F02C56AD}"/>
+              </a:ext>
+            </a:extLst>
+          </p:cNvPr>
+          <p:cNvSpPr>
+            <a:spLocks noGrp="1"/>
+          </p:cNvSpPr>
+          <p:nvPr>
+            <p:ph type="title"/>
+          </p:nvPr>
+        </p:nvSpPr>
+        <p:spPr/>
+        <p:txBody>
+          <a:bodyPr/>
+          <a:lstStyle/>
+          <a:p>
+            <a:r>
+              <a:rPr lang="en-IN" dirty="0"/>
+              <a:t>Sample functions in modules</a:t>
+            </a:r>
+          </a:p>
+        </p:txBody>
+      </p:sp>
+      <p:sp>
+        <p:nvSpPr>
+          <p:cNvPr id="3" name="Content Placeholder 2">
+            <a:extLst>
+              <a:ext uri="{FF2B5EF4-FFF2-40B4-BE49-F238E27FC236}">
+                <a16:creationId xmlns:a16="http://schemas.microsoft.com/office/drawing/2014/main" id="{B248B06E-0246-4FEF-533A-B0C46C596083}"/>
+              </a:ext>
+            </a:extLst>
+          </p:cNvPr>
+          <p:cNvSpPr>
+            <a:spLocks noGrp="1"/>
+          </p:cNvSpPr>
+          <p:nvPr>
+            <p:ph idx="1"/>
+          </p:nvPr>
+        </p:nvSpPr>
+        <p:spPr/>
+        <p:txBody>
+          <a:bodyPr>
+            <a:normAutofit/>
+          </a:bodyPr>
+          <a:lstStyle/>
+          <a:p>
+            <a:r>
+              <a:rPr lang="en-IN" b="1" dirty="0">
+                <a:solidFill>
                   <a:schemeClr val="accent2">
                     <a:lumMod val="75000"/>
                   </a:schemeClr>
@@ -8248,7 +8662,7 @@
 </p:sld>
 </file>
 
-<file path=ppt/slides/slide13.xml><?xml version="1.0" encoding="utf-8"?>
+<file path=ppt/slides/slide14.xml><?xml version="1.0" encoding="utf-8"?>
 <p:sld xmlns:a="http://schemas.openxmlformats.org/drawingml/2006/main" xmlns:r="http://schemas.openxmlformats.org/officeDocument/2006/relationships" xmlns:p="http://schemas.openxmlformats.org/presentationml/2006/main">
   <p:cSld>
     <p:spTree>
@@ -9060,7 +9474,7 @@
 </p:sld>
 </file>
 
-<file path=ppt/slides/slide14.xml><?xml version="1.0" encoding="utf-8"?>
+<file path=ppt/slides/slide15.xml><?xml version="1.0" encoding="utf-8"?>
 <p:sld xmlns:a="http://schemas.openxmlformats.org/drawingml/2006/main" xmlns:r="http://schemas.openxmlformats.org/officeDocument/2006/relationships" xmlns:p="http://schemas.openxmlformats.org/presentationml/2006/main">
   <p:cSld>
     <p:spTree>
@@ -9194,7 +9608,7 @@
 </p:sld>
 </file>
 
-<file path=ppt/slides/slide15.xml><?xml version="1.0" encoding="utf-8"?>
+<file path=ppt/slides/slide16.xml><?xml version="1.0" encoding="utf-8"?>
 <p:sld xmlns:a="http://schemas.openxmlformats.org/drawingml/2006/main" xmlns:r="http://schemas.openxmlformats.org/officeDocument/2006/relationships" xmlns:p="http://schemas.openxmlformats.org/presentationml/2006/main">
   <p:cSld>
     <p:spTree>
@@ -9320,7 +9734,7 @@
           <p:cNvPr id="2" name="Title 1">
             <a:extLst>
               <a:ext uri="{FF2B5EF4-FFF2-40B4-BE49-F238E27FC236}">
-                <a16:creationId xmlns:a16="http://schemas.microsoft.com/office/drawing/2014/main" id="{336429DC-BFF4-DD6A-7726-27957283ABBE}"/>
+                <a16:creationId xmlns:a16="http://schemas.microsoft.com/office/drawing/2014/main" id="{789BA199-C79C-1E29-021E-E9A3C1CA1C29}"/>
               </a:ext>
             </a:extLst>
           </p:cNvPr>
@@ -9331,303 +9745,485 @@
             <p:ph type="title"/>
           </p:nvPr>
         </p:nvSpPr>
-        <p:spPr/>
+        <p:spPr>
+          <a:xfrm>
+            <a:off x="838200" y="255943"/>
+            <a:ext cx="10515600" cy="1325563"/>
+          </a:xfrm>
+        </p:spPr>
         <p:txBody>
           <a:bodyPr/>
           <a:lstStyle/>
           <a:p>
             <a:r>
-              <a:rPr lang="en-IN"/>
-              <a:t>Starting Workflow – Project Interdependencies</a:t>
-            </a:r>
-            <a:endParaRPr lang="en-IN" dirty="0"/>
+              <a:rPr lang="en-IN" dirty="0"/>
+              <a:t>Meeting Notes: 22 May 2023</a:t>
+            </a:r>
           </a:p>
         </p:txBody>
       </p:sp>
-      <p:sp>
-        <p:nvSpPr>
-          <p:cNvPr id="3" name="Content Placeholder 2">
-            <a:extLst>
-              <a:ext uri="{FF2B5EF4-FFF2-40B4-BE49-F238E27FC236}">
-                <a16:creationId xmlns:a16="http://schemas.microsoft.com/office/drawing/2014/main" id="{D2B9B5CA-5713-90E9-1BF9-A83143000B32}"/>
-              </a:ext>
-            </a:extLst>
-          </p:cNvPr>
-          <p:cNvSpPr>
-            <a:spLocks noGrp="1"/>
-          </p:cNvSpPr>
-          <p:nvPr>
-            <p:ph idx="1"/>
-          </p:nvPr>
-        </p:nvSpPr>
-        <p:spPr/>
-        <p:txBody>
-          <a:bodyPr/>
-          <a:lstStyle/>
-          <a:p>
-            <a:r>
-              <a:rPr lang="en-IN" dirty="0"/>
-              <a:t>Having a working </a:t>
-            </a:r>
-            <a:r>
-              <a:rPr lang="en-IN" b="1" dirty="0">
-                <a:solidFill>
-                  <a:srgbClr val="002060"/>
-                </a:solidFill>
-              </a:rPr>
-              <a:t>P1: </a:t>
-            </a:r>
-            <a:r>
-              <a:rPr lang="en-IN" b="1" dirty="0" err="1">
-                <a:solidFill>
-                  <a:srgbClr val="002060"/>
-                </a:solidFill>
-              </a:rPr>
-              <a:t>PowerFlow</a:t>
-            </a:r>
-            <a:r>
-              <a:rPr lang="en-IN" b="1" dirty="0">
-                <a:solidFill>
-                  <a:srgbClr val="002060"/>
-                </a:solidFill>
-              </a:rPr>
-              <a:t> </a:t>
-            </a:r>
-            <a:r>
-              <a:rPr lang="en-IN" dirty="0"/>
-              <a:t>code is a prerequisite for a couple of other tasks: (</a:t>
-            </a:r>
-            <a:r>
-              <a:rPr lang="en-IN" b="1" dirty="0">
-                <a:solidFill>
-                  <a:schemeClr val="accent6">
-                    <a:lumMod val="75000"/>
-                  </a:schemeClr>
-                </a:solidFill>
-              </a:rPr>
-              <a:t>P4: </a:t>
-            </a:r>
-            <a:r>
-              <a:rPr lang="en-IN" b="1" dirty="0" err="1">
-                <a:solidFill>
-                  <a:schemeClr val="accent6">
-                    <a:lumMod val="75000"/>
-                  </a:schemeClr>
-                </a:solidFill>
-              </a:rPr>
-              <a:t>StateEstimation</a:t>
-            </a:r>
-            <a:r>
-              <a:rPr lang="en-IN" b="1" dirty="0">
-                <a:solidFill>
-                  <a:schemeClr val="accent2">
-                    <a:lumMod val="75000"/>
-                  </a:schemeClr>
-                </a:solidFill>
-              </a:rPr>
-              <a:t>, P5: </a:t>
-            </a:r>
-            <a:r>
-              <a:rPr lang="en-IN" b="1" dirty="0" err="1">
-                <a:solidFill>
-                  <a:schemeClr val="accent2">
-                    <a:lumMod val="75000"/>
-                  </a:schemeClr>
-                </a:solidFill>
-              </a:rPr>
-              <a:t>OptimalPowerFlow</a:t>
-            </a:r>
-            <a:r>
-              <a:rPr lang="en-IN" dirty="0"/>
-              <a:t>). </a:t>
-            </a:r>
-            <a:r>
-              <a:rPr lang="en-IN" sz="1400" dirty="0"/>
-              <a:t>NRPF only though.</a:t>
-            </a:r>
-            <a:endParaRPr lang="en-IN" dirty="0"/>
-          </a:p>
-          <a:p>
-            <a:r>
-              <a:rPr lang="en-IN" b="1" dirty="0">
-                <a:solidFill>
-                  <a:srgbClr val="C00000"/>
-                </a:solidFill>
-              </a:rPr>
-              <a:t>P3: ContinuationPowerFlow </a:t>
-            </a:r>
-            <a:r>
-              <a:rPr lang="en-IN" dirty="0"/>
-              <a:t>does NOT require the full implementation of </a:t>
-            </a:r>
-            <a:r>
-              <a:rPr lang="en-IN" b="1" dirty="0">
-                <a:solidFill>
-                  <a:srgbClr val="002060"/>
-                </a:solidFill>
-              </a:rPr>
-              <a:t>P1 </a:t>
-            </a:r>
-            <a:r>
-              <a:rPr lang="en-IN" i="1" dirty="0" err="1">
-                <a:solidFill>
-                  <a:srgbClr val="002060"/>
-                </a:solidFill>
-              </a:rPr>
-              <a:t>solveForPowerFlow</a:t>
-            </a:r>
-            <a:r>
-              <a:rPr lang="en-IN" dirty="0"/>
-              <a:t>, and can be done in parallel. </a:t>
-            </a:r>
-            <a:r>
-              <a:rPr lang="en-IN" sz="1600" dirty="0"/>
-              <a:t>Some functions from </a:t>
-            </a:r>
-            <a:r>
-              <a:rPr lang="en-IN" sz="1600" dirty="0">
-                <a:solidFill>
-                  <a:srgbClr val="002060"/>
-                </a:solidFill>
-              </a:rPr>
-              <a:t>P1, including construction of Jacobian,</a:t>
-            </a:r>
-            <a:r>
-              <a:rPr lang="en-IN" sz="1600" dirty="0"/>
-              <a:t> are required though.</a:t>
-            </a:r>
-            <a:endParaRPr lang="en-IN" dirty="0"/>
-          </a:p>
-          <a:p>
-            <a:r>
-              <a:rPr lang="en-IN" dirty="0"/>
-              <a:t>Only </a:t>
-            </a:r>
-            <a:r>
-              <a:rPr lang="en-IN" b="1" dirty="0">
-                <a:solidFill>
-                  <a:schemeClr val="bg2">
-                    <a:lumMod val="50000"/>
-                  </a:schemeClr>
-                </a:solidFill>
-              </a:rPr>
-              <a:t>P2: </a:t>
-            </a:r>
-            <a:r>
-              <a:rPr lang="en-IN" b="1" dirty="0" err="1">
-                <a:solidFill>
-                  <a:schemeClr val="bg2">
-                    <a:lumMod val="50000"/>
-                  </a:schemeClr>
-                </a:solidFill>
-              </a:rPr>
-              <a:t>SparsePowerFlow</a:t>
-            </a:r>
-            <a:r>
-              <a:rPr lang="en-IN" b="1" dirty="0">
-                <a:solidFill>
-                  <a:schemeClr val="bg2">
-                    <a:lumMod val="50000"/>
-                  </a:schemeClr>
-                </a:solidFill>
-              </a:rPr>
-              <a:t> </a:t>
-            </a:r>
-            <a:r>
-              <a:rPr lang="en-IN" dirty="0"/>
-              <a:t>is a completely independent task, and can be done in parallel. </a:t>
-            </a:r>
-            <a:r>
-              <a:rPr lang="en-IN" sz="2000" dirty="0"/>
-              <a:t>In fact it is not permissible to use any assets from the other projects.</a:t>
-            </a:r>
-          </a:p>
-          <a:p>
-            <a:r>
-              <a:rPr lang="en-IN" dirty="0"/>
-              <a:t>Once </a:t>
-            </a:r>
-            <a:r>
-              <a:rPr lang="en-IN" b="1" dirty="0">
-                <a:solidFill>
-                  <a:srgbClr val="002060"/>
-                </a:solidFill>
-              </a:rPr>
-              <a:t>P1</a:t>
-            </a:r>
-            <a:r>
-              <a:rPr lang="en-IN" dirty="0"/>
-              <a:t> is completed ALL other projects can be completed in parallel, </a:t>
-            </a:r>
-            <a:r>
-              <a:rPr lang="en-IN" dirty="0" err="1"/>
-              <a:t>i.e</a:t>
-            </a:r>
-            <a:r>
-              <a:rPr lang="en-IN" dirty="0"/>
-              <a:t> </a:t>
-            </a:r>
-            <a:r>
-              <a:rPr lang="en-IN" b="1" dirty="0">
-                <a:solidFill>
-                  <a:schemeClr val="bg2">
-                    <a:lumMod val="50000"/>
-                  </a:schemeClr>
-                </a:solidFill>
-              </a:rPr>
-              <a:t>P2</a:t>
-            </a:r>
-            <a:r>
-              <a:rPr lang="en-IN" dirty="0"/>
-              <a:t>, </a:t>
-            </a:r>
-            <a:r>
-              <a:rPr lang="en-IN" b="1" dirty="0">
-                <a:solidFill>
-                  <a:srgbClr val="C00000"/>
-                </a:solidFill>
-              </a:rPr>
-              <a:t>P3</a:t>
-            </a:r>
-            <a:r>
-              <a:rPr lang="en-IN" dirty="0"/>
-              <a:t>, </a:t>
-            </a:r>
-            <a:r>
-              <a:rPr lang="en-IN" b="1" dirty="0">
-                <a:solidFill>
-                  <a:schemeClr val="accent6">
-                    <a:lumMod val="75000"/>
-                  </a:schemeClr>
-                </a:solidFill>
-              </a:rPr>
-              <a:t>P4</a:t>
-            </a:r>
-            <a:r>
-              <a:rPr lang="en-IN" dirty="0"/>
-              <a:t> and </a:t>
-            </a:r>
-            <a:r>
-              <a:rPr lang="en-IN" b="1" dirty="0">
-                <a:solidFill>
-                  <a:schemeClr val="accent2">
-                    <a:lumMod val="75000"/>
-                  </a:schemeClr>
-                </a:solidFill>
-              </a:rPr>
-              <a:t>P5</a:t>
-            </a:r>
-            <a:r>
-              <a:rPr lang="en-IN" dirty="0"/>
-              <a:t> do NOT have any interdependencies.</a:t>
-            </a:r>
-          </a:p>
-        </p:txBody>
-      </p:sp>
+      <mc:AlternateContent xmlns:mc="http://schemas.openxmlformats.org/markup-compatibility/2006" xmlns:a14="http://schemas.microsoft.com/office/drawing/2010/main">
+        <mc:Choice Requires="a14">
+          <p:sp>
+            <p:nvSpPr>
+              <p:cNvPr id="3" name="Content Placeholder 2">
+                <a:extLst>
+                  <a:ext uri="{FF2B5EF4-FFF2-40B4-BE49-F238E27FC236}">
+                    <a16:creationId xmlns:a16="http://schemas.microsoft.com/office/drawing/2014/main" id="{A4C39C92-5118-4B84-60E9-A471DBBECC0F}"/>
+                  </a:ext>
+                </a:extLst>
+              </p:cNvPr>
+              <p:cNvSpPr>
+                <a:spLocks noGrp="1"/>
+              </p:cNvSpPr>
+              <p:nvPr>
+                <p:ph idx="1"/>
+              </p:nvPr>
+            </p:nvSpPr>
+            <p:spPr/>
+            <p:txBody>
+              <a:bodyPr>
+                <a:normAutofit fontScale="70000" lnSpcReduction="20000"/>
+              </a:bodyPr>
+              <a:lstStyle/>
+              <a:p>
+                <a:r>
+                  <a:rPr lang="en-IN" b="0" dirty="0">
+                    <a:latin typeface="Cambria Math" panose="02040503050406030204" pitchFamily="18" charset="0"/>
+                  </a:rPr>
+                  <a:t>Make a branch for yourself on the repo. Keep committing and pushing to YOUR branch upon every successful increment.</a:t>
+                </a:r>
+              </a:p>
+              <a:p>
+                <a:r>
+                  <a:rPr lang="en-IN" b="0" dirty="0">
+                    <a:latin typeface="Cambria Math" panose="02040503050406030204" pitchFamily="18" charset="0"/>
+                  </a:rPr>
+                  <a:t>&lt;Merging to the main branch&gt; Later.</a:t>
+                </a:r>
+              </a:p>
+              <a:p>
+                <a:r>
+                  <a:rPr lang="en-IN" b="0" dirty="0">
+                    <a:latin typeface="Cambria Math" panose="02040503050406030204" pitchFamily="18" charset="0"/>
+                  </a:rPr>
+                  <a:t>Where to store outputs as handy CSV files? Where to store images? </a:t>
+                </a:r>
+                <a:r>
+                  <a:rPr lang="en-IN" dirty="0">
+                    <a:latin typeface="Cambria Math" panose="02040503050406030204" pitchFamily="18" charset="0"/>
+                  </a:rPr>
+                  <a:t>For now, they are in </a:t>
+                </a:r>
+                <a:r>
+                  <a:rPr lang="en-IN" dirty="0" err="1">
+                    <a:latin typeface="Cambria Math" panose="02040503050406030204" pitchFamily="18" charset="0"/>
+                  </a:rPr>
+                  <a:t>processedData</a:t>
+                </a:r>
+                <a:r>
+                  <a:rPr lang="en-IN" dirty="0">
+                    <a:latin typeface="Cambria Math" panose="02040503050406030204" pitchFamily="18" charset="0"/>
+                  </a:rPr>
+                  <a:t> folder.</a:t>
+                </a:r>
+              </a:p>
+              <a:p>
+                <a:r>
+                  <a:rPr lang="en-IN" b="0" dirty="0">
+                    <a:latin typeface="Cambria Math" panose="02040503050406030204" pitchFamily="18" charset="0"/>
+                  </a:rPr>
+                  <a:t>Are </a:t>
+                </a:r>
+                <a:r>
+                  <a:rPr lang="en-IN" b="0" dirty="0" err="1">
+                    <a:latin typeface="Cambria Math" panose="02040503050406030204" pitchFamily="18" charset="0"/>
+                  </a:rPr>
+                  <a:t>DataFrames</a:t>
+                </a:r>
+                <a:r>
+                  <a:rPr lang="en-IN" b="0" dirty="0">
+                    <a:latin typeface="Cambria Math" panose="02040503050406030204" pitchFamily="18" charset="0"/>
+                  </a:rPr>
+                  <a:t> being mutated by function calls? Does Julia mutate them anyway? Do we want to mutate the original </a:t>
+                </a:r>
+                <a:r>
+                  <a:rPr lang="en-IN" b="0" dirty="0" err="1">
+                    <a:latin typeface="Cambria Math" panose="02040503050406030204" pitchFamily="18" charset="0"/>
+                  </a:rPr>
+                  <a:t>DataFrames</a:t>
+                </a:r>
+                <a:r>
+                  <a:rPr lang="en-IN" b="0" dirty="0">
+                    <a:latin typeface="Cambria Math" panose="02040503050406030204" pitchFamily="18" charset="0"/>
+                  </a:rPr>
+                  <a:t>? If yes, do we separately call the </a:t>
+                </a:r>
+                <a:r>
+                  <a:rPr lang="en-IN" b="0" dirty="0" err="1">
+                    <a:latin typeface="Cambria Math" panose="02040503050406030204" pitchFamily="18" charset="0"/>
+                  </a:rPr>
+                  <a:t>DataFrames</a:t>
+                </a:r>
+                <a:r>
+                  <a:rPr lang="en-IN" b="0" dirty="0">
+                    <a:latin typeface="Cambria Math" panose="02040503050406030204" pitchFamily="18" charset="0"/>
+                  </a:rPr>
+                  <a:t> back as function outputs? </a:t>
+                </a:r>
+              </a:p>
+              <a:p>
+                <a14:m>
+                  <m:oMath xmlns:m="http://schemas.openxmlformats.org/officeDocument/2006/math">
+                    <m:r>
+                      <a:rPr lang="en-IN" b="0" i="1" smtClean="0">
+                        <a:latin typeface="Cambria Math" panose="02040503050406030204" pitchFamily="18" charset="0"/>
+                      </a:rPr>
+                      <m:t>𝑁</m:t>
+                    </m:r>
+                    <m:r>
+                      <a:rPr lang="en-IN" b="0" i="1" smtClean="0">
+                        <a:latin typeface="Cambria Math" panose="02040503050406030204" pitchFamily="18" charset="0"/>
+                      </a:rPr>
+                      <m:t> </m:t>
+                    </m:r>
+                  </m:oMath>
+                </a14:m>
+                <a:r>
+                  <a:rPr lang="en-IN" dirty="0"/>
+                  <a:t>= #Buses in the system.</a:t>
+                </a:r>
+              </a:p>
+              <a:p>
+                <a14:m>
+                  <m:oMath xmlns:m="http://schemas.openxmlformats.org/officeDocument/2006/math">
+                    <m:sSub>
+                      <m:sSubPr>
+                        <m:ctrlPr>
+                          <a:rPr lang="en-IN" b="0" i="1" smtClean="0">
+                            <a:latin typeface="Cambria Math" panose="02040503050406030204" pitchFamily="18" charset="0"/>
+                          </a:rPr>
+                        </m:ctrlPr>
+                      </m:sSubPr>
+                      <m:e>
+                        <m:r>
+                          <a:rPr lang="en-IN" b="0" i="1" smtClean="0">
+                            <a:latin typeface="Cambria Math" panose="02040503050406030204" pitchFamily="18" charset="0"/>
+                          </a:rPr>
+                          <m:t>𝑌</m:t>
+                        </m:r>
+                      </m:e>
+                      <m:sub>
+                        <m:r>
+                          <a:rPr lang="en-IN" b="0" i="1" smtClean="0">
+                            <a:latin typeface="Cambria Math" panose="02040503050406030204" pitchFamily="18" charset="0"/>
+                          </a:rPr>
+                          <m:t>𝐵𝑢𝑠</m:t>
+                        </m:r>
+                      </m:sub>
+                    </m:sSub>
+                    <m:r>
+                      <a:rPr lang="en-IN" b="0" i="1" smtClean="0">
+                        <a:latin typeface="Cambria Math" panose="02040503050406030204" pitchFamily="18" charset="0"/>
+                      </a:rPr>
+                      <m:t>=</m:t>
+                    </m:r>
+                    <m:r>
+                      <a:rPr lang="en-IN" b="0" i="1" smtClean="0">
+                        <a:latin typeface="Cambria Math" panose="02040503050406030204" pitchFamily="18" charset="0"/>
+                      </a:rPr>
+                      <m:t>𝑧𝑒𝑟𝑜𝑠</m:t>
+                    </m:r>
+                    <m:r>
+                      <a:rPr lang="en-IN" b="0" i="1" smtClean="0">
+                        <a:latin typeface="Cambria Math" panose="02040503050406030204" pitchFamily="18" charset="0"/>
+                      </a:rPr>
+                      <m:t>(</m:t>
+                    </m:r>
+                    <m:r>
+                      <a:rPr lang="en-IN" b="0" i="1" smtClean="0">
+                        <a:latin typeface="Cambria Math" panose="02040503050406030204" pitchFamily="18" charset="0"/>
+                      </a:rPr>
+                      <m:t>𝐶𝑜𝑚𝑝𝑙𝑒𝑥𝐹</m:t>
+                    </m:r>
+                    <m:r>
+                      <a:rPr lang="en-IN" b="0" i="1" smtClean="0">
+                        <a:latin typeface="Cambria Math" panose="02040503050406030204" pitchFamily="18" charset="0"/>
+                      </a:rPr>
+                      <m:t>64, </m:t>
+                    </m:r>
+                    <m:r>
+                      <a:rPr lang="en-IN" b="0" i="1" smtClean="0">
+                        <a:latin typeface="Cambria Math" panose="02040503050406030204" pitchFamily="18" charset="0"/>
+                      </a:rPr>
+                      <m:t>𝑁</m:t>
+                    </m:r>
+                    <m:r>
+                      <a:rPr lang="en-IN" b="0" i="1" smtClean="0">
+                        <a:latin typeface="Cambria Math" panose="02040503050406030204" pitchFamily="18" charset="0"/>
+                      </a:rPr>
+                      <m:t>, </m:t>
+                    </m:r>
+                    <m:r>
+                      <a:rPr lang="en-IN" b="0" i="1" smtClean="0">
+                        <a:latin typeface="Cambria Math" panose="02040503050406030204" pitchFamily="18" charset="0"/>
+                      </a:rPr>
+                      <m:t>𝑁</m:t>
+                    </m:r>
+                    <m:r>
+                      <a:rPr lang="en-IN" b="0" i="1" smtClean="0">
+                        <a:latin typeface="Cambria Math" panose="02040503050406030204" pitchFamily="18" charset="0"/>
+                      </a:rPr>
+                      <m:t>)</m:t>
+                    </m:r>
+                  </m:oMath>
+                </a14:m>
+                <a:endParaRPr lang="en-US" dirty="0"/>
+              </a:p>
+              <a:p>
+                <a:pPr lvl="1"/>
+                <a:r>
+                  <a:rPr lang="en-US" dirty="0"/>
+                  <a:t>means an </a:t>
+                </a:r>
+                <a14:m>
+                  <m:oMath xmlns:m="http://schemas.openxmlformats.org/officeDocument/2006/math">
+                    <m:r>
+                      <a:rPr lang="en-IN" b="0" i="1" smtClean="0">
+                        <a:latin typeface="Cambria Math" panose="02040503050406030204" pitchFamily="18" charset="0"/>
+                      </a:rPr>
+                      <m:t>𝑁</m:t>
+                    </m:r>
+                    <m:r>
+                      <a:rPr lang="en-IN" b="0" i="1" smtClean="0">
+                        <a:latin typeface="Cambria Math" panose="02040503050406030204" pitchFamily="18" charset="0"/>
+                      </a:rPr>
+                      <m:t>×</m:t>
+                    </m:r>
+                    <m:r>
+                      <a:rPr lang="en-IN" b="0" i="1" smtClean="0">
+                        <a:latin typeface="Cambria Math" panose="02040503050406030204" pitchFamily="18" charset="0"/>
+                      </a:rPr>
+                      <m:t>𝑁</m:t>
+                    </m:r>
+                  </m:oMath>
+                </a14:m>
+                <a:r>
+                  <a:rPr lang="en-US" dirty="0"/>
+                  <a:t> 2D Array (Julia also calls them as Matrix) which has complex doubles (64 bit), initialized with all zeros.</a:t>
+                </a:r>
+              </a:p>
+              <a:p>
+                <a:pPr lvl="1"/>
+                <a:r>
+                  <a:rPr lang="en-US" dirty="0"/>
+                  <a:t>It is the same as specifying </a:t>
+                </a:r>
+                <a14:m>
+                  <m:oMath xmlns:m="http://schemas.openxmlformats.org/officeDocument/2006/math">
+                    <m:sSub>
+                      <m:sSubPr>
+                        <m:ctrlPr>
+                          <a:rPr lang="en-IN" b="0" i="1" smtClean="0">
+                            <a:latin typeface="Cambria Math" panose="02040503050406030204" pitchFamily="18" charset="0"/>
+                          </a:rPr>
+                        </m:ctrlPr>
+                      </m:sSubPr>
+                      <m:e>
+                        <m:r>
+                          <a:rPr lang="en-IN" b="0" i="1" smtClean="0">
+                            <a:latin typeface="Cambria Math" panose="02040503050406030204" pitchFamily="18" charset="0"/>
+                          </a:rPr>
+                          <m:t>𝑌</m:t>
+                        </m:r>
+                      </m:e>
+                      <m:sub>
+                        <m:r>
+                          <a:rPr lang="en-IN" b="0" i="1" smtClean="0">
+                            <a:latin typeface="Cambria Math" panose="02040503050406030204" pitchFamily="18" charset="0"/>
+                          </a:rPr>
+                          <m:t>𝐵𝑢𝑠</m:t>
+                        </m:r>
+                      </m:sub>
+                    </m:sSub>
+                    <m:r>
+                      <a:rPr lang="en-IN" b="0" i="1" smtClean="0">
+                        <a:latin typeface="Cambria Math" panose="02040503050406030204" pitchFamily="18" charset="0"/>
+                      </a:rPr>
+                      <m:t>=</m:t>
+                    </m:r>
+                    <m:r>
+                      <m:rPr>
+                        <m:sty m:val="p"/>
+                      </m:rPr>
+                      <a:rPr lang="en-IN" b="0" i="1" dirty="0" smtClean="0">
+                        <a:latin typeface="Cambria Math" panose="02040503050406030204" pitchFamily="18" charset="0"/>
+                      </a:rPr>
+                      <m:t>Array</m:t>
+                    </m:r>
+                    <m:r>
+                      <a:rPr lang="en-IN" b="0" i="1" dirty="0" smtClean="0">
+                        <a:latin typeface="Cambria Math" panose="02040503050406030204" pitchFamily="18" charset="0"/>
+                      </a:rPr>
+                      <m:t>{</m:t>
+                    </m:r>
+                    <m:r>
+                      <m:rPr>
+                        <m:sty m:val="p"/>
+                      </m:rPr>
+                      <a:rPr lang="en-IN" b="0" i="1" dirty="0" smtClean="0">
+                        <a:latin typeface="Cambria Math" panose="02040503050406030204" pitchFamily="18" charset="0"/>
+                      </a:rPr>
+                      <m:t>Complex</m:t>
+                    </m:r>
+                    <m:r>
+                      <a:rPr lang="en-IN" b="0" i="1" dirty="0" smtClean="0">
+                        <a:latin typeface="Cambria Math" panose="02040503050406030204" pitchFamily="18" charset="0"/>
+                      </a:rPr>
+                      <m:t>{</m:t>
+                    </m:r>
+                    <m:r>
+                      <m:rPr>
+                        <m:sty m:val="p"/>
+                      </m:rPr>
+                      <a:rPr lang="en-IN" b="0" i="1" dirty="0" smtClean="0">
+                        <a:latin typeface="Cambria Math" panose="02040503050406030204" pitchFamily="18" charset="0"/>
+                      </a:rPr>
+                      <m:t>Float</m:t>
+                    </m:r>
+                    <m:r>
+                      <a:rPr lang="en-IN" b="0" i="1" dirty="0" smtClean="0">
+                        <a:latin typeface="Cambria Math" panose="02040503050406030204" pitchFamily="18" charset="0"/>
+                      </a:rPr>
+                      <m:t>64}}(</m:t>
+                    </m:r>
+                    <m:r>
+                      <m:rPr>
+                        <m:sty m:val="p"/>
+                      </m:rPr>
+                      <a:rPr lang="en-IN" b="0" i="1" dirty="0" smtClean="0">
+                        <a:latin typeface="Cambria Math" panose="02040503050406030204" pitchFamily="18" charset="0"/>
+                      </a:rPr>
+                      <m:t>undef</m:t>
+                    </m:r>
+                    <m:r>
+                      <a:rPr lang="en-IN" b="0" i="1" dirty="0" smtClean="0">
+                        <a:latin typeface="Cambria Math" panose="02040503050406030204" pitchFamily="18" charset="0"/>
+                      </a:rPr>
+                      <m:t>, </m:t>
+                    </m:r>
+                    <m:r>
+                      <m:rPr>
+                        <m:sty m:val="p"/>
+                      </m:rPr>
+                      <a:rPr lang="en-IN" b="0" i="1" dirty="0" smtClean="0">
+                        <a:latin typeface="Cambria Math" panose="02040503050406030204" pitchFamily="18" charset="0"/>
+                      </a:rPr>
+                      <m:t>N</m:t>
+                    </m:r>
+                    <m:r>
+                      <a:rPr lang="en-IN" b="0" i="1" dirty="0" smtClean="0">
+                        <a:latin typeface="Cambria Math" panose="02040503050406030204" pitchFamily="18" charset="0"/>
+                      </a:rPr>
+                      <m:t>, </m:t>
+                    </m:r>
+                    <m:r>
+                      <m:rPr>
+                        <m:sty m:val="p"/>
+                      </m:rPr>
+                      <a:rPr lang="en-IN" b="0" i="1" dirty="0" smtClean="0">
+                        <a:latin typeface="Cambria Math" panose="02040503050406030204" pitchFamily="18" charset="0"/>
+                      </a:rPr>
+                      <m:t>N</m:t>
+                    </m:r>
+                    <m:r>
+                      <a:rPr lang="en-IN" b="0" i="1" dirty="0" smtClean="0">
+                        <a:latin typeface="Cambria Math" panose="02040503050406030204" pitchFamily="18" charset="0"/>
+                      </a:rPr>
+                      <m:t>)</m:t>
+                    </m:r>
+                  </m:oMath>
+                </a14:m>
+                <a:endParaRPr lang="en-IN" dirty="0"/>
+              </a:p>
+              <a:p>
+                <a:pPr lvl="1"/>
+                <a:r>
+                  <a:rPr lang="en-IN" dirty="0"/>
+                  <a:t>For ‘fixed’ size data structures such as Arrays, initializing your elements with zeros is encouraged.</a:t>
+                </a:r>
+              </a:p>
+              <a:p>
+                <a:pPr marL="457200" lvl="1" indent="0">
+                  <a:buNone/>
+                </a:pPr>
+                <a:br>
+                  <a:rPr lang="en-US" dirty="0"/>
+                </a:br>
+                <a:endParaRPr lang="en-US" dirty="0"/>
+              </a:p>
+              <a:p>
+                <a:pPr marL="457200" lvl="1" indent="0">
+                  <a:buNone/>
+                </a:pPr>
+                <a:endParaRPr lang="en-US" dirty="0"/>
+              </a:p>
+              <a:p>
+                <a:pPr marL="457200" lvl="1" indent="0">
+                  <a:buNone/>
+                </a:pPr>
+                <a:endParaRPr lang="en-US" dirty="0"/>
+              </a:p>
+              <a:p>
+                <a:endParaRPr lang="en-IN" dirty="0"/>
+              </a:p>
+            </p:txBody>
+          </p:sp>
+        </mc:Choice>
+        <mc:Fallback xmlns="">
+          <p:sp>
+            <p:nvSpPr>
+              <p:cNvPr id="3" name="Content Placeholder 2">
+                <a:extLst>
+                  <a:ext uri="{FF2B5EF4-FFF2-40B4-BE49-F238E27FC236}">
+                    <a16:creationId xmlns:a16="http://schemas.microsoft.com/office/drawing/2014/main" id="{A4C39C92-5118-4B84-60E9-A471DBBECC0F}"/>
+                  </a:ext>
+                </a:extLst>
+              </p:cNvPr>
+              <p:cNvSpPr>
+                <a:spLocks noGrp="1" noRot="1" noChangeAspect="1" noMove="1" noResize="1" noEditPoints="1" noAdjustHandles="1" noChangeArrowheads="1" noChangeShapeType="1" noTextEdit="1"/>
+              </p:cNvSpPr>
+              <p:nvPr>
+                <p:ph idx="1"/>
+              </p:nvPr>
+            </p:nvSpPr>
+            <p:spPr>
+              <a:blipFill>
+                <a:blip r:embed="rId2"/>
+                <a:stretch>
+                  <a:fillRect l="-522" t="-2801" r="-232"/>
+                </a:stretch>
+              </a:blipFill>
+            </p:spPr>
+            <p:txBody>
+              <a:bodyPr/>
+              <a:lstStyle/>
+              <a:p>
+                <a:r>
+                  <a:rPr lang="en-IN">
+                    <a:noFill/>
+                  </a:rPr>
+                  <a:t> </a:t>
+                </a:r>
+              </a:p>
+            </p:txBody>
+          </p:sp>
+        </mc:Fallback>
+      </mc:AlternateContent>
     </p:spTree>
     <p:extLst>
       <p:ext uri="{BB962C8B-B14F-4D97-AF65-F5344CB8AC3E}">
-        <p14:creationId xmlns:p14="http://schemas.microsoft.com/office/powerpoint/2010/main" val="3614275470"/>
+        <p14:creationId xmlns:p14="http://schemas.microsoft.com/office/powerpoint/2010/main" val="201157547"/>
       </p:ext>
     </p:extLst>
   </p:cSld>
@@ -9659,6 +10255,345 @@
           <p:cNvPr id="2" name="Title 1">
             <a:extLst>
               <a:ext uri="{FF2B5EF4-FFF2-40B4-BE49-F238E27FC236}">
+                <a16:creationId xmlns:a16="http://schemas.microsoft.com/office/drawing/2014/main" id="{336429DC-BFF4-DD6A-7726-27957283ABBE}"/>
+              </a:ext>
+            </a:extLst>
+          </p:cNvPr>
+          <p:cNvSpPr>
+            <a:spLocks noGrp="1"/>
+          </p:cNvSpPr>
+          <p:nvPr>
+            <p:ph type="title"/>
+          </p:nvPr>
+        </p:nvSpPr>
+        <p:spPr/>
+        <p:txBody>
+          <a:bodyPr/>
+          <a:lstStyle/>
+          <a:p>
+            <a:r>
+              <a:rPr lang="en-IN"/>
+              <a:t>Starting Workflow – Project Interdependencies</a:t>
+            </a:r>
+            <a:endParaRPr lang="en-IN" dirty="0"/>
+          </a:p>
+        </p:txBody>
+      </p:sp>
+      <p:sp>
+        <p:nvSpPr>
+          <p:cNvPr id="3" name="Content Placeholder 2">
+            <a:extLst>
+              <a:ext uri="{FF2B5EF4-FFF2-40B4-BE49-F238E27FC236}">
+                <a16:creationId xmlns:a16="http://schemas.microsoft.com/office/drawing/2014/main" id="{D2B9B5CA-5713-90E9-1BF9-A83143000B32}"/>
+              </a:ext>
+            </a:extLst>
+          </p:cNvPr>
+          <p:cNvSpPr>
+            <a:spLocks noGrp="1"/>
+          </p:cNvSpPr>
+          <p:nvPr>
+            <p:ph idx="1"/>
+          </p:nvPr>
+        </p:nvSpPr>
+        <p:spPr/>
+        <p:txBody>
+          <a:bodyPr/>
+          <a:lstStyle/>
+          <a:p>
+            <a:r>
+              <a:rPr lang="en-IN" dirty="0"/>
+              <a:t>Having a working </a:t>
+            </a:r>
+            <a:r>
+              <a:rPr lang="en-IN" b="1" dirty="0">
+                <a:solidFill>
+                  <a:srgbClr val="002060"/>
+                </a:solidFill>
+              </a:rPr>
+              <a:t>P1: </a:t>
+            </a:r>
+            <a:r>
+              <a:rPr lang="en-IN" b="1" dirty="0" err="1">
+                <a:solidFill>
+                  <a:srgbClr val="002060"/>
+                </a:solidFill>
+              </a:rPr>
+              <a:t>PowerFlow</a:t>
+            </a:r>
+            <a:r>
+              <a:rPr lang="en-IN" b="1" dirty="0">
+                <a:solidFill>
+                  <a:srgbClr val="002060"/>
+                </a:solidFill>
+              </a:rPr>
+              <a:t> </a:t>
+            </a:r>
+            <a:r>
+              <a:rPr lang="en-IN" dirty="0"/>
+              <a:t>code is a prerequisite for a couple of other tasks: (</a:t>
+            </a:r>
+            <a:r>
+              <a:rPr lang="en-IN" b="1" dirty="0">
+                <a:solidFill>
+                  <a:schemeClr val="accent6">
+                    <a:lumMod val="75000"/>
+                  </a:schemeClr>
+                </a:solidFill>
+              </a:rPr>
+              <a:t>P4: </a:t>
+            </a:r>
+            <a:r>
+              <a:rPr lang="en-IN" b="1" dirty="0" err="1">
+                <a:solidFill>
+                  <a:schemeClr val="accent6">
+                    <a:lumMod val="75000"/>
+                  </a:schemeClr>
+                </a:solidFill>
+              </a:rPr>
+              <a:t>StateEstimation</a:t>
+            </a:r>
+            <a:r>
+              <a:rPr lang="en-IN" b="1" dirty="0">
+                <a:solidFill>
+                  <a:schemeClr val="accent2">
+                    <a:lumMod val="75000"/>
+                  </a:schemeClr>
+                </a:solidFill>
+              </a:rPr>
+              <a:t>, P5: </a:t>
+            </a:r>
+            <a:r>
+              <a:rPr lang="en-IN" b="1" dirty="0" err="1">
+                <a:solidFill>
+                  <a:schemeClr val="accent2">
+                    <a:lumMod val="75000"/>
+                  </a:schemeClr>
+                </a:solidFill>
+              </a:rPr>
+              <a:t>OptimalPowerFlow</a:t>
+            </a:r>
+            <a:r>
+              <a:rPr lang="en-IN" dirty="0"/>
+              <a:t>). </a:t>
+            </a:r>
+            <a:r>
+              <a:rPr lang="en-IN" sz="1400" dirty="0"/>
+              <a:t>NRPF only though.</a:t>
+            </a:r>
+            <a:endParaRPr lang="en-IN" dirty="0"/>
+          </a:p>
+          <a:p>
+            <a:r>
+              <a:rPr lang="en-IN" b="1" dirty="0">
+                <a:solidFill>
+                  <a:srgbClr val="C00000"/>
+                </a:solidFill>
+              </a:rPr>
+              <a:t>P3: ContinuationPowerFlow </a:t>
+            </a:r>
+            <a:r>
+              <a:rPr lang="en-IN" dirty="0"/>
+              <a:t>does NOT require the full implementation of </a:t>
+            </a:r>
+            <a:r>
+              <a:rPr lang="en-IN" b="1" dirty="0">
+                <a:solidFill>
+                  <a:srgbClr val="002060"/>
+                </a:solidFill>
+              </a:rPr>
+              <a:t>P1 </a:t>
+            </a:r>
+            <a:r>
+              <a:rPr lang="en-IN" i="1" dirty="0" err="1">
+                <a:solidFill>
+                  <a:srgbClr val="002060"/>
+                </a:solidFill>
+              </a:rPr>
+              <a:t>solveForPowerFlow</a:t>
+            </a:r>
+            <a:r>
+              <a:rPr lang="en-IN" dirty="0"/>
+              <a:t>, and can be done in parallel. </a:t>
+            </a:r>
+            <a:r>
+              <a:rPr lang="en-IN" sz="1600" dirty="0"/>
+              <a:t>Some functions from </a:t>
+            </a:r>
+            <a:r>
+              <a:rPr lang="en-IN" sz="1600" dirty="0">
+                <a:solidFill>
+                  <a:srgbClr val="002060"/>
+                </a:solidFill>
+              </a:rPr>
+              <a:t>P1, including construction of Jacobian,</a:t>
+            </a:r>
+            <a:r>
+              <a:rPr lang="en-IN" sz="1600" dirty="0"/>
+              <a:t> are required though.</a:t>
+            </a:r>
+            <a:endParaRPr lang="en-IN" dirty="0"/>
+          </a:p>
+          <a:p>
+            <a:r>
+              <a:rPr lang="en-IN" dirty="0"/>
+              <a:t>Only </a:t>
+            </a:r>
+            <a:r>
+              <a:rPr lang="en-IN" b="1" dirty="0">
+                <a:solidFill>
+                  <a:schemeClr val="bg2">
+                    <a:lumMod val="50000"/>
+                  </a:schemeClr>
+                </a:solidFill>
+              </a:rPr>
+              <a:t>P2: </a:t>
+            </a:r>
+            <a:r>
+              <a:rPr lang="en-IN" b="1" dirty="0" err="1">
+                <a:solidFill>
+                  <a:schemeClr val="bg2">
+                    <a:lumMod val="50000"/>
+                  </a:schemeClr>
+                </a:solidFill>
+              </a:rPr>
+              <a:t>SparsePowerFlow</a:t>
+            </a:r>
+            <a:r>
+              <a:rPr lang="en-IN" b="1" dirty="0">
+                <a:solidFill>
+                  <a:schemeClr val="bg2">
+                    <a:lumMod val="50000"/>
+                  </a:schemeClr>
+                </a:solidFill>
+              </a:rPr>
+              <a:t> </a:t>
+            </a:r>
+            <a:r>
+              <a:rPr lang="en-IN" dirty="0"/>
+              <a:t>is a completely independent task, and can be done in parallel. </a:t>
+            </a:r>
+            <a:r>
+              <a:rPr lang="en-IN" sz="2000" dirty="0"/>
+              <a:t>In fact it is not permissible to use any assets from the other projects.</a:t>
+            </a:r>
+          </a:p>
+          <a:p>
+            <a:r>
+              <a:rPr lang="en-IN" dirty="0"/>
+              <a:t>Once </a:t>
+            </a:r>
+            <a:r>
+              <a:rPr lang="en-IN" b="1" dirty="0">
+                <a:solidFill>
+                  <a:srgbClr val="002060"/>
+                </a:solidFill>
+              </a:rPr>
+              <a:t>P1</a:t>
+            </a:r>
+            <a:r>
+              <a:rPr lang="en-IN" dirty="0"/>
+              <a:t> is completed ALL other projects can be completed in parallel, </a:t>
+            </a:r>
+            <a:r>
+              <a:rPr lang="en-IN" dirty="0" err="1"/>
+              <a:t>i.e</a:t>
+            </a:r>
+            <a:r>
+              <a:rPr lang="en-IN" dirty="0"/>
+              <a:t> </a:t>
+            </a:r>
+            <a:r>
+              <a:rPr lang="en-IN" b="1" dirty="0">
+                <a:solidFill>
+                  <a:schemeClr val="bg2">
+                    <a:lumMod val="50000"/>
+                  </a:schemeClr>
+                </a:solidFill>
+              </a:rPr>
+              <a:t>P2</a:t>
+            </a:r>
+            <a:r>
+              <a:rPr lang="en-IN" dirty="0"/>
+              <a:t>, </a:t>
+            </a:r>
+            <a:r>
+              <a:rPr lang="en-IN" b="1" dirty="0">
+                <a:solidFill>
+                  <a:srgbClr val="C00000"/>
+                </a:solidFill>
+              </a:rPr>
+              <a:t>P3</a:t>
+            </a:r>
+            <a:r>
+              <a:rPr lang="en-IN" dirty="0"/>
+              <a:t>, </a:t>
+            </a:r>
+            <a:r>
+              <a:rPr lang="en-IN" b="1" dirty="0">
+                <a:solidFill>
+                  <a:schemeClr val="accent6">
+                    <a:lumMod val="75000"/>
+                  </a:schemeClr>
+                </a:solidFill>
+              </a:rPr>
+              <a:t>P4</a:t>
+            </a:r>
+            <a:r>
+              <a:rPr lang="en-IN" dirty="0"/>
+              <a:t> and </a:t>
+            </a:r>
+            <a:r>
+              <a:rPr lang="en-IN" b="1" dirty="0">
+                <a:solidFill>
+                  <a:schemeClr val="accent2">
+                    <a:lumMod val="75000"/>
+                  </a:schemeClr>
+                </a:solidFill>
+              </a:rPr>
+              <a:t>P5</a:t>
+            </a:r>
+            <a:r>
+              <a:rPr lang="en-IN" dirty="0"/>
+              <a:t> do NOT have any interdependencies.</a:t>
+            </a:r>
+          </a:p>
+        </p:txBody>
+      </p:sp>
+    </p:spTree>
+    <p:extLst>
+      <p:ext uri="{BB962C8B-B14F-4D97-AF65-F5344CB8AC3E}">
+        <p14:creationId xmlns:p14="http://schemas.microsoft.com/office/powerpoint/2010/main" val="3614275470"/>
+      </p:ext>
+    </p:extLst>
+  </p:cSld>
+  <p:clrMapOvr>
+    <a:masterClrMapping/>
+  </p:clrMapOvr>
+</p:sld>
+</file>
+
+<file path=ppt/slides/slide4.xml><?xml version="1.0" encoding="utf-8"?>
+<p:sld xmlns:a="http://schemas.openxmlformats.org/drawingml/2006/main" xmlns:r="http://schemas.openxmlformats.org/officeDocument/2006/relationships" xmlns:p="http://schemas.openxmlformats.org/presentationml/2006/main">
+  <p:cSld>
+    <p:spTree>
+      <p:nvGrpSpPr>
+        <p:cNvPr id="1" name=""/>
+        <p:cNvGrpSpPr/>
+        <p:nvPr/>
+      </p:nvGrpSpPr>
+      <p:grpSpPr>
+        <a:xfrm>
+          <a:off x="0" y="0"/>
+          <a:ext cx="0" cy="0"/>
+          <a:chOff x="0" y="0"/>
+          <a:chExt cx="0" cy="0"/>
+        </a:xfrm>
+      </p:grpSpPr>
+      <p:sp>
+        <p:nvSpPr>
+          <p:cNvPr id="2" name="Title 1">
+            <a:extLst>
+              <a:ext uri="{FF2B5EF4-FFF2-40B4-BE49-F238E27FC236}">
                 <a16:creationId xmlns:a16="http://schemas.microsoft.com/office/drawing/2014/main" id="{E3C2F43C-7AEF-F81D-5A1D-BA4D0EEFA722}"/>
               </a:ext>
             </a:extLst>
@@ -9881,7 +10816,7 @@
 </p:sld>
 </file>
 
-<file path=ppt/slides/slide4.xml><?xml version="1.0" encoding="utf-8"?>
+<file path=ppt/slides/slide5.xml><?xml version="1.0" encoding="utf-8"?>
 <p:sld xmlns:a="http://schemas.openxmlformats.org/drawingml/2006/main" xmlns:r="http://schemas.openxmlformats.org/officeDocument/2006/relationships" xmlns:p="http://schemas.openxmlformats.org/presentationml/2006/main">
   <p:cSld>
     <p:bg>
@@ -10183,7 +11118,7 @@
 </p:sld>
 </file>
 
-<file path=ppt/slides/slide5.xml><?xml version="1.0" encoding="utf-8"?>
+<file path=ppt/slides/slide6.xml><?xml version="1.0" encoding="utf-8"?>
 <p:sld xmlns:a="http://schemas.openxmlformats.org/drawingml/2006/main" xmlns:r="http://schemas.openxmlformats.org/officeDocument/2006/relationships" xmlns:p="http://schemas.openxmlformats.org/presentationml/2006/main">
   <p:cSld>
     <p:bg>
@@ -11036,7 +11971,7 @@
 </p:sld>
 </file>
 
-<file path=ppt/slides/slide6.xml><?xml version="1.0" encoding="utf-8"?>
+<file path=ppt/slides/slide7.xml><?xml version="1.0" encoding="utf-8"?>
 <p:sld xmlns:a="http://schemas.openxmlformats.org/drawingml/2006/main" xmlns:r="http://schemas.openxmlformats.org/officeDocument/2006/relationships" xmlns:p="http://schemas.openxmlformats.org/presentationml/2006/main">
   <p:cSld>
     <p:spTree>
@@ -11344,315 +12279,6 @@
     <p:extLst>
       <p:ext uri="{BB962C8B-B14F-4D97-AF65-F5344CB8AC3E}">
         <p14:creationId xmlns:p14="http://schemas.microsoft.com/office/powerpoint/2010/main" val="3677315932"/>
-      </p:ext>
-    </p:extLst>
-  </p:cSld>
-  <p:clrMapOvr>
-    <a:masterClrMapping/>
-  </p:clrMapOvr>
-</p:sld>
-</file>
-
-<file path=ppt/slides/slide7.xml><?xml version="1.0" encoding="utf-8"?>
-<p:sld xmlns:a="http://schemas.openxmlformats.org/drawingml/2006/main" xmlns:r="http://schemas.openxmlformats.org/officeDocument/2006/relationships" xmlns:p="http://schemas.openxmlformats.org/presentationml/2006/main">
-  <p:cSld>
-    <p:spTree>
-      <p:nvGrpSpPr>
-        <p:cNvPr id="1" name=""/>
-        <p:cNvGrpSpPr/>
-        <p:nvPr/>
-      </p:nvGrpSpPr>
-      <p:grpSpPr>
-        <a:xfrm>
-          <a:off x="0" y="0"/>
-          <a:ext cx="0" cy="0"/>
-          <a:chOff x="0" y="0"/>
-          <a:chExt cx="0" cy="0"/>
-        </a:xfrm>
-      </p:grpSpPr>
-      <p:sp>
-        <p:nvSpPr>
-          <p:cNvPr id="2" name="Title 1">
-            <a:extLst>
-              <a:ext uri="{FF2B5EF4-FFF2-40B4-BE49-F238E27FC236}">
-                <a16:creationId xmlns:a16="http://schemas.microsoft.com/office/drawing/2014/main" id="{A907B655-ADC6-0DB3-D40C-B4A4F02C56AD}"/>
-              </a:ext>
-            </a:extLst>
-          </p:cNvPr>
-          <p:cNvSpPr>
-            <a:spLocks noGrp="1"/>
-          </p:cNvSpPr>
-          <p:nvPr>
-            <p:ph type="title"/>
-          </p:nvPr>
-        </p:nvSpPr>
-        <p:spPr/>
-        <p:txBody>
-          <a:bodyPr/>
-          <a:lstStyle/>
-          <a:p>
-            <a:r>
-              <a:rPr lang="en-IN"/>
-              <a:t>Sample functions in modules</a:t>
-            </a:r>
-            <a:endParaRPr lang="en-IN" dirty="0"/>
-          </a:p>
-        </p:txBody>
-      </p:sp>
-      <p:sp>
-        <p:nvSpPr>
-          <p:cNvPr id="3" name="Content Placeholder 2">
-            <a:extLst>
-              <a:ext uri="{FF2B5EF4-FFF2-40B4-BE49-F238E27FC236}">
-                <a16:creationId xmlns:a16="http://schemas.microsoft.com/office/drawing/2014/main" id="{B248B06E-0246-4FEF-533A-B0C46C596083}"/>
-              </a:ext>
-            </a:extLst>
-          </p:cNvPr>
-          <p:cNvSpPr>
-            <a:spLocks noGrp="1"/>
-          </p:cNvSpPr>
-          <p:nvPr>
-            <p:ph idx="1"/>
-          </p:nvPr>
-        </p:nvSpPr>
-        <p:spPr/>
-        <p:txBody>
-          <a:bodyPr>
-            <a:normAutofit fontScale="92500" lnSpcReduction="10000"/>
-          </a:bodyPr>
-          <a:lstStyle/>
-          <a:p>
-            <a:r>
-              <a:rPr lang="en-IN" b="1" dirty="0">
-                <a:solidFill>
-                  <a:srgbClr val="002060"/>
-                </a:solidFill>
-              </a:rPr>
-              <a:t>P1: </a:t>
-            </a:r>
-            <a:r>
-              <a:rPr lang="en-IN" b="1" dirty="0" err="1">
-                <a:solidFill>
-                  <a:srgbClr val="002060"/>
-                </a:solidFill>
-              </a:rPr>
-              <a:t>NKGPowerFlow</a:t>
-            </a:r>
-            <a:endParaRPr lang="en-IN" b="1" dirty="0">
-              <a:solidFill>
-                <a:srgbClr val="002060"/>
-              </a:solidFill>
-            </a:endParaRPr>
-          </a:p>
-          <a:p>
-            <a:pPr lvl="1"/>
-            <a:r>
-              <a:rPr lang="en-IN" i="1" dirty="0" err="1"/>
-              <a:t>constructYBus</a:t>
-            </a:r>
-            <a:endParaRPr lang="en-IN" i="1" dirty="0"/>
-          </a:p>
-          <a:p>
-            <a:pPr lvl="1"/>
-            <a:r>
-              <a:rPr lang="en-IN" i="1" dirty="0" err="1"/>
-              <a:t>solveUsingPowerFlow</a:t>
-            </a:r>
-            <a:r>
-              <a:rPr lang="en-IN" dirty="0"/>
-              <a:t>: NRPF/FDPF  We can make it work for both </a:t>
-            </a:r>
-            <a:r>
-              <a:rPr lang="en-IN" dirty="0" err="1"/>
-              <a:t>powerFlowMethods</a:t>
-            </a:r>
-            <a:r>
-              <a:rPr lang="en-IN" dirty="0"/>
-              <a:t>: “NRPF” or “FDPF”.</a:t>
-            </a:r>
-          </a:p>
-          <a:p>
-            <a:pPr lvl="2"/>
-            <a:r>
-              <a:rPr lang="en-IN" i="1" dirty="0" err="1"/>
-              <a:t>initializeVectors</a:t>
-            </a:r>
-            <a:r>
-              <a:rPr lang="en-IN" i="1" dirty="0"/>
-              <a:t>: </a:t>
-            </a:r>
-            <a:r>
-              <a:rPr lang="en-IN" dirty="0"/>
-              <a:t>Handy function which reads [</a:t>
-            </a:r>
-            <a:r>
-              <a:rPr lang="en-IN" dirty="0" err="1"/>
-              <a:t>busData</a:t>
-            </a:r>
-            <a:r>
-              <a:rPr lang="en-IN" dirty="0"/>
-              <a:t>, </a:t>
-            </a:r>
-            <a:r>
-              <a:rPr lang="en-IN" dirty="0" err="1"/>
-              <a:t>branchData</a:t>
-            </a:r>
-            <a:r>
-              <a:rPr lang="en-IN" dirty="0"/>
-              <a:t>] and can retrieve highly used parameter values like </a:t>
-            </a:r>
-            <a:r>
-              <a:rPr lang="en-IN" dirty="0" err="1"/>
-              <a:t>listOfPVBuses</a:t>
-            </a:r>
-            <a:r>
-              <a:rPr lang="en-IN" dirty="0"/>
-              <a:t>, </a:t>
-            </a:r>
-            <a:r>
-              <a:rPr lang="en-IN" dirty="0" err="1"/>
-              <a:t>nPQ</a:t>
-            </a:r>
-            <a:r>
-              <a:rPr lang="en-IN" dirty="0"/>
-              <a:t> (#PQ Buses), </a:t>
-            </a:r>
-            <a:r>
-              <a:rPr lang="en-IN" dirty="0" err="1"/>
-              <a:t>PSpecified</a:t>
-            </a:r>
-            <a:r>
-              <a:rPr lang="en-IN" dirty="0"/>
-              <a:t>, etc.</a:t>
-            </a:r>
-          </a:p>
-          <a:p>
-            <a:pPr lvl="2"/>
-            <a:r>
-              <a:rPr lang="en-IN" i="1" dirty="0" err="1"/>
-              <a:t>computeBusInjections</a:t>
-            </a:r>
-            <a:r>
-              <a:rPr lang="en-IN" i="1" dirty="0"/>
-              <a:t>: calculate </a:t>
-            </a:r>
-            <a:r>
-              <a:rPr lang="en-IN" i="1" dirty="0" err="1"/>
-              <a:t>P_i</a:t>
-            </a:r>
-            <a:r>
-              <a:rPr lang="en-IN" i="1" dirty="0"/>
-              <a:t> and </a:t>
-            </a:r>
-            <a:r>
-              <a:rPr lang="en-IN" i="1" dirty="0" err="1"/>
-              <a:t>Q_i</a:t>
-            </a:r>
-            <a:endParaRPr lang="en-IN" i="1" dirty="0"/>
-          </a:p>
-          <a:p>
-            <a:pPr lvl="2"/>
-            <a:r>
-              <a:rPr lang="en-IN" i="1" dirty="0" err="1"/>
-              <a:t>computeMismatches</a:t>
-            </a:r>
-            <a:r>
-              <a:rPr lang="en-IN" dirty="0"/>
-              <a:t>: NRPF/FDPF a simple function which calculates mismatches (for every Powerflow iteration) by first computing power injections. Helpful in creation of diagonal Jacobian elements too.</a:t>
-            </a:r>
-          </a:p>
-          <a:p>
-            <a:pPr lvl="2"/>
-            <a:r>
-              <a:rPr lang="en-IN" i="1" dirty="0" err="1"/>
-              <a:t>constructJacobian</a:t>
-            </a:r>
-            <a:r>
-              <a:rPr lang="en-IN" dirty="0"/>
-              <a:t>: NRPF/FDPF Compute J11, J22 (and J12, J21 and J in case of NRPF)</a:t>
-            </a:r>
-          </a:p>
-          <a:p>
-            <a:pPr lvl="2"/>
-            <a:r>
-              <a:rPr lang="en-IN" i="1" dirty="0" err="1"/>
-              <a:t>solveUsingLU</a:t>
-            </a:r>
-            <a:r>
-              <a:rPr lang="en-IN" dirty="0"/>
-              <a:t>: Using given Jacobian (J11/J) and mismatch vector (</a:t>
-            </a:r>
-            <a:r>
-              <a:rPr lang="en-IN" dirty="0" err="1"/>
-              <a:t>delP</a:t>
-            </a:r>
-            <a:r>
-              <a:rPr lang="en-IN" dirty="0"/>
-              <a:t>/[</a:t>
-            </a:r>
-            <a:r>
-              <a:rPr lang="en-IN" dirty="0" err="1"/>
-              <a:t>delP</a:t>
-            </a:r>
-            <a:r>
-              <a:rPr lang="en-IN" dirty="0"/>
-              <a:t>; </a:t>
-            </a:r>
-            <a:r>
-              <a:rPr lang="en-IN" dirty="0" err="1"/>
-              <a:t>delQ</a:t>
-            </a:r>
-            <a:r>
-              <a:rPr lang="en-IN" dirty="0"/>
-              <a:t>]), compute correction vector (</a:t>
-            </a:r>
-            <a:r>
-              <a:rPr lang="en-IN" dirty="0" err="1"/>
-              <a:t>delDelta</a:t>
-            </a:r>
-            <a:r>
-              <a:rPr lang="en-IN" dirty="0"/>
-              <a:t>/[</a:t>
-            </a:r>
-            <a:r>
-              <a:rPr lang="en-IN" dirty="0" err="1"/>
-              <a:t>delDeltas</a:t>
-            </a:r>
-            <a:r>
-              <a:rPr lang="en-IN" dirty="0"/>
-              <a:t>; </a:t>
-            </a:r>
-            <a:r>
-              <a:rPr lang="en-IN" dirty="0" err="1"/>
-              <a:t>delV</a:t>
-            </a:r>
-            <a:r>
-              <a:rPr lang="en-IN" dirty="0"/>
-              <a:t>]).</a:t>
-            </a:r>
-          </a:p>
-          <a:p>
-            <a:pPr lvl="3"/>
-            <a:r>
-              <a:rPr lang="en-IN" dirty="0" err="1"/>
-              <a:t>solveUsingForwardSubstitution</a:t>
-            </a:r>
-            <a:endParaRPr lang="en-IN" dirty="0"/>
-          </a:p>
-          <a:p>
-            <a:pPr lvl="3"/>
-            <a:r>
-              <a:rPr lang="en-IN" dirty="0" err="1"/>
-              <a:t>solveUsingBackwardSubstituion</a:t>
-            </a:r>
-            <a:endParaRPr lang="en-IN" i="1" dirty="0"/>
-          </a:p>
-        </p:txBody>
-      </p:sp>
-    </p:spTree>
-    <p:extLst>
-      <p:ext uri="{BB962C8B-B14F-4D97-AF65-F5344CB8AC3E}">
-        <p14:creationId xmlns:p14="http://schemas.microsoft.com/office/powerpoint/2010/main" val="2074898235"/>
       </p:ext>
     </p:extLst>
   </p:cSld>
@@ -11701,9 +12327,10 @@
           <a:lstStyle/>
           <a:p>
             <a:r>
-              <a:rPr lang="en-IN" dirty="0"/>
+              <a:rPr lang="en-IN"/>
               <a:t>Sample functions in modules</a:t>
             </a:r>
+            <a:endParaRPr lang="en-IN" dirty="0"/>
           </a:p>
         </p:txBody>
       </p:sp>
@@ -11726,7 +12353,7 @@
         <p:spPr/>
         <p:txBody>
           <a:bodyPr>
-            <a:normAutofit/>
+            <a:normAutofit fontScale="92500" lnSpcReduction="10000"/>
           </a:bodyPr>
           <a:lstStyle/>
           <a:p>
@@ -11746,94 +12373,221 @@
               </a:rPr>
               <a:t>NKGPowerFlow</a:t>
             </a:r>
-            <a:r>
-              <a:rPr lang="en-IN" b="1" dirty="0">
-                <a:solidFill>
-                  <a:srgbClr val="002060"/>
-                </a:solidFill>
-              </a:rPr>
-              <a:t> </a:t>
-            </a:r>
-            <a:r>
-              <a:rPr lang="en-IN" dirty="0"/>
-              <a:t>(contd.)</a:t>
-            </a:r>
-          </a:p>
-          <a:p>
-            <a:pPr lvl="1"/>
-            <a:r>
-              <a:rPr lang="en-IN" i="1" dirty="0" err="1"/>
-              <a:t>displayPowerFlowResults</a:t>
-            </a:r>
-            <a:r>
-              <a:rPr lang="en-IN" i="1" dirty="0"/>
-              <a:t>: </a:t>
-            </a:r>
-            <a:r>
-              <a:rPr lang="en-IN" dirty="0"/>
-              <a:t>A neat table containing [V, delta, P, Q] with easy to see rows called as ‘Bus 01’, ‘Bus 02’ …</a:t>
-            </a:r>
-          </a:p>
-          <a:p>
-            <a:pPr lvl="1"/>
-            <a:r>
-              <a:rPr lang="en-IN" i="1" dirty="0" err="1"/>
-              <a:t>plotPowerFlowResults</a:t>
-            </a:r>
-            <a:r>
-              <a:rPr lang="en-IN" i="1" dirty="0"/>
-              <a:t>: </a:t>
-            </a:r>
-            <a:r>
-              <a:rPr lang="en-IN" dirty="0"/>
-              <a:t>Compare your own results to the results in the CDF file, via two plots:</a:t>
-            </a:r>
-          </a:p>
-          <a:p>
-            <a:pPr lvl="2"/>
-            <a:r>
-              <a:rPr lang="en-IN" dirty="0"/>
-              <a:t>Relative percentage difference in </a:t>
-            </a:r>
-            <a:r>
-              <a:rPr lang="en-IN" dirty="0" err="1"/>
-              <a:t>pu</a:t>
-            </a:r>
-            <a:r>
-              <a:rPr lang="en-IN" dirty="0"/>
-              <a:t> Voltages</a:t>
-            </a:r>
-          </a:p>
-          <a:p>
-            <a:pPr lvl="2"/>
-            <a:r>
-              <a:rPr lang="en-IN" dirty="0"/>
-              <a:t>absolute difference in delta values.</a:t>
-            </a:r>
-          </a:p>
-          <a:p>
-            <a:r>
-              <a:rPr lang="en-IN" dirty="0">
-                <a:solidFill>
-                  <a:srgbClr val="C00000"/>
-                </a:solidFill>
-              </a:rPr>
-              <a:t>Caveat: Bus Switching is optional for evaluation, though in general not implementing it for bigger systems will lead to incorrect outcomes or even divergence.</a:t>
-            </a:r>
-          </a:p>
-          <a:p>
             <a:endParaRPr lang="en-IN" b="1" dirty="0">
               <a:solidFill>
                 <a:srgbClr val="002060"/>
               </a:solidFill>
             </a:endParaRPr>
           </a:p>
+          <a:p>
+            <a:pPr lvl="1"/>
+            <a:r>
+              <a:rPr lang="en-IN" i="1" dirty="0" err="1"/>
+              <a:t>constructYBus</a:t>
+            </a:r>
+            <a:endParaRPr lang="en-IN" i="1" dirty="0"/>
+          </a:p>
+          <a:p>
+            <a:pPr lvl="1"/>
+            <a:r>
+              <a:rPr lang="en-IN" i="1" dirty="0" err="1"/>
+              <a:t>solveUsingPowerFlow</a:t>
+            </a:r>
+            <a:r>
+              <a:rPr lang="en-IN" dirty="0"/>
+              <a:t>: NRPF/FDPF  We can make it work for both </a:t>
+            </a:r>
+            <a:r>
+              <a:rPr lang="en-IN" dirty="0" err="1"/>
+              <a:t>powerFlowMethods</a:t>
+            </a:r>
+            <a:r>
+              <a:rPr lang="en-IN" dirty="0"/>
+              <a:t>: “NRPF” or “FDPF”.</a:t>
+            </a:r>
+          </a:p>
+          <a:p>
+            <a:pPr lvl="2"/>
+            <a:r>
+              <a:rPr lang="en-IN" i="1" dirty="0" err="1"/>
+              <a:t>initializeVectors</a:t>
+            </a:r>
+            <a:r>
+              <a:rPr lang="en-IN" i="1" dirty="0"/>
+              <a:t>: </a:t>
+            </a:r>
+            <a:r>
+              <a:rPr lang="en-IN" dirty="0"/>
+              <a:t>Handy function which reads [</a:t>
+            </a:r>
+            <a:r>
+              <a:rPr lang="en-IN" dirty="0" err="1"/>
+              <a:t>busData</a:t>
+            </a:r>
+            <a:r>
+              <a:rPr lang="en-IN" dirty="0"/>
+              <a:t>, </a:t>
+            </a:r>
+            <a:r>
+              <a:rPr lang="en-IN" dirty="0" err="1"/>
+              <a:t>branchData</a:t>
+            </a:r>
+            <a:r>
+              <a:rPr lang="en-IN" dirty="0"/>
+              <a:t>] and can retrieve highly used parameter values like </a:t>
+            </a:r>
+            <a:r>
+              <a:rPr lang="en-IN" dirty="0" err="1"/>
+              <a:t>listOfPVBuses</a:t>
+            </a:r>
+            <a:r>
+              <a:rPr lang="en-IN" dirty="0"/>
+              <a:t>, </a:t>
+            </a:r>
+            <a:r>
+              <a:rPr lang="en-IN" dirty="0" err="1"/>
+              <a:t>nPQ</a:t>
+            </a:r>
+            <a:r>
+              <a:rPr lang="en-IN" dirty="0"/>
+              <a:t> (#PQ Buses), </a:t>
+            </a:r>
+            <a:r>
+              <a:rPr lang="en-IN" dirty="0" err="1"/>
+              <a:t>PSpecified</a:t>
+            </a:r>
+            <a:r>
+              <a:rPr lang="en-IN" dirty="0"/>
+              <a:t>, etc.</a:t>
+            </a:r>
+          </a:p>
+          <a:p>
+            <a:pPr lvl="2"/>
+            <a:r>
+              <a:rPr lang="en-IN" i="1" dirty="0" err="1"/>
+              <a:t>computeBusInjections</a:t>
+            </a:r>
+            <a:r>
+              <a:rPr lang="en-IN" i="1" dirty="0"/>
+              <a:t>: calculate </a:t>
+            </a:r>
+            <a:r>
+              <a:rPr lang="en-IN" i="1" dirty="0" err="1"/>
+              <a:t>P_i</a:t>
+            </a:r>
+            <a:r>
+              <a:rPr lang="en-IN" i="1" dirty="0"/>
+              <a:t> and </a:t>
+            </a:r>
+            <a:r>
+              <a:rPr lang="en-IN" i="1" dirty="0" err="1"/>
+              <a:t>Q_i</a:t>
+            </a:r>
+            <a:endParaRPr lang="en-IN" i="1" dirty="0"/>
+          </a:p>
+          <a:p>
+            <a:pPr lvl="2"/>
+            <a:r>
+              <a:rPr lang="en-IN" i="1" dirty="0" err="1"/>
+              <a:t>computeMismatches</a:t>
+            </a:r>
+            <a:r>
+              <a:rPr lang="en-IN" dirty="0"/>
+              <a:t>: NRPF/FDPF a simple function which calculates mismatches (for every Powerflow iteration) by first computing power injections. Helpful in creation of diagonal Jacobian elements too.</a:t>
+            </a:r>
+          </a:p>
+          <a:p>
+            <a:pPr lvl="2"/>
+            <a:r>
+              <a:rPr lang="en-IN" i="1" dirty="0" err="1"/>
+              <a:t>constructJacobian</a:t>
+            </a:r>
+            <a:r>
+              <a:rPr lang="en-IN" dirty="0"/>
+              <a:t>: NRPF/FDPF Compute J11, J22 (and J12, J21 and J in case of NRPF)</a:t>
+            </a:r>
+          </a:p>
+          <a:p>
+            <a:pPr lvl="2"/>
+            <a:r>
+              <a:rPr lang="en-IN" i="1" dirty="0" err="1"/>
+              <a:t>solveUsingLU</a:t>
+            </a:r>
+            <a:r>
+              <a:rPr lang="en-IN" dirty="0"/>
+              <a:t>: Using given Jacobian (J11/J) and mismatch vector (</a:t>
+            </a:r>
+            <a:r>
+              <a:rPr lang="en-IN" dirty="0" err="1"/>
+              <a:t>delP</a:t>
+            </a:r>
+            <a:r>
+              <a:rPr lang="en-IN" dirty="0"/>
+              <a:t>/[</a:t>
+            </a:r>
+            <a:r>
+              <a:rPr lang="en-IN" dirty="0" err="1"/>
+              <a:t>delP</a:t>
+            </a:r>
+            <a:r>
+              <a:rPr lang="en-IN" dirty="0"/>
+              <a:t>; </a:t>
+            </a:r>
+            <a:r>
+              <a:rPr lang="en-IN" dirty="0" err="1"/>
+              <a:t>delQ</a:t>
+            </a:r>
+            <a:r>
+              <a:rPr lang="en-IN" dirty="0"/>
+              <a:t>]), compute correction vector (</a:t>
+            </a:r>
+            <a:r>
+              <a:rPr lang="en-IN" dirty="0" err="1"/>
+              <a:t>delDelta</a:t>
+            </a:r>
+            <a:r>
+              <a:rPr lang="en-IN" dirty="0"/>
+              <a:t>/[</a:t>
+            </a:r>
+            <a:r>
+              <a:rPr lang="en-IN" dirty="0" err="1"/>
+              <a:t>delDeltas</a:t>
+            </a:r>
+            <a:r>
+              <a:rPr lang="en-IN" dirty="0"/>
+              <a:t>; </a:t>
+            </a:r>
+            <a:r>
+              <a:rPr lang="en-IN" dirty="0" err="1"/>
+              <a:t>delV</a:t>
+            </a:r>
+            <a:r>
+              <a:rPr lang="en-IN" dirty="0"/>
+              <a:t>]).</a:t>
+            </a:r>
+          </a:p>
+          <a:p>
+            <a:pPr lvl="3"/>
+            <a:r>
+              <a:rPr lang="en-IN" dirty="0" err="1"/>
+              <a:t>solveUsingForwardSubstitution</a:t>
+            </a:r>
+            <a:endParaRPr lang="en-IN" dirty="0"/>
+          </a:p>
+          <a:p>
+            <a:pPr lvl="3"/>
+            <a:r>
+              <a:rPr lang="en-IN" dirty="0" err="1"/>
+              <a:t>solveUsingBackwardSubstituion</a:t>
+            </a:r>
+            <a:endParaRPr lang="en-IN" i="1" dirty="0"/>
+          </a:p>
         </p:txBody>
       </p:sp>
     </p:spTree>
     <p:extLst>
       <p:ext uri="{BB962C8B-B14F-4D97-AF65-F5344CB8AC3E}">
-        <p14:creationId xmlns:p14="http://schemas.microsoft.com/office/powerpoint/2010/main" val="3009292720"/>
+        <p14:creationId xmlns:p14="http://schemas.microsoft.com/office/powerpoint/2010/main" val="2074898235"/>
       </p:ext>
     </p:extLst>
   </p:cSld>
@@ -11907,329 +12661,90 @@
         <p:spPr/>
         <p:txBody>
           <a:bodyPr>
-            <a:normAutofit fontScale="70000" lnSpcReduction="20000"/>
+            <a:normAutofit/>
           </a:bodyPr>
           <a:lstStyle/>
           <a:p>
             <a:r>
               <a:rPr lang="en-IN" b="1" dirty="0">
                 <a:solidFill>
-                  <a:schemeClr val="bg2">
-                    <a:lumMod val="50000"/>
-                  </a:schemeClr>
+                  <a:srgbClr val="002060"/>
                 </a:solidFill>
               </a:rPr>
-              <a:t>P2: </a:t>
+              <a:t>P1: </a:t>
             </a:r>
             <a:r>
               <a:rPr lang="en-IN" b="1" dirty="0" err="1">
                 <a:solidFill>
-                  <a:schemeClr val="bg2">
-                    <a:lumMod val="50000"/>
-                  </a:schemeClr>
+                  <a:srgbClr val="002060"/>
                 </a:solidFill>
               </a:rPr>
-              <a:t>NKGSparsePowerFlow</a:t>
-            </a:r>
-            <a:endParaRPr lang="en-IN" b="1" dirty="0">
-              <a:solidFill>
-                <a:schemeClr val="bg2">
-                  <a:lumMod val="50000"/>
-                </a:schemeClr>
-              </a:solidFill>
-            </a:endParaRPr>
-          </a:p>
-          <a:p>
+              <a:t>NKGPowerFlow</a:t>
+            </a:r>
+            <a:r>
+              <a:rPr lang="en-IN" b="1" dirty="0">
+                <a:solidFill>
+                  <a:srgbClr val="002060"/>
+                </a:solidFill>
+              </a:rPr>
+              <a:t> </a:t>
+            </a:r>
             <a:r>
               <a:rPr lang="en-IN" dirty="0"/>
-              <a:t>Need to rethink all implementations (check Caveat).</a:t>
-            </a:r>
-          </a:p>
-          <a:p>
+              <a:t>(contd.)</a:t>
+            </a:r>
+          </a:p>
+          <a:p>
+            <a:pPr lvl="1"/>
+            <a:r>
+              <a:rPr lang="en-IN" i="1" dirty="0" err="1"/>
+              <a:t>displayPowerFlowResults</a:t>
+            </a:r>
+            <a:r>
+              <a:rPr lang="en-IN" i="1" dirty="0"/>
+              <a:t>: </a:t>
+            </a:r>
             <a:r>
               <a:rPr lang="en-IN" dirty="0"/>
-              <a:t>function</a:t>
+              <a:t>A neat table containing [V, delta, P, Q] with easy to see rows called as ‘Bus 01’, ‘Bus 02’ …</a:t>
+            </a:r>
+          </a:p>
+          <a:p>
+            <a:pPr lvl="1"/>
+            <a:r>
+              <a:rPr lang="en-IN" i="1" dirty="0" err="1"/>
+              <a:t>plotPowerFlowResults</a:t>
             </a:r>
             <a:r>
               <a:rPr lang="en-IN" i="1" dirty="0"/>
-              <a:t> [</a:t>
-            </a:r>
-            <a:r>
-              <a:rPr lang="en-IN" i="1" dirty="0" err="1"/>
-              <a:t>nnzYBus</a:t>
-            </a:r>
-            <a:r>
-              <a:rPr lang="en-IN" i="1" dirty="0"/>
-              <a:t>, </a:t>
-            </a:r>
-            <a:r>
-              <a:rPr lang="en-IN" i="1" dirty="0" err="1"/>
-              <a:t>NYBus</a:t>
-            </a:r>
-            <a:r>
-              <a:rPr lang="en-IN" i="1" dirty="0"/>
-              <a:t>] = </a:t>
-            </a:r>
-            <a:r>
-              <a:rPr lang="en-IN" i="1" dirty="0" err="1"/>
-              <a:t>makeSparseYBus</a:t>
-            </a:r>
-            <a:r>
-              <a:rPr lang="en-IN" i="1" dirty="0"/>
-              <a:t>(</a:t>
-            </a:r>
-            <a:r>
-              <a:rPr lang="en-IN" i="1" dirty="0" err="1"/>
-              <a:t>busData</a:t>
-            </a:r>
-            <a:r>
-              <a:rPr lang="en-IN" i="1" dirty="0"/>
-              <a:t>, </a:t>
-            </a:r>
-            <a:r>
-              <a:rPr lang="en-IN" i="1" dirty="0" err="1"/>
-              <a:t>branchData</a:t>
-            </a:r>
-            <a:r>
-              <a:rPr lang="en-IN" i="1" dirty="0"/>
-              <a:t>)</a:t>
-            </a:r>
-          </a:p>
-          <a:p>
-            <a:pPr lvl="1"/>
-            <a:r>
-              <a:rPr lang="en-IN" i="1" dirty="0"/>
-              <a:t>[</a:t>
-            </a:r>
-            <a:r>
-              <a:rPr lang="en-IN" i="1" dirty="0" err="1"/>
-              <a:t>iYBus</a:t>
-            </a:r>
-            <a:r>
-              <a:rPr lang="en-IN" i="1" dirty="0"/>
-              <a:t>, </a:t>
-            </a:r>
-            <a:r>
-              <a:rPr lang="en-IN" i="1" dirty="0" err="1"/>
-              <a:t>jYBus</a:t>
-            </a:r>
-            <a:r>
-              <a:rPr lang="en-IN" i="1" dirty="0"/>
-              <a:t>, </a:t>
-            </a:r>
-            <a:r>
-              <a:rPr lang="en-IN" i="1" dirty="0" err="1"/>
-              <a:t>valYBus</a:t>
-            </a:r>
-            <a:r>
-              <a:rPr lang="en-IN" i="1" dirty="0"/>
-              <a:t>] = </a:t>
-            </a:r>
-            <a:r>
-              <a:rPr lang="en-IN" i="1" dirty="0" err="1"/>
-              <a:t>constructSparseYBusTable</a:t>
-            </a:r>
-            <a:r>
-              <a:rPr lang="en-IN" i="1" dirty="0"/>
-              <a:t>(</a:t>
-            </a:r>
-            <a:r>
-              <a:rPr lang="en-IN" i="1" dirty="0" err="1"/>
-              <a:t>busData</a:t>
-            </a:r>
-            <a:r>
-              <a:rPr lang="en-IN" i="1" dirty="0"/>
-              <a:t>, </a:t>
-            </a:r>
-            <a:r>
-              <a:rPr lang="en-IN" i="1" dirty="0" err="1"/>
-              <a:t>branchData</a:t>
-            </a:r>
-            <a:r>
-              <a:rPr lang="en-IN" i="1" dirty="0"/>
-              <a:t>)</a:t>
-            </a:r>
-          </a:p>
-          <a:p>
-            <a:pPr lvl="1"/>
-            <a:r>
-              <a:rPr lang="en-IN" i="1" dirty="0"/>
-              <a:t>[</a:t>
-            </a:r>
-            <a:r>
-              <a:rPr lang="en-IN" i="1" dirty="0" err="1"/>
-              <a:t>nnz</a:t>
-            </a:r>
-            <a:r>
-              <a:rPr lang="en-IN" i="1" dirty="0"/>
-              <a:t>, N] = </a:t>
-            </a:r>
-            <a:r>
-              <a:rPr lang="en-IN" i="1" dirty="0" err="1"/>
-              <a:t>sparmat</a:t>
-            </a:r>
-            <a:r>
-              <a:rPr lang="en-IN" i="1" dirty="0"/>
-              <a:t>([</a:t>
-            </a:r>
-            <a:r>
-              <a:rPr lang="en-IN" i="1" dirty="0" err="1"/>
-              <a:t>i</a:t>
-            </a:r>
-            <a:r>
-              <a:rPr lang="en-IN" i="1" dirty="0"/>
-              <a:t>, j, </a:t>
-            </a:r>
-            <a:r>
-              <a:rPr lang="en-IN" i="1" dirty="0" err="1"/>
-              <a:t>val</a:t>
-            </a:r>
-            <a:r>
-              <a:rPr lang="en-IN" i="1" dirty="0"/>
-              <a:t>])</a:t>
-            </a:r>
-          </a:p>
-          <a:p>
+              <a:t>: </a:t>
+            </a:r>
             <a:r>
               <a:rPr lang="en-IN" dirty="0"/>
-              <a:t>function </a:t>
-            </a:r>
-            <a:r>
-              <a:rPr lang="en-IN" i="1" dirty="0"/>
-              <a:t>[</a:t>
-            </a:r>
-            <a:r>
-              <a:rPr lang="en-IN" i="1" dirty="0" err="1"/>
-              <a:t>deltaP</a:t>
-            </a:r>
-            <a:r>
-              <a:rPr lang="en-IN" i="1" dirty="0"/>
-              <a:t>, </a:t>
-            </a:r>
-            <a:r>
-              <a:rPr lang="en-IN" i="1" dirty="0" err="1"/>
-              <a:t>deltaQ</a:t>
-            </a:r>
-            <a:r>
-              <a:rPr lang="en-IN" i="1" dirty="0"/>
-              <a:t>] = </a:t>
-            </a:r>
-            <a:r>
-              <a:rPr lang="en-IN" i="1" dirty="0" err="1"/>
-              <a:t>computeMismatchesViaSparseYBus</a:t>
-            </a:r>
-            <a:r>
-              <a:rPr lang="en-IN" i="1" dirty="0"/>
-              <a:t>(</a:t>
-            </a:r>
-            <a:r>
-              <a:rPr lang="en-IN" i="1" dirty="0" err="1"/>
-              <a:t>nnzYBus</a:t>
-            </a:r>
-            <a:r>
-              <a:rPr lang="en-IN" i="1" dirty="0"/>
-              <a:t>, </a:t>
-            </a:r>
-            <a:r>
-              <a:rPr lang="en-IN" i="1" dirty="0" err="1"/>
-              <a:t>NYBus</a:t>
-            </a:r>
-            <a:r>
-              <a:rPr lang="en-IN" i="1" dirty="0"/>
-              <a:t>, ..)</a:t>
-            </a:r>
-          </a:p>
-          <a:p>
-            <a:r>
-              <a:rPr lang="en-IN" i="1" dirty="0"/>
-              <a:t>function [</a:t>
-            </a:r>
-            <a:r>
-              <a:rPr lang="en-IN" i="1" dirty="0" err="1"/>
-              <a:t>nnzJ</a:t>
-            </a:r>
-            <a:r>
-              <a:rPr lang="en-IN" i="1" dirty="0"/>
-              <a:t>, NJ] = </a:t>
-            </a:r>
-            <a:r>
-              <a:rPr lang="en-IN" i="1" dirty="0" err="1"/>
-              <a:t>constructSparseJacobian</a:t>
-            </a:r>
-            <a:r>
-              <a:rPr lang="en-IN" i="1" dirty="0"/>
-              <a:t>(</a:t>
-            </a:r>
-            <a:r>
-              <a:rPr lang="en-IN" i="1" dirty="0" err="1"/>
-              <a:t>nnzYBus</a:t>
-            </a:r>
-            <a:r>
-              <a:rPr lang="en-IN" i="1" dirty="0"/>
-              <a:t>, </a:t>
-            </a:r>
-            <a:r>
-              <a:rPr lang="en-IN" i="1" dirty="0" err="1"/>
-              <a:t>NYBus</a:t>
-            </a:r>
-            <a:r>
-              <a:rPr lang="en-IN" i="1" dirty="0"/>
-              <a:t>, …)</a:t>
-            </a:r>
-          </a:p>
-          <a:p>
-            <a:r>
-              <a:rPr lang="en-IN" i="1" dirty="0"/>
-              <a:t>[</a:t>
-            </a:r>
-            <a:r>
-              <a:rPr lang="en-IN" i="1" dirty="0" err="1"/>
-              <a:t>nnzL</a:t>
-            </a:r>
-            <a:r>
-              <a:rPr lang="en-IN" i="1" dirty="0"/>
-              <a:t>, NL, </a:t>
-            </a:r>
-            <a:r>
-              <a:rPr lang="en-IN" i="1" dirty="0" err="1"/>
-              <a:t>nnzU</a:t>
-            </a:r>
-            <a:r>
-              <a:rPr lang="en-IN" i="1" dirty="0"/>
-              <a:t>, NU] = </a:t>
-            </a:r>
-            <a:r>
-              <a:rPr lang="en-IN" i="1" dirty="0" err="1"/>
-              <a:t>factorizeSparseLU</a:t>
-            </a:r>
-            <a:r>
-              <a:rPr lang="en-IN" i="1" dirty="0"/>
-              <a:t>(</a:t>
-            </a:r>
-            <a:r>
-              <a:rPr lang="en-IN" i="1" dirty="0" err="1"/>
-              <a:t>nnzJ</a:t>
-            </a:r>
-            <a:r>
-              <a:rPr lang="en-IN" i="1" dirty="0"/>
-              <a:t>, NJ)</a:t>
-            </a:r>
-          </a:p>
-          <a:p>
-            <a:pPr lvl="1"/>
-            <a:r>
-              <a:rPr lang="en-IN" i="1" dirty="0" err="1"/>
-              <a:t>updateSparseMatrix</a:t>
-            </a:r>
-            <a:endParaRPr lang="en-IN" i="1" dirty="0"/>
-          </a:p>
-          <a:p>
-            <a:pPr lvl="1"/>
-            <a:r>
-              <a:rPr lang="en-IN" i="1" dirty="0" err="1"/>
-              <a:t>computeSparseTriangularProduct</a:t>
-            </a:r>
-            <a:endParaRPr lang="en-IN" i="1" dirty="0"/>
+              <a:t>Compare your own results to the results in the CDF file, via two plots:</a:t>
+            </a:r>
+          </a:p>
+          <a:p>
+            <a:pPr lvl="2"/>
+            <a:r>
+              <a:rPr lang="en-IN" dirty="0"/>
+              <a:t>Relative percentage difference in </a:t>
+            </a:r>
+            <a:r>
+              <a:rPr lang="en-IN" dirty="0" err="1"/>
+              <a:t>pu</a:t>
+            </a:r>
+            <a:r>
+              <a:rPr lang="en-IN" dirty="0"/>
+              <a:t> Voltages</a:t>
+            </a:r>
+          </a:p>
+          <a:p>
+            <a:pPr lvl="2"/>
+            <a:r>
+              <a:rPr lang="en-IN" dirty="0"/>
+              <a:t>absolute difference in delta values.</a:t>
+            </a:r>
           </a:p>
           <a:p>
             <a:r>
@@ -12238,15 +12753,22 @@
                   <a:srgbClr val="C00000"/>
                 </a:solidFill>
               </a:rPr>
-              <a:t>Caveat: My own implementations were awkward. They were not adaptive to new inputs (i.e. they required all of the sparse inputs to be stated up front, no mechanism to make updates to existing sparse data structures). This later led to complications for performing even simple algorithms like LU Factorization (which is the last requirement as far as evaluation is concerned).</a:t>
-            </a:r>
+              <a:t>Caveat: Bus Switching is optional for evaluation, though in general not implementing it for bigger systems will lead to incorrect outcomes or even divergence.</a:t>
+            </a:r>
+          </a:p>
+          <a:p>
+            <a:endParaRPr lang="en-IN" b="1" dirty="0">
+              <a:solidFill>
+                <a:srgbClr val="002060"/>
+              </a:solidFill>
+            </a:endParaRPr>
           </a:p>
         </p:txBody>
       </p:sp>
     </p:spTree>
     <p:extLst>
       <p:ext uri="{BB962C8B-B14F-4D97-AF65-F5344CB8AC3E}">
-        <p14:creationId xmlns:p14="http://schemas.microsoft.com/office/powerpoint/2010/main" val="943132824"/>
+        <p14:creationId xmlns:p14="http://schemas.microsoft.com/office/powerpoint/2010/main" val="3009292720"/>
       </p:ext>
     </p:extLst>
   </p:cSld>

</xml_diff>

<commit_message>
topic areas slides completed.
</commit_message>
<xml_diff>
--- a/ee521/plan_for_ee521_in_julia/ee521_julia_plan.pptx
+++ b/ee521/plan_for_ee521_in_julia/ee521_julia_plan.pptx
@@ -8478,8 +8478,8 @@
           </a:p>
         </p:txBody>
       </p:sp>
-      <mc:AlternateContent xmlns:mc="http://schemas.openxmlformats.org/markup-compatibility/2006">
-        <mc:Choice xmlns:a14="http://schemas.microsoft.com/office/drawing/2010/main" Requires="a14">
+      <mc:AlternateContent xmlns:mc="http://schemas.openxmlformats.org/markup-compatibility/2006" xmlns:a14="http://schemas.microsoft.com/office/drawing/2010/main">
+        <mc:Choice Requires="a14">
           <p:sp>
             <p:nvSpPr>
               <p:cNvPr id="5" name="Content Placeholder 4">
@@ -9151,7 +9151,7 @@
             </p:txBody>
           </p:sp>
         </mc:Choice>
-        <mc:Fallback>
+        <mc:Fallback xmlns="">
           <p:sp>
             <p:nvSpPr>
               <p:cNvPr id="5" name="Content Placeholder 4">
@@ -15036,7 +15036,7 @@
         <p:spPr>
           <a:xfrm>
             <a:off x="672935" y="3443844"/>
-            <a:ext cx="10885714" cy="646331"/>
+            <a:ext cx="10885714" cy="923330"/>
           </a:xfrm>
           <a:prstGeom prst="rect">
             <a:avLst/>
@@ -15053,7 +15053,7 @@
           <a:lstStyle/>
           <a:p>
             <a:r>
-              <a:rPr lang="en-US">
+              <a:rPr lang="en-US" dirty="0">
                 <a:cs typeface="Calibri"/>
               </a:rPr>
               <a:t>I have checked three items in the full list (denoted by a green 'check' symbol).</a:t>
@@ -15061,14 +15061,19 @@
           </a:p>
           <a:p>
             <a:r>
-              <a:rPr lang="en-US">
+              <a:rPr lang="en-US" dirty="0">
                 <a:cs typeface="Calibri"/>
               </a:rPr>
-              <a:t>The next two pages contain the </a:t>
-            </a:r>
-            <a:endParaRPr lang="en-US" dirty="0">
-              <a:cs typeface="Calibri"/>
-            </a:endParaRPr>
+              <a:t>The next two pages contain the 33 items given on the PSCC website, once the user enters Submission mode.</a:t>
+            </a:r>
+          </a:p>
+          <a:p>
+            <a:r>
+              <a:rPr lang="en-US" dirty="0">
+                <a:cs typeface="Calibri"/>
+              </a:rPr>
+              <a:t>Do you agree with my checked items?</a:t>
+            </a:r>
           </a:p>
         </p:txBody>
       </p:sp>
@@ -15100,7 +15105,7 @@
         </p:blipFill>
         <p:spPr>
           <a:xfrm>
-            <a:off x="6163260" y="3486540"/>
+            <a:off x="7951117" y="3482498"/>
             <a:ext cx="306077" cy="284511"/>
           </a:xfrm>
           <a:prstGeom prst="rect">
@@ -15396,6 +15401,85 @@
           </a:prstGeom>
         </p:spPr>
       </p:pic>
+      <p:cxnSp>
+        <p:nvCxnSpPr>
+          <p:cNvPr id="5" name="Straight Arrow Connector 4">
+            <a:extLst>
+              <a:ext uri="{FF2B5EF4-FFF2-40B4-BE49-F238E27FC236}">
+                <a16:creationId xmlns:a16="http://schemas.microsoft.com/office/drawing/2014/main" id="{DF3C0EE8-68CB-4AF8-3DA2-5730652B47E1}"/>
+              </a:ext>
+            </a:extLst>
+          </p:cNvPr>
+          <p:cNvCxnSpPr/>
+          <p:nvPr/>
+        </p:nvCxnSpPr>
+        <p:spPr>
+          <a:xfrm flipV="1">
+            <a:off x="6530454" y="825690"/>
+            <a:ext cx="1084997" cy="668740"/>
+          </a:xfrm>
+          <a:prstGeom prst="straightConnector1">
+            <a:avLst/>
+          </a:prstGeom>
+          <a:ln>
+            <a:tailEnd type="triangle"/>
+          </a:ln>
+        </p:spPr>
+        <p:style>
+          <a:lnRef idx="1">
+            <a:schemeClr val="accent1"/>
+          </a:lnRef>
+          <a:fillRef idx="0">
+            <a:schemeClr val="accent1"/>
+          </a:fillRef>
+          <a:effectRef idx="0">
+            <a:schemeClr val="accent1"/>
+          </a:effectRef>
+          <a:fontRef idx="minor">
+            <a:schemeClr val="tx1"/>
+          </a:fontRef>
+        </p:style>
+      </p:cxnSp>
+      <p:sp>
+        <p:nvSpPr>
+          <p:cNvPr id="7" name="TextBox 6">
+            <a:extLst>
+              <a:ext uri="{FF2B5EF4-FFF2-40B4-BE49-F238E27FC236}">
+                <a16:creationId xmlns:a16="http://schemas.microsoft.com/office/drawing/2014/main" id="{8E88007B-CDCF-1DDF-92A6-11B108217404}"/>
+              </a:ext>
+            </a:extLst>
+          </p:cNvPr>
+          <p:cNvSpPr txBox="1"/>
+          <p:nvPr/>
+        </p:nvSpPr>
+        <p:spPr>
+          <a:xfrm>
+            <a:off x="7566046" y="395784"/>
+            <a:ext cx="3991970" cy="646331"/>
+          </a:xfrm>
+          <a:prstGeom prst="rect">
+            <a:avLst/>
+          </a:prstGeom>
+          <a:noFill/>
+          <a:ln>
+            <a:solidFill>
+              <a:schemeClr val="accent1"/>
+            </a:solidFill>
+          </a:ln>
+        </p:spPr>
+        <p:txBody>
+          <a:bodyPr wrap="square" rtlCol="0">
+            <a:spAutoFit/>
+          </a:bodyPr>
+          <a:lstStyle/>
+          <a:p>
+            <a:r>
+              <a:rPr lang="en-IN" dirty="0"/>
+              <a:t>‘Power system planning and operation’ contains Power System Analysis, right?</a:t>
+            </a:r>
+          </a:p>
+        </p:txBody>
+      </p:sp>
     </p:spTree>
     <p:extLst>
       <p:ext uri="{BB962C8B-B14F-4D97-AF65-F5344CB8AC3E}">
@@ -17080,14 +17164,6 @@
 </file>
 
 <file path=customXml/item2.xml><?xml version="1.0" encoding="utf-8"?>
-<p:properties xmlns:p="http://schemas.microsoft.com/office/2006/metadata/properties" xmlns:xsi="http://www.w3.org/2001/XMLSchema-instance" xmlns:pc="http://schemas.microsoft.com/office/infopath/2007/PartnerControls">
-  <documentManagement>
-    <_activity xmlns="07b86a79-a0e0-4fae-97d8-d960552457a2" xsi:nil="true"/>
-  </documentManagement>
-</p:properties>
-</file>
-
-<file path=customXml/item3.xml><?xml version="1.0" encoding="utf-8"?>
 <ct:contentTypeSchema xmlns:ct="http://schemas.microsoft.com/office/2006/metadata/contentType" xmlns:ma="http://schemas.microsoft.com/office/2006/metadata/properties/metaAttributes" ct:_="" ma:_="" ma:contentTypeName="Document" ma:contentTypeID="0x0101008EDD631CF16A9D4597B7910261C15C8D" ma:contentTypeVersion="8" ma:contentTypeDescription="Create a new document." ma:contentTypeScope="" ma:versionID="6df697ab8c469b327c4ca0ad6150b4d8">
   <xsd:schema xmlns:xsd="http://www.w3.org/2001/XMLSchema" xmlns:xs="http://www.w3.org/2001/XMLSchema" xmlns:p="http://schemas.microsoft.com/office/2006/metadata/properties" xmlns:ns3="07b86a79-a0e0-4fae-97d8-d960552457a2" xmlns:ns4="40f16175-07f6-4179-a7d3-44240c48c007" targetNamespace="http://schemas.microsoft.com/office/2006/metadata/properties" ma:root="true" ma:fieldsID="82c1df116234835aaac4f6705de5e513" ns3:_="" ns4:_="">
     <xsd:import namespace="07b86a79-a0e0-4fae-97d8-d960552457a2"/>
@@ -17276,6 +17352,14 @@
 </ct:contentTypeSchema>
 </file>
 
+<file path=customXml/item3.xml><?xml version="1.0" encoding="utf-8"?>
+<p:properties xmlns:p="http://schemas.microsoft.com/office/2006/metadata/properties" xmlns:xsi="http://www.w3.org/2001/XMLSchema-instance" xmlns:pc="http://schemas.microsoft.com/office/infopath/2007/PartnerControls">
+  <documentManagement>
+    <_activity xmlns="07b86a79-a0e0-4fae-97d8-d960552457a2" xsi:nil="true"/>
+  </documentManagement>
+</p:properties>
+</file>
+
 <file path=customXml/itemProps1.xml><?xml version="1.0" encoding="utf-8"?>
 <ds:datastoreItem xmlns:ds="http://schemas.openxmlformats.org/officeDocument/2006/customXml" ds:itemID="{8397E5B5-CBAB-4D43-BECA-E802B196F34B}">
   <ds:schemaRefs>
@@ -17285,23 +17369,6 @@
 </file>
 
 <file path=customXml/itemProps2.xml><?xml version="1.0" encoding="utf-8"?>
-<ds:datastoreItem xmlns:ds="http://schemas.openxmlformats.org/officeDocument/2006/customXml" ds:itemID="{8C02F8EE-7320-4FCF-B11C-9EEC626F5FA8}">
-  <ds:schemaRefs>
-    <ds:schemaRef ds:uri="http://purl.org/dc/dcmitype/"/>
-    <ds:schemaRef ds:uri="http://schemas.microsoft.com/office/2006/metadata/properties"/>
-    <ds:schemaRef ds:uri="http://schemas.microsoft.com/office/2006/documentManagement/types"/>
-    <ds:schemaRef ds:uri="http://purl.org/dc/elements/1.1/"/>
-    <ds:schemaRef ds:uri="http://schemas.microsoft.com/office/infopath/2007/PartnerControls"/>
-    <ds:schemaRef ds:uri="07b86a79-a0e0-4fae-97d8-d960552457a2"/>
-    <ds:schemaRef ds:uri="http://schemas.openxmlformats.org/package/2006/metadata/core-properties"/>
-    <ds:schemaRef ds:uri="40f16175-07f6-4179-a7d3-44240c48c007"/>
-    <ds:schemaRef ds:uri="http://www.w3.org/XML/1998/namespace"/>
-    <ds:schemaRef ds:uri="http://purl.org/dc/terms/"/>
-  </ds:schemaRefs>
-</ds:datastoreItem>
-</file>
-
-<file path=customXml/itemProps3.xml><?xml version="1.0" encoding="utf-8"?>
 <ds:datastoreItem xmlns:ds="http://schemas.openxmlformats.org/officeDocument/2006/customXml" ds:itemID="{837DA910-2E67-4D61-A7CC-4E283793B666}">
   <ds:schemaRefs>
     <ds:schemaRef ds:uri="http://schemas.microsoft.com/office/2006/metadata/contentType"/>
@@ -17318,4 +17385,21 @@
     <ds:schemaRef ds:uri="http://schemas.microsoft.com/internal/obd"/>
   </ds:schemaRefs>
 </ds:datastoreItem>
+</file>
+
+<file path=customXml/itemProps3.xml><?xml version="1.0" encoding="utf-8"?>
+<ds:datastoreItem xmlns:ds="http://schemas.openxmlformats.org/officeDocument/2006/customXml" ds:itemID="{8C02F8EE-7320-4FCF-B11C-9EEC626F5FA8}">
+  <ds:schemaRefs>
+    <ds:schemaRef ds:uri="http://purl.org/dc/dcmitype/"/>
+    <ds:schemaRef ds:uri="http://schemas.microsoft.com/office/2006/metadata/properties"/>
+    <ds:schemaRef ds:uri="http://schemas.microsoft.com/office/2006/documentManagement/types"/>
+    <ds:schemaRef ds:uri="http://purl.org/dc/elements/1.1/"/>
+    <ds:schemaRef ds:uri="http://schemas.microsoft.com/office/infopath/2007/PartnerControls"/>
+    <ds:schemaRef ds:uri="07b86a79-a0e0-4fae-97d8-d960552457a2"/>
+    <ds:schemaRef ds:uri="http://schemas.openxmlformats.org/package/2006/metadata/core-properties"/>
+    <ds:schemaRef ds:uri="40f16175-07f6-4179-a7d3-44240c48c007"/>
+    <ds:schemaRef ds:uri="http://www.w3.org/XML/1998/namespace"/>
+    <ds:schemaRef ds:uri="http://purl.org/dc/terms/"/>
+  </ds:schemaRefs>
+</ds:datastoreItem>
 </file>
</xml_diff>

<commit_message>
presentation draft before forming abstract
May also add relevant things about abstract later.
</commit_message>
<xml_diff>
--- a/ee521/plan_for_ee521_in_julia/ee521_julia_plan.pptx
+++ b/ee521/plan_for_ee521_in_julia/ee521_julia_plan.pptx
@@ -9137,6 +9137,111 @@
           </a:p>
         </p:txBody>
       </p:sp>
+      <p:pic>
+        <p:nvPicPr>
+          <p:cNvPr id="4" name="Picture 3">
+            <a:extLst>
+              <a:ext uri="{FF2B5EF4-FFF2-40B4-BE49-F238E27FC236}">
+                <a16:creationId xmlns:a16="http://schemas.microsoft.com/office/drawing/2014/main" id="{DAC67C5A-8E88-4810-B4B5-4A5425321E77}"/>
+              </a:ext>
+            </a:extLst>
+          </p:cNvPr>
+          <p:cNvPicPr>
+            <a:picLocks noChangeAspect="1"/>
+          </p:cNvPicPr>
+          <p:nvPr/>
+        </p:nvPicPr>
+        <p:blipFill>
+          <a:blip r:embed="rId3"/>
+          <a:stretch>
+            <a:fillRect/>
+          </a:stretch>
+        </p:blipFill>
+        <p:spPr>
+          <a:xfrm>
+            <a:off x="114068" y="3543278"/>
+            <a:ext cx="3686202" cy="2667019"/>
+          </a:xfrm>
+          <a:prstGeom prst="rect">
+            <a:avLst/>
+          </a:prstGeom>
+          <a:ln>
+            <a:solidFill>
+              <a:srgbClr val="FF0000"/>
+            </a:solidFill>
+          </a:ln>
+        </p:spPr>
+      </p:pic>
+      <p:pic>
+        <p:nvPicPr>
+          <p:cNvPr id="7" name="Picture 6">
+            <a:extLst>
+              <a:ext uri="{FF2B5EF4-FFF2-40B4-BE49-F238E27FC236}">
+                <a16:creationId xmlns:a16="http://schemas.microsoft.com/office/drawing/2014/main" id="{04E53753-0575-8EF6-5949-2386BCA5A00C}"/>
+              </a:ext>
+            </a:extLst>
+          </p:cNvPr>
+          <p:cNvPicPr>
+            <a:picLocks noChangeAspect="1"/>
+          </p:cNvPicPr>
+          <p:nvPr/>
+        </p:nvPicPr>
+        <p:blipFill>
+          <a:blip r:embed="rId4"/>
+          <a:stretch>
+            <a:fillRect/>
+          </a:stretch>
+        </p:blipFill>
+        <p:spPr>
+          <a:xfrm>
+            <a:off x="3876659" y="3526611"/>
+            <a:ext cx="2547956" cy="2667019"/>
+          </a:xfrm>
+          <a:prstGeom prst="rect">
+            <a:avLst/>
+          </a:prstGeom>
+          <a:ln>
+            <a:solidFill>
+              <a:srgbClr val="00B050"/>
+            </a:solidFill>
+          </a:ln>
+        </p:spPr>
+      </p:pic>
+      <p:pic>
+        <p:nvPicPr>
+          <p:cNvPr id="9" name="Picture 8">
+            <a:extLst>
+              <a:ext uri="{FF2B5EF4-FFF2-40B4-BE49-F238E27FC236}">
+                <a16:creationId xmlns:a16="http://schemas.microsoft.com/office/drawing/2014/main" id="{4E126060-DAC1-903D-FDD1-3E14118C5E1B}"/>
+              </a:ext>
+            </a:extLst>
+          </p:cNvPr>
+          <p:cNvPicPr>
+            <a:picLocks noChangeAspect="1"/>
+          </p:cNvPicPr>
+          <p:nvPr/>
+        </p:nvPicPr>
+        <p:blipFill>
+          <a:blip r:embed="rId5"/>
+          <a:stretch>
+            <a:fillRect/>
+          </a:stretch>
+        </p:blipFill>
+        <p:spPr>
+          <a:xfrm>
+            <a:off x="6501004" y="3518276"/>
+            <a:ext cx="5576928" cy="2700357"/>
+          </a:xfrm>
+          <a:prstGeom prst="rect">
+            <a:avLst/>
+          </a:prstGeom>
+          <a:ln>
+            <a:solidFill>
+              <a:srgbClr val="FF0000"/>
+            </a:solidFill>
+          </a:ln>
+        </p:spPr>
+      </p:pic>
     </p:spTree>
     <p:extLst>
       <p:ext uri="{BB962C8B-B14F-4D97-AF65-F5344CB8AC3E}">
@@ -9920,6 +10025,76 @@
           </p:sp>
         </mc:Fallback>
       </mc:AlternateContent>
+      <p:pic>
+        <p:nvPicPr>
+          <p:cNvPr id="4" name="Picture 3">
+            <a:extLst>
+              <a:ext uri="{FF2B5EF4-FFF2-40B4-BE49-F238E27FC236}">
+                <a16:creationId xmlns:a16="http://schemas.microsoft.com/office/drawing/2014/main" id="{B8B4B24B-E08E-053C-7206-8716473E30DA}"/>
+              </a:ext>
+            </a:extLst>
+          </p:cNvPr>
+          <p:cNvPicPr>
+            <a:picLocks noChangeAspect="1"/>
+          </p:cNvPicPr>
+          <p:nvPr/>
+        </p:nvPicPr>
+        <p:blipFill>
+          <a:blip r:embed="rId3"/>
+          <a:stretch>
+            <a:fillRect/>
+          </a:stretch>
+        </p:blipFill>
+        <p:spPr>
+          <a:xfrm>
+            <a:off x="5444961" y="4078218"/>
+            <a:ext cx="4783026" cy="2521798"/>
+          </a:xfrm>
+          <a:prstGeom prst="rect">
+            <a:avLst/>
+          </a:prstGeom>
+          <a:ln>
+            <a:solidFill>
+              <a:srgbClr val="FF0000"/>
+            </a:solidFill>
+          </a:ln>
+        </p:spPr>
+      </p:pic>
+      <p:pic>
+        <p:nvPicPr>
+          <p:cNvPr id="7" name="Picture 6">
+            <a:extLst>
+              <a:ext uri="{FF2B5EF4-FFF2-40B4-BE49-F238E27FC236}">
+                <a16:creationId xmlns:a16="http://schemas.microsoft.com/office/drawing/2014/main" id="{58DB3D19-81CD-4148-EAA8-B8C4E73BC6F7}"/>
+              </a:ext>
+            </a:extLst>
+          </p:cNvPr>
+          <p:cNvPicPr>
+            <a:picLocks noChangeAspect="1"/>
+          </p:cNvPicPr>
+          <p:nvPr/>
+        </p:nvPicPr>
+        <p:blipFill>
+          <a:blip r:embed="rId4"/>
+          <a:stretch>
+            <a:fillRect/>
+          </a:stretch>
+        </p:blipFill>
+        <p:spPr>
+          <a:xfrm>
+            <a:off x="1964013" y="4078218"/>
+            <a:ext cx="2552719" cy="2709882"/>
+          </a:xfrm>
+          <a:prstGeom prst="rect">
+            <a:avLst/>
+          </a:prstGeom>
+          <a:ln>
+            <a:solidFill>
+              <a:srgbClr val="00B050"/>
+            </a:solidFill>
+          </a:ln>
+        </p:spPr>
+      </p:pic>
     </p:spTree>
     <p:extLst>
       <p:ext uri="{BB962C8B-B14F-4D97-AF65-F5344CB8AC3E}">
@@ -11200,12 +11375,51 @@
         </p:blipFill>
         <p:spPr>
           <a:xfrm>
-            <a:off x="838200" y="3032464"/>
+            <a:off x="838200" y="1875493"/>
             <a:ext cx="10512547" cy="2076226"/>
           </a:xfrm>
           <a:prstGeom prst="rect">
             <a:avLst/>
           </a:prstGeom>
+          <a:ln>
+            <a:solidFill>
+              <a:schemeClr val="accent1"/>
+            </a:solidFill>
+          </a:ln>
+        </p:spPr>
+      </p:pic>
+      <p:pic>
+        <p:nvPicPr>
+          <p:cNvPr id="4" name="Picture 3">
+            <a:extLst>
+              <a:ext uri="{FF2B5EF4-FFF2-40B4-BE49-F238E27FC236}">
+                <a16:creationId xmlns:a16="http://schemas.microsoft.com/office/drawing/2014/main" id="{AAD23AF0-BDA1-EFDC-F6A9-0EA833687B83}"/>
+              </a:ext>
+            </a:extLst>
+          </p:cNvPr>
+          <p:cNvPicPr>
+            <a:picLocks noChangeAspect="1"/>
+          </p:cNvPicPr>
+          <p:nvPr/>
+        </p:nvPicPr>
+        <p:blipFill rotWithShape="1">
+          <a:blip r:embed="rId3"/>
+          <a:srcRect t="32798"/>
+          <a:stretch/>
+        </p:blipFill>
+        <p:spPr>
+          <a:xfrm>
+            <a:off x="465157" y="4334290"/>
+            <a:ext cx="11258632" cy="2141138"/>
+          </a:xfrm>
+          <a:prstGeom prst="rect">
+            <a:avLst/>
+          </a:prstGeom>
+          <a:ln>
+            <a:solidFill>
+              <a:schemeClr val="accent1"/>
+            </a:solidFill>
+          </a:ln>
         </p:spPr>
       </p:pic>
     </p:spTree>
@@ -15128,11 +15342,10 @@
           </p:cNvPicPr>
           <p:nvPr/>
         </p:nvPicPr>
-        <p:blipFill>
+        <p:blipFill rotWithShape="1">
           <a:blip r:embed="rId2"/>
-          <a:stretch>
-            <a:fillRect/>
-          </a:stretch>
+          <a:srcRect r="29"/>
+          <a:stretch/>
         </p:blipFill>
         <p:spPr>
           <a:xfrm>
@@ -15142,6 +15355,11 @@
           <a:prstGeom prst="rect">
             <a:avLst/>
           </a:prstGeom>
+          <a:ln>
+            <a:solidFill>
+              <a:srgbClr val="FF0000"/>
+            </a:solidFill>
+          </a:ln>
         </p:spPr>
       </p:pic>
     </p:spTree>
@@ -17569,14 +17787,6 @@
 </file>
 
 <file path=customXml/item2.xml><?xml version="1.0" encoding="utf-8"?>
-<p:properties xmlns:p="http://schemas.microsoft.com/office/2006/metadata/properties" xmlns:xsi="http://www.w3.org/2001/XMLSchema-instance" xmlns:pc="http://schemas.microsoft.com/office/infopath/2007/PartnerControls">
-  <documentManagement>
-    <_activity xmlns="07b86a79-a0e0-4fae-97d8-d960552457a2" xsi:nil="true"/>
-  </documentManagement>
-</p:properties>
-</file>
-
-<file path=customXml/item3.xml><?xml version="1.0" encoding="utf-8"?>
 <ct:contentTypeSchema xmlns:ct="http://schemas.microsoft.com/office/2006/metadata/contentType" xmlns:ma="http://schemas.microsoft.com/office/2006/metadata/properties/metaAttributes" ct:_="" ma:_="" ma:contentTypeName="Document" ma:contentTypeID="0x0101008EDD631CF16A9D4597B7910261C15C8D" ma:contentTypeVersion="8" ma:contentTypeDescription="Create a new document." ma:contentTypeScope="" ma:versionID="6df697ab8c469b327c4ca0ad6150b4d8">
   <xsd:schema xmlns:xsd="http://www.w3.org/2001/XMLSchema" xmlns:xs="http://www.w3.org/2001/XMLSchema" xmlns:p="http://schemas.microsoft.com/office/2006/metadata/properties" xmlns:ns3="07b86a79-a0e0-4fae-97d8-d960552457a2" xmlns:ns4="40f16175-07f6-4179-a7d3-44240c48c007" targetNamespace="http://schemas.microsoft.com/office/2006/metadata/properties" ma:root="true" ma:fieldsID="82c1df116234835aaac4f6705de5e513" ns3:_="" ns4:_="">
     <xsd:import namespace="07b86a79-a0e0-4fae-97d8-d960552457a2"/>
@@ -17765,6 +17975,14 @@
 </ct:contentTypeSchema>
 </file>
 
+<file path=customXml/item3.xml><?xml version="1.0" encoding="utf-8"?>
+<p:properties xmlns:p="http://schemas.microsoft.com/office/2006/metadata/properties" xmlns:xsi="http://www.w3.org/2001/XMLSchema-instance" xmlns:pc="http://schemas.microsoft.com/office/infopath/2007/PartnerControls">
+  <documentManagement>
+    <_activity xmlns="07b86a79-a0e0-4fae-97d8-d960552457a2" xsi:nil="true"/>
+  </documentManagement>
+</p:properties>
+</file>
+
 <file path=customXml/itemProps1.xml><?xml version="1.0" encoding="utf-8"?>
 <ds:datastoreItem xmlns:ds="http://schemas.openxmlformats.org/officeDocument/2006/customXml" ds:itemID="{8397E5B5-CBAB-4D43-BECA-E802B196F34B}">
   <ds:schemaRefs>
@@ -17774,23 +17992,6 @@
 </file>
 
 <file path=customXml/itemProps2.xml><?xml version="1.0" encoding="utf-8"?>
-<ds:datastoreItem xmlns:ds="http://schemas.openxmlformats.org/officeDocument/2006/customXml" ds:itemID="{8C02F8EE-7320-4FCF-B11C-9EEC626F5FA8}">
-  <ds:schemaRefs>
-    <ds:schemaRef ds:uri="http://purl.org/dc/dcmitype/"/>
-    <ds:schemaRef ds:uri="http://schemas.microsoft.com/office/2006/metadata/properties"/>
-    <ds:schemaRef ds:uri="http://schemas.microsoft.com/office/2006/documentManagement/types"/>
-    <ds:schemaRef ds:uri="http://purl.org/dc/elements/1.1/"/>
-    <ds:schemaRef ds:uri="http://schemas.microsoft.com/office/infopath/2007/PartnerControls"/>
-    <ds:schemaRef ds:uri="07b86a79-a0e0-4fae-97d8-d960552457a2"/>
-    <ds:schemaRef ds:uri="http://schemas.openxmlformats.org/package/2006/metadata/core-properties"/>
-    <ds:schemaRef ds:uri="40f16175-07f6-4179-a7d3-44240c48c007"/>
-    <ds:schemaRef ds:uri="http://www.w3.org/XML/1998/namespace"/>
-    <ds:schemaRef ds:uri="http://purl.org/dc/terms/"/>
-  </ds:schemaRefs>
-</ds:datastoreItem>
-</file>
-
-<file path=customXml/itemProps3.xml><?xml version="1.0" encoding="utf-8"?>
 <ds:datastoreItem xmlns:ds="http://schemas.openxmlformats.org/officeDocument/2006/customXml" ds:itemID="{837DA910-2E67-4D61-A7CC-4E283793B666}">
   <ds:schemaRefs>
     <ds:schemaRef ds:uri="http://schemas.microsoft.com/office/2006/metadata/contentType"/>
@@ -17807,4 +18008,21 @@
     <ds:schemaRef ds:uri="http://schemas.microsoft.com/internal/obd"/>
   </ds:schemaRefs>
 </ds:datastoreItem>
+</file>
+
+<file path=customXml/itemProps3.xml><?xml version="1.0" encoding="utf-8"?>
+<ds:datastoreItem xmlns:ds="http://schemas.openxmlformats.org/officeDocument/2006/customXml" ds:itemID="{8C02F8EE-7320-4FCF-B11C-9EEC626F5FA8}">
+  <ds:schemaRefs>
+    <ds:schemaRef ds:uri="http://purl.org/dc/dcmitype/"/>
+    <ds:schemaRef ds:uri="http://schemas.microsoft.com/office/2006/metadata/properties"/>
+    <ds:schemaRef ds:uri="http://schemas.microsoft.com/office/2006/documentManagement/types"/>
+    <ds:schemaRef ds:uri="http://purl.org/dc/elements/1.1/"/>
+    <ds:schemaRef ds:uri="http://schemas.microsoft.com/office/infopath/2007/PartnerControls"/>
+    <ds:schemaRef ds:uri="07b86a79-a0e0-4fae-97d8-d960552457a2"/>
+    <ds:schemaRef ds:uri="http://schemas.openxmlformats.org/package/2006/metadata/core-properties"/>
+    <ds:schemaRef ds:uri="40f16175-07f6-4179-a7d3-44240c48c007"/>
+    <ds:schemaRef ds:uri="http://www.w3.org/XML/1998/namespace"/>
+    <ds:schemaRef ds:uri="http://purl.org/dc/terms/"/>
+  </ds:schemaRefs>
+</ds:datastoreItem>
 </file>
</xml_diff>

<commit_message>
collaboration workflow pointers added.
</commit_message>
<xml_diff>
--- a/ee521/plan_for_ee521_in_julia/ee521_julia_plan.pptx
+++ b/ee521/plan_for_ee521_in_julia/ee521_julia_plan.pptx
@@ -12,30 +12,31 @@
     <p:sldId id="284" r:id="rId9"/>
     <p:sldId id="286" r:id="rId10"/>
     <p:sldId id="285" r:id="rId11"/>
-    <p:sldId id="278" r:id="rId12"/>
-    <p:sldId id="280" r:id="rId13"/>
-    <p:sldId id="279" r:id="rId14"/>
-    <p:sldId id="276" r:id="rId15"/>
-    <p:sldId id="277" r:id="rId16"/>
-    <p:sldId id="281" r:id="rId17"/>
-    <p:sldId id="282" r:id="rId18"/>
-    <p:sldId id="287" r:id="rId19"/>
-    <p:sldId id="288" r:id="rId20"/>
-    <p:sldId id="275" r:id="rId21"/>
-    <p:sldId id="265" r:id="rId22"/>
-    <p:sldId id="259" r:id="rId23"/>
-    <p:sldId id="266" r:id="rId24"/>
-    <p:sldId id="270" r:id="rId25"/>
-    <p:sldId id="267" r:id="rId26"/>
-    <p:sldId id="264" r:id="rId27"/>
-    <p:sldId id="271" r:id="rId28"/>
-    <p:sldId id="268" r:id="rId29"/>
-    <p:sldId id="263" r:id="rId30"/>
-    <p:sldId id="269" r:id="rId31"/>
-    <p:sldId id="262" r:id="rId32"/>
-    <p:sldId id="272" r:id="rId33"/>
-    <p:sldId id="258" r:id="rId34"/>
-    <p:sldId id="273" r:id="rId35"/>
+    <p:sldId id="291" r:id="rId12"/>
+    <p:sldId id="278" r:id="rId13"/>
+    <p:sldId id="280" r:id="rId14"/>
+    <p:sldId id="279" r:id="rId15"/>
+    <p:sldId id="276" r:id="rId16"/>
+    <p:sldId id="277" r:id="rId17"/>
+    <p:sldId id="281" r:id="rId18"/>
+    <p:sldId id="282" r:id="rId19"/>
+    <p:sldId id="287" r:id="rId20"/>
+    <p:sldId id="288" r:id="rId21"/>
+    <p:sldId id="275" r:id="rId22"/>
+    <p:sldId id="265" r:id="rId23"/>
+    <p:sldId id="259" r:id="rId24"/>
+    <p:sldId id="266" r:id="rId25"/>
+    <p:sldId id="270" r:id="rId26"/>
+    <p:sldId id="267" r:id="rId27"/>
+    <p:sldId id="264" r:id="rId28"/>
+    <p:sldId id="271" r:id="rId29"/>
+    <p:sldId id="268" r:id="rId30"/>
+    <p:sldId id="263" r:id="rId31"/>
+    <p:sldId id="269" r:id="rId32"/>
+    <p:sldId id="262" r:id="rId33"/>
+    <p:sldId id="272" r:id="rId34"/>
+    <p:sldId id="258" r:id="rId35"/>
+    <p:sldId id="273" r:id="rId36"/>
   </p:sldIdLst>
   <p:sldSz cx="12192000" cy="6858000"/>
   <p:notesSz cx="6858000" cy="9144000"/>
@@ -3343,7 +3344,7 @@
           <a:p>
             <a:fld id="{CD0EE7A6-4846-4730-80C3-BA00371415CC}" type="datetimeFigureOut">
               <a:rPr lang="en-IN" smtClean="0"/>
-              <a:t>28-05-2023</a:t>
+              <a:t>01-06-2023</a:t>
             </a:fld>
             <a:endParaRPr lang="en-IN"/>
           </a:p>
@@ -3543,7 +3544,7 @@
           <a:p>
             <a:fld id="{CD0EE7A6-4846-4730-80C3-BA00371415CC}" type="datetimeFigureOut">
               <a:rPr lang="en-IN" smtClean="0"/>
-              <a:t>28-05-2023</a:t>
+              <a:t>01-06-2023</a:t>
             </a:fld>
             <a:endParaRPr lang="en-IN"/>
           </a:p>
@@ -3753,7 +3754,7 @@
           <a:p>
             <a:fld id="{CD0EE7A6-4846-4730-80C3-BA00371415CC}" type="datetimeFigureOut">
               <a:rPr lang="en-IN" smtClean="0"/>
-              <a:t>28-05-2023</a:t>
+              <a:t>01-06-2023</a:t>
             </a:fld>
             <a:endParaRPr lang="en-IN"/>
           </a:p>
@@ -3953,7 +3954,7 @@
           <a:p>
             <a:fld id="{CD0EE7A6-4846-4730-80C3-BA00371415CC}" type="datetimeFigureOut">
               <a:rPr lang="en-IN" smtClean="0"/>
-              <a:t>28-05-2023</a:t>
+              <a:t>01-06-2023</a:t>
             </a:fld>
             <a:endParaRPr lang="en-IN"/>
           </a:p>
@@ -4229,7 +4230,7 @@
           <a:p>
             <a:fld id="{CD0EE7A6-4846-4730-80C3-BA00371415CC}" type="datetimeFigureOut">
               <a:rPr lang="en-IN" smtClean="0"/>
-              <a:t>28-05-2023</a:t>
+              <a:t>01-06-2023</a:t>
             </a:fld>
             <a:endParaRPr lang="en-IN"/>
           </a:p>
@@ -4497,7 +4498,7 @@
           <a:p>
             <a:fld id="{CD0EE7A6-4846-4730-80C3-BA00371415CC}" type="datetimeFigureOut">
               <a:rPr lang="en-IN" smtClean="0"/>
-              <a:t>28-05-2023</a:t>
+              <a:t>01-06-2023</a:t>
             </a:fld>
             <a:endParaRPr lang="en-IN"/>
           </a:p>
@@ -4912,7 +4913,7 @@
           <a:p>
             <a:fld id="{CD0EE7A6-4846-4730-80C3-BA00371415CC}" type="datetimeFigureOut">
               <a:rPr lang="en-IN" smtClean="0"/>
-              <a:t>28-05-2023</a:t>
+              <a:t>01-06-2023</a:t>
             </a:fld>
             <a:endParaRPr lang="en-IN"/>
           </a:p>
@@ -5054,7 +5055,7 @@
           <a:p>
             <a:fld id="{CD0EE7A6-4846-4730-80C3-BA00371415CC}" type="datetimeFigureOut">
               <a:rPr lang="en-IN" smtClean="0"/>
-              <a:t>28-05-2023</a:t>
+              <a:t>01-06-2023</a:t>
             </a:fld>
             <a:endParaRPr lang="en-IN"/>
           </a:p>
@@ -5167,7 +5168,7 @@
           <a:p>
             <a:fld id="{CD0EE7A6-4846-4730-80C3-BA00371415CC}" type="datetimeFigureOut">
               <a:rPr lang="en-IN" smtClean="0"/>
-              <a:t>28-05-2023</a:t>
+              <a:t>01-06-2023</a:t>
             </a:fld>
             <a:endParaRPr lang="en-IN"/>
           </a:p>
@@ -5480,7 +5481,7 @@
           <a:p>
             <a:fld id="{CD0EE7A6-4846-4730-80C3-BA00371415CC}" type="datetimeFigureOut">
               <a:rPr lang="en-IN" smtClean="0"/>
-              <a:t>28-05-2023</a:t>
+              <a:t>01-06-2023</a:t>
             </a:fld>
             <a:endParaRPr lang="en-IN"/>
           </a:p>
@@ -5769,7 +5770,7 @@
           <a:p>
             <a:fld id="{CD0EE7A6-4846-4730-80C3-BA00371415CC}" type="datetimeFigureOut">
               <a:rPr lang="en-IN" smtClean="0"/>
-              <a:t>28-05-2023</a:t>
+              <a:t>01-06-2023</a:t>
             </a:fld>
             <a:endParaRPr lang="en-IN"/>
           </a:p>
@@ -6012,7 +6013,7 @@
           <a:p>
             <a:fld id="{CD0EE7A6-4846-4730-80C3-BA00371415CC}" type="datetimeFigureOut">
               <a:rPr lang="en-IN" smtClean="0"/>
-              <a:t>28-05-2023</a:t>
+              <a:t>01-06-2023</a:t>
             </a:fld>
             <a:endParaRPr lang="en-IN"/>
           </a:p>
@@ -7730,6 +7731,180 @@
           <p:cNvPr id="2" name="Title 1">
             <a:extLst>
               <a:ext uri="{FF2B5EF4-FFF2-40B4-BE49-F238E27FC236}">
+                <a16:creationId xmlns:a16="http://schemas.microsoft.com/office/drawing/2014/main" id="{A8A7A435-95A5-2381-42D2-9193E39FE483}"/>
+              </a:ext>
+            </a:extLst>
+          </p:cNvPr>
+          <p:cNvSpPr>
+            <a:spLocks noGrp="1"/>
+          </p:cNvSpPr>
+          <p:nvPr>
+            <p:ph type="title"/>
+          </p:nvPr>
+        </p:nvSpPr>
+        <p:spPr/>
+        <p:txBody>
+          <a:bodyPr>
+            <a:normAutofit fontScale="90000"/>
+          </a:bodyPr>
+          <a:lstStyle/>
+          <a:p>
+            <a:r>
+              <a:rPr lang="en-IN" dirty="0"/>
+              <a:t>Objective: Deploy a </a:t>
+            </a:r>
+            <a:r>
+              <a:rPr lang="en-IN" dirty="0">
+                <a:solidFill>
+                  <a:srgbClr val="7030A0"/>
+                </a:solidFill>
+              </a:rPr>
+              <a:t>Julia</a:t>
+            </a:r>
+            <a:r>
+              <a:rPr lang="en-IN" dirty="0"/>
+              <a:t> package for Power System Analysis</a:t>
+            </a:r>
+            <a:br>
+              <a:rPr lang="en-IN" dirty="0"/>
+            </a:br>
+            <a:r>
+              <a:rPr lang="en-IN" sz="2200" dirty="0"/>
+              <a:t>and possibly Power System Stability and Control too</a:t>
+            </a:r>
+            <a:r>
+              <a:rPr lang="en-IN" dirty="0"/>
+              <a:t>.</a:t>
+            </a:r>
+          </a:p>
+        </p:txBody>
+      </p:sp>
+      <p:sp>
+        <p:nvSpPr>
+          <p:cNvPr id="3" name="Content Placeholder 2">
+            <a:extLst>
+              <a:ext uri="{FF2B5EF4-FFF2-40B4-BE49-F238E27FC236}">
+                <a16:creationId xmlns:a16="http://schemas.microsoft.com/office/drawing/2014/main" id="{C0E4BDB6-1746-85CD-0FAA-2319229CCEB3}"/>
+              </a:ext>
+            </a:extLst>
+          </p:cNvPr>
+          <p:cNvSpPr>
+            <a:spLocks noGrp="1"/>
+          </p:cNvSpPr>
+          <p:nvPr>
+            <p:ph idx="1"/>
+          </p:nvPr>
+        </p:nvSpPr>
+        <p:spPr>
+          <a:xfrm>
+            <a:off x="701723" y="1982575"/>
+            <a:ext cx="10515600" cy="4351338"/>
+          </a:xfrm>
+        </p:spPr>
+        <p:txBody>
+          <a:bodyPr>
+            <a:normAutofit/>
+          </a:bodyPr>
+          <a:lstStyle/>
+          <a:p>
+            <a:pPr marL="457200" lvl="1" indent="0">
+              <a:buNone/>
+            </a:pPr>
+            <a:r>
+              <a:rPr lang="en-IN" dirty="0"/>
+              <a:t>Why deploy this package?</a:t>
+            </a:r>
+          </a:p>
+          <a:p>
+            <a:pPr lvl="1"/>
+            <a:r>
+              <a:rPr lang="en-IN" dirty="0"/>
+              <a:t>Two of us have to finish working on EE 521 projects anyway.</a:t>
+            </a:r>
+          </a:p>
+          <a:p>
+            <a:pPr lvl="1"/>
+            <a:r>
+              <a:rPr lang="en-IN" dirty="0"/>
+              <a:t>Working on a large project like this is the best way to truly gain expertise in a new language, here </a:t>
+            </a:r>
+            <a:r>
+              <a:rPr lang="en-IN" dirty="0">
+                <a:solidFill>
+                  <a:srgbClr val="7030A0"/>
+                </a:solidFill>
+              </a:rPr>
+              <a:t>Julia</a:t>
+            </a:r>
+            <a:r>
+              <a:rPr lang="en-IN" dirty="0"/>
+              <a:t>.</a:t>
+            </a:r>
+          </a:p>
+          <a:p>
+            <a:pPr lvl="1"/>
+            <a:r>
+              <a:rPr lang="en-IN" dirty="0"/>
+              <a:t>We realized that codes written by the students, and codes available to the faculties are kind of outdated, generally with little to no scope of scalability, and therefore no scope of deployment.</a:t>
+            </a:r>
+          </a:p>
+          <a:p>
+            <a:pPr lvl="1"/>
+            <a:endParaRPr lang="en-IN" dirty="0"/>
+          </a:p>
+          <a:p>
+            <a:pPr lvl="1"/>
+            <a:endParaRPr lang="en-IN" dirty="0"/>
+          </a:p>
+          <a:p>
+            <a:pPr lvl="1"/>
+            <a:endParaRPr lang="en-IN" dirty="0"/>
+          </a:p>
+          <a:p>
+            <a:pPr lvl="1"/>
+            <a:endParaRPr lang="en-IN" dirty="0"/>
+          </a:p>
+          <a:p>
+            <a:pPr lvl="1"/>
+            <a:endParaRPr lang="en-IN" dirty="0"/>
+          </a:p>
+        </p:txBody>
+      </p:sp>
+    </p:spTree>
+    <p:extLst>
+      <p:ext uri="{BB962C8B-B14F-4D97-AF65-F5344CB8AC3E}">
+        <p14:creationId xmlns:p14="http://schemas.microsoft.com/office/powerpoint/2010/main" val="713914853"/>
+      </p:ext>
+    </p:extLst>
+  </p:cSld>
+  <p:clrMapOvr>
+    <a:masterClrMapping/>
+  </p:clrMapOvr>
+</p:sld>
+</file>
+
+<file path=ppt/slides/slide11.xml><?xml version="1.0" encoding="utf-8"?>
+<p:sld xmlns:a="http://schemas.openxmlformats.org/drawingml/2006/main" xmlns:r="http://schemas.openxmlformats.org/officeDocument/2006/relationships" xmlns:p="http://schemas.openxmlformats.org/presentationml/2006/main">
+  <p:cSld>
+    <p:spTree>
+      <p:nvGrpSpPr>
+        <p:cNvPr id="1" name=""/>
+        <p:cNvGrpSpPr/>
+        <p:nvPr/>
+      </p:nvGrpSpPr>
+      <p:grpSpPr>
+        <a:xfrm>
+          <a:off x="0" y="0"/>
+          <a:ext cx="0" cy="0"/>
+          <a:chOff x="0" y="0"/>
+          <a:chExt cx="0" cy="0"/>
+        </a:xfrm>
+      </p:grpSpPr>
+      <p:sp>
+        <p:nvSpPr>
+          <p:cNvPr id="2" name="Title 1">
+            <a:extLst>
+              <a:ext uri="{FF2B5EF4-FFF2-40B4-BE49-F238E27FC236}">
                 <a16:creationId xmlns:a16="http://schemas.microsoft.com/office/drawing/2014/main" id="{E6E8A2C5-019D-C761-3AF4-9CD277A2946B}"/>
               </a:ext>
             </a:extLst>
@@ -7847,7 +8022,7 @@
 </p:sld>
 </file>
 
-<file path=ppt/slides/slide11.xml><?xml version="1.0" encoding="utf-8"?>
+<file path=ppt/slides/slide12.xml><?xml version="1.0" encoding="utf-8"?>
 <p:sld xmlns:a="http://schemas.openxmlformats.org/drawingml/2006/main" xmlns:r="http://schemas.openxmlformats.org/officeDocument/2006/relationships" xmlns:p="http://schemas.openxmlformats.org/presentationml/2006/main">
   <p:cSld>
     <p:bg>
@@ -8435,7 +8610,7 @@
 </p:sld>
 </file>
 
-<file path=ppt/slides/slide12.xml><?xml version="1.0" encoding="utf-8"?>
+<file path=ppt/slides/slide13.xml><?xml version="1.0" encoding="utf-8"?>
 <p:sld xmlns:a="http://schemas.openxmlformats.org/drawingml/2006/main" xmlns:r="http://schemas.openxmlformats.org/officeDocument/2006/relationships" xmlns:p="http://schemas.openxmlformats.org/presentationml/2006/main">
   <p:cSld>
     <p:spTree>
@@ -8629,7 +8804,7 @@
 </p:sld>
 </file>
 
-<file path=ppt/slides/slide13.xml><?xml version="1.0" encoding="utf-8"?>
+<file path=ppt/slides/slide14.xml><?xml version="1.0" encoding="utf-8"?>
 <p:sld xmlns:a="http://schemas.openxmlformats.org/drawingml/2006/main" xmlns:r="http://schemas.openxmlformats.org/officeDocument/2006/relationships" xmlns:p="http://schemas.openxmlformats.org/presentationml/2006/main">
   <p:cSld>
     <p:spTree>
@@ -8786,7 +8961,7 @@
 </p:sld>
 </file>
 
-<file path=ppt/slides/slide14.xml><?xml version="1.0" encoding="utf-8"?>
+<file path=ppt/slides/slide15.xml><?xml version="1.0" encoding="utf-8"?>
 <p:sld xmlns:a="http://schemas.openxmlformats.org/drawingml/2006/main" xmlns:r="http://schemas.openxmlformats.org/officeDocument/2006/relationships" xmlns:p="http://schemas.openxmlformats.org/presentationml/2006/main">
   <p:cSld>
     <p:spTree>
@@ -9032,7 +9207,7 @@
 </p:sld>
 </file>
 
-<file path=ppt/slides/slide15.xml><?xml version="1.0" encoding="utf-8"?>
+<file path=ppt/slides/slide16.xml><?xml version="1.0" encoding="utf-8"?>
 <p:sld xmlns:a="http://schemas.openxmlformats.org/drawingml/2006/main" xmlns:r="http://schemas.openxmlformats.org/officeDocument/2006/relationships" xmlns:p="http://schemas.openxmlformats.org/presentationml/2006/main">
   <p:cSld>
     <p:spTree>
@@ -9255,7 +9430,7 @@
 </p:sld>
 </file>
 
-<file path=ppt/slides/slide16.xml><?xml version="1.0" encoding="utf-8"?>
+<file path=ppt/slides/slide17.xml><?xml version="1.0" encoding="utf-8"?>
 <p:sld xmlns:a="http://schemas.openxmlformats.org/drawingml/2006/main" xmlns:r="http://schemas.openxmlformats.org/officeDocument/2006/relationships" xmlns:p="http://schemas.openxmlformats.org/presentationml/2006/main">
   <p:cSld>
     <p:spTree>
@@ -10108,7 +10283,7 @@
 </p:sld>
 </file>
 
-<file path=ppt/slides/slide17.xml><?xml version="1.0" encoding="utf-8"?>
+<file path=ppt/slides/slide18.xml><?xml version="1.0" encoding="utf-8"?>
 <p:sld xmlns:a="http://schemas.openxmlformats.org/drawingml/2006/main" xmlns:r="http://schemas.openxmlformats.org/officeDocument/2006/relationships" xmlns:p="http://schemas.openxmlformats.org/presentationml/2006/main">
   <p:cSld>
     <p:spTree>
@@ -10629,345 +10804,6 @@
 </p:sld>
 </file>
 
-<file path=ppt/slides/slide18.xml><?xml version="1.0" encoding="utf-8"?>
-<p:sld xmlns:a="http://schemas.openxmlformats.org/drawingml/2006/main" xmlns:r="http://schemas.openxmlformats.org/officeDocument/2006/relationships" xmlns:p="http://schemas.openxmlformats.org/presentationml/2006/main">
-  <p:cSld>
-    <p:spTree>
-      <p:nvGrpSpPr>
-        <p:cNvPr id="1" name=""/>
-        <p:cNvGrpSpPr/>
-        <p:nvPr/>
-      </p:nvGrpSpPr>
-      <p:grpSpPr>
-        <a:xfrm>
-          <a:off x="0" y="0"/>
-          <a:ext cx="0" cy="0"/>
-          <a:chOff x="0" y="0"/>
-          <a:chExt cx="0" cy="0"/>
-        </a:xfrm>
-      </p:grpSpPr>
-      <p:sp>
-        <p:nvSpPr>
-          <p:cNvPr id="2" name="Title 1">
-            <a:extLst>
-              <a:ext uri="{FF2B5EF4-FFF2-40B4-BE49-F238E27FC236}">
-                <a16:creationId xmlns:a16="http://schemas.microsoft.com/office/drawing/2014/main" id="{336429DC-BFF4-DD6A-7726-27957283ABBE}"/>
-              </a:ext>
-            </a:extLst>
-          </p:cNvPr>
-          <p:cNvSpPr>
-            <a:spLocks noGrp="1"/>
-          </p:cNvSpPr>
-          <p:nvPr>
-            <p:ph type="title"/>
-          </p:nvPr>
-        </p:nvSpPr>
-        <p:spPr/>
-        <p:txBody>
-          <a:bodyPr/>
-          <a:lstStyle/>
-          <a:p>
-            <a:r>
-              <a:rPr lang="en-IN"/>
-              <a:t>Starting Workflow – Project Interdependencies</a:t>
-            </a:r>
-            <a:endParaRPr lang="en-IN" dirty="0"/>
-          </a:p>
-        </p:txBody>
-      </p:sp>
-      <p:sp>
-        <p:nvSpPr>
-          <p:cNvPr id="3" name="Content Placeholder 2">
-            <a:extLst>
-              <a:ext uri="{FF2B5EF4-FFF2-40B4-BE49-F238E27FC236}">
-                <a16:creationId xmlns:a16="http://schemas.microsoft.com/office/drawing/2014/main" id="{D2B9B5CA-5713-90E9-1BF9-A83143000B32}"/>
-              </a:ext>
-            </a:extLst>
-          </p:cNvPr>
-          <p:cNvSpPr>
-            <a:spLocks noGrp="1"/>
-          </p:cNvSpPr>
-          <p:nvPr>
-            <p:ph idx="1"/>
-          </p:nvPr>
-        </p:nvSpPr>
-        <p:spPr/>
-        <p:txBody>
-          <a:bodyPr/>
-          <a:lstStyle/>
-          <a:p>
-            <a:r>
-              <a:rPr lang="en-IN" dirty="0"/>
-              <a:t>Having a working </a:t>
-            </a:r>
-            <a:r>
-              <a:rPr lang="en-IN" b="1" dirty="0">
-                <a:solidFill>
-                  <a:srgbClr val="002060"/>
-                </a:solidFill>
-              </a:rPr>
-              <a:t>P1: </a:t>
-            </a:r>
-            <a:r>
-              <a:rPr lang="en-IN" b="1" dirty="0" err="1">
-                <a:solidFill>
-                  <a:srgbClr val="002060"/>
-                </a:solidFill>
-              </a:rPr>
-              <a:t>PowerFlow</a:t>
-            </a:r>
-            <a:r>
-              <a:rPr lang="en-IN" b="1" dirty="0">
-                <a:solidFill>
-                  <a:srgbClr val="002060"/>
-                </a:solidFill>
-              </a:rPr>
-              <a:t> </a:t>
-            </a:r>
-            <a:r>
-              <a:rPr lang="en-IN" dirty="0"/>
-              <a:t>code is a prerequisite for a couple of other tasks: (</a:t>
-            </a:r>
-            <a:r>
-              <a:rPr lang="en-IN" b="1" dirty="0">
-                <a:solidFill>
-                  <a:schemeClr val="accent6">
-                    <a:lumMod val="75000"/>
-                  </a:schemeClr>
-                </a:solidFill>
-              </a:rPr>
-              <a:t>P4: </a:t>
-            </a:r>
-            <a:r>
-              <a:rPr lang="en-IN" b="1" dirty="0" err="1">
-                <a:solidFill>
-                  <a:schemeClr val="accent6">
-                    <a:lumMod val="75000"/>
-                  </a:schemeClr>
-                </a:solidFill>
-              </a:rPr>
-              <a:t>StateEstimation</a:t>
-            </a:r>
-            <a:r>
-              <a:rPr lang="en-IN" b="1" dirty="0">
-                <a:solidFill>
-                  <a:schemeClr val="accent2">
-                    <a:lumMod val="75000"/>
-                  </a:schemeClr>
-                </a:solidFill>
-              </a:rPr>
-              <a:t>, P5: </a:t>
-            </a:r>
-            <a:r>
-              <a:rPr lang="en-IN" b="1" dirty="0" err="1">
-                <a:solidFill>
-                  <a:schemeClr val="accent2">
-                    <a:lumMod val="75000"/>
-                  </a:schemeClr>
-                </a:solidFill>
-              </a:rPr>
-              <a:t>OptimalPowerFlow</a:t>
-            </a:r>
-            <a:r>
-              <a:rPr lang="en-IN" dirty="0"/>
-              <a:t>). </a:t>
-            </a:r>
-            <a:r>
-              <a:rPr lang="en-IN" sz="1400" dirty="0"/>
-              <a:t>NRPF only though.</a:t>
-            </a:r>
-            <a:endParaRPr lang="en-IN" dirty="0"/>
-          </a:p>
-          <a:p>
-            <a:r>
-              <a:rPr lang="en-IN" b="1" dirty="0">
-                <a:solidFill>
-                  <a:srgbClr val="C00000"/>
-                </a:solidFill>
-              </a:rPr>
-              <a:t>P3: ContinuationPowerFlow </a:t>
-            </a:r>
-            <a:r>
-              <a:rPr lang="en-IN" dirty="0"/>
-              <a:t>does NOT require the full implementation of </a:t>
-            </a:r>
-            <a:r>
-              <a:rPr lang="en-IN" b="1" dirty="0">
-                <a:solidFill>
-                  <a:srgbClr val="002060"/>
-                </a:solidFill>
-              </a:rPr>
-              <a:t>P1 </a:t>
-            </a:r>
-            <a:r>
-              <a:rPr lang="en-IN" i="1" dirty="0" err="1">
-                <a:solidFill>
-                  <a:srgbClr val="002060"/>
-                </a:solidFill>
-              </a:rPr>
-              <a:t>solveForPowerFlow</a:t>
-            </a:r>
-            <a:r>
-              <a:rPr lang="en-IN" dirty="0"/>
-              <a:t>, and can be done in parallel. </a:t>
-            </a:r>
-            <a:r>
-              <a:rPr lang="en-IN" sz="1600" dirty="0"/>
-              <a:t>Some functions from </a:t>
-            </a:r>
-            <a:r>
-              <a:rPr lang="en-IN" sz="1600" dirty="0">
-                <a:solidFill>
-                  <a:srgbClr val="002060"/>
-                </a:solidFill>
-              </a:rPr>
-              <a:t>P1, including construction of Jacobian,</a:t>
-            </a:r>
-            <a:r>
-              <a:rPr lang="en-IN" sz="1600" dirty="0"/>
-              <a:t> are required though.</a:t>
-            </a:r>
-            <a:endParaRPr lang="en-IN" dirty="0"/>
-          </a:p>
-          <a:p>
-            <a:r>
-              <a:rPr lang="en-IN" dirty="0"/>
-              <a:t>Only </a:t>
-            </a:r>
-            <a:r>
-              <a:rPr lang="en-IN" b="1" dirty="0">
-                <a:solidFill>
-                  <a:schemeClr val="bg2">
-                    <a:lumMod val="50000"/>
-                  </a:schemeClr>
-                </a:solidFill>
-              </a:rPr>
-              <a:t>P2: </a:t>
-            </a:r>
-            <a:r>
-              <a:rPr lang="en-IN" b="1" dirty="0" err="1">
-                <a:solidFill>
-                  <a:schemeClr val="bg2">
-                    <a:lumMod val="50000"/>
-                  </a:schemeClr>
-                </a:solidFill>
-              </a:rPr>
-              <a:t>SparsePowerFlow</a:t>
-            </a:r>
-            <a:r>
-              <a:rPr lang="en-IN" b="1" dirty="0">
-                <a:solidFill>
-                  <a:schemeClr val="bg2">
-                    <a:lumMod val="50000"/>
-                  </a:schemeClr>
-                </a:solidFill>
-              </a:rPr>
-              <a:t> </a:t>
-            </a:r>
-            <a:r>
-              <a:rPr lang="en-IN" dirty="0"/>
-              <a:t>is a completely independent task, and can be done in parallel. </a:t>
-            </a:r>
-            <a:r>
-              <a:rPr lang="en-IN" sz="2000" dirty="0"/>
-              <a:t>In fact it is not permissible to use any assets from the other projects.</a:t>
-            </a:r>
-          </a:p>
-          <a:p>
-            <a:r>
-              <a:rPr lang="en-IN" dirty="0"/>
-              <a:t>Once </a:t>
-            </a:r>
-            <a:r>
-              <a:rPr lang="en-IN" b="1" dirty="0">
-                <a:solidFill>
-                  <a:srgbClr val="002060"/>
-                </a:solidFill>
-              </a:rPr>
-              <a:t>P1</a:t>
-            </a:r>
-            <a:r>
-              <a:rPr lang="en-IN" dirty="0"/>
-              <a:t> is completed ALL other projects can be completed in parallel, </a:t>
-            </a:r>
-            <a:r>
-              <a:rPr lang="en-IN" dirty="0" err="1"/>
-              <a:t>i.e</a:t>
-            </a:r>
-            <a:r>
-              <a:rPr lang="en-IN" dirty="0"/>
-              <a:t> </a:t>
-            </a:r>
-            <a:r>
-              <a:rPr lang="en-IN" b="1" dirty="0">
-                <a:solidFill>
-                  <a:schemeClr val="bg2">
-                    <a:lumMod val="50000"/>
-                  </a:schemeClr>
-                </a:solidFill>
-              </a:rPr>
-              <a:t>P2</a:t>
-            </a:r>
-            <a:r>
-              <a:rPr lang="en-IN" dirty="0"/>
-              <a:t>, </a:t>
-            </a:r>
-            <a:r>
-              <a:rPr lang="en-IN" b="1" dirty="0">
-                <a:solidFill>
-                  <a:srgbClr val="C00000"/>
-                </a:solidFill>
-              </a:rPr>
-              <a:t>P3</a:t>
-            </a:r>
-            <a:r>
-              <a:rPr lang="en-IN" dirty="0"/>
-              <a:t>, </a:t>
-            </a:r>
-            <a:r>
-              <a:rPr lang="en-IN" b="1" dirty="0">
-                <a:solidFill>
-                  <a:schemeClr val="accent6">
-                    <a:lumMod val="75000"/>
-                  </a:schemeClr>
-                </a:solidFill>
-              </a:rPr>
-              <a:t>P4</a:t>
-            </a:r>
-            <a:r>
-              <a:rPr lang="en-IN" dirty="0"/>
-              <a:t> and </a:t>
-            </a:r>
-            <a:r>
-              <a:rPr lang="en-IN" b="1" dirty="0">
-                <a:solidFill>
-                  <a:schemeClr val="accent2">
-                    <a:lumMod val="75000"/>
-                  </a:schemeClr>
-                </a:solidFill>
-              </a:rPr>
-              <a:t>P5</a:t>
-            </a:r>
-            <a:r>
-              <a:rPr lang="en-IN" dirty="0"/>
-              <a:t> do NOT have any interdependencies.</a:t>
-            </a:r>
-          </a:p>
-        </p:txBody>
-      </p:sp>
-    </p:spTree>
-    <p:extLst>
-      <p:ext uri="{BB962C8B-B14F-4D97-AF65-F5344CB8AC3E}">
-        <p14:creationId xmlns:p14="http://schemas.microsoft.com/office/powerpoint/2010/main" val="3614275470"/>
-      </p:ext>
-    </p:extLst>
-  </p:cSld>
-  <p:clrMapOvr>
-    <a:masterClrMapping/>
-  </p:clrMapOvr>
-</p:sld>
-</file>
-
 <file path=ppt/slides/slide19.xml><?xml version="1.0" encoding="utf-8"?>
 <p:sld xmlns:a="http://schemas.openxmlformats.org/drawingml/2006/main" xmlns:r="http://schemas.openxmlformats.org/officeDocument/2006/relationships" xmlns:p="http://schemas.openxmlformats.org/presentationml/2006/main">
   <p:cSld>
@@ -10990,7 +10826,7 @@
           <p:cNvPr id="2" name="Title 1">
             <a:extLst>
               <a:ext uri="{FF2B5EF4-FFF2-40B4-BE49-F238E27FC236}">
-                <a16:creationId xmlns:a16="http://schemas.microsoft.com/office/drawing/2014/main" id="{E3C2F43C-7AEF-F81D-5A1D-BA4D0EEFA722}"/>
+                <a16:creationId xmlns:a16="http://schemas.microsoft.com/office/drawing/2014/main" id="{336429DC-BFF4-DD6A-7726-27957283ABBE}"/>
               </a:ext>
             </a:extLst>
           </p:cNvPr>
@@ -11008,7 +10844,7 @@
           <a:p>
             <a:r>
               <a:rPr lang="en-IN"/>
-              <a:t>Starting Design Decisions</a:t>
+              <a:t>Starting Workflow – Project Interdependencies</a:t>
             </a:r>
             <a:endParaRPr lang="en-IN" dirty="0"/>
           </a:p>
@@ -11019,7 +10855,7 @@
           <p:cNvPr id="3" name="Content Placeholder 2">
             <a:extLst>
               <a:ext uri="{FF2B5EF4-FFF2-40B4-BE49-F238E27FC236}">
-                <a16:creationId xmlns:a16="http://schemas.microsoft.com/office/drawing/2014/main" id="{47EC802A-58BC-49AC-B799-01F826A6262A}"/>
+                <a16:creationId xmlns:a16="http://schemas.microsoft.com/office/drawing/2014/main" id="{D2B9B5CA-5713-90E9-1BF9-A83143000B32}"/>
               </a:ext>
             </a:extLst>
           </p:cNvPr>
@@ -11032,91 +10868,20 @@
         </p:nvSpPr>
         <p:spPr/>
         <p:txBody>
-          <a:bodyPr>
-            <a:normAutofit/>
-          </a:bodyPr>
+          <a:bodyPr/>
           <a:lstStyle/>
           <a:p>
             <a:r>
               <a:rPr lang="en-IN" dirty="0"/>
-              <a:t>A SINGLE main file, from where </a:t>
-            </a:r>
-            <a:r>
-              <a:rPr lang="en-IN" dirty="0" err="1"/>
-              <a:t>Dr.</a:t>
-            </a:r>
-            <a:r>
-              <a:rPr lang="en-IN" dirty="0"/>
-              <a:t> Noel can be shown all five projects with just a few clicks. </a:t>
-            </a:r>
-            <a:r>
-              <a:rPr lang="en-IN" sz="1800" dirty="0"/>
-              <a:t>This file should only contain meta information, like user defined variables. E.g. whether to </a:t>
-            </a:r>
-            <a:r>
-              <a:rPr lang="en-IN" sz="1800" dirty="0" err="1"/>
-              <a:t>plotResults</a:t>
-            </a:r>
-            <a:r>
-              <a:rPr lang="en-IN" sz="1800" dirty="0"/>
-              <a:t>, show </a:t>
-            </a:r>
-            <a:r>
-              <a:rPr lang="en-IN" sz="1800" dirty="0" err="1"/>
-              <a:t>yBus</a:t>
-            </a:r>
-            <a:r>
-              <a:rPr lang="en-IN" sz="1800" dirty="0"/>
-              <a:t>, save Jacobians, </a:t>
-            </a:r>
-            <a:r>
-              <a:rPr lang="en-IN" sz="1800" dirty="0" err="1"/>
-              <a:t>plotCPF</a:t>
-            </a:r>
-            <a:r>
-              <a:rPr lang="en-IN" sz="1800" dirty="0"/>
-              <a:t> curves, which is the chosen CPF bus, showing some symbolic formulae, saving tables, etc.</a:t>
-            </a:r>
-          </a:p>
-          <a:p>
-            <a:r>
-              <a:rPr lang="en-IN" dirty="0"/>
-              <a:t>Use </a:t>
-            </a:r>
-            <a:r>
-              <a:rPr lang="en-IN" dirty="0" err="1"/>
-              <a:t>DataFrames</a:t>
-            </a:r>
-            <a:r>
-              <a:rPr lang="en-IN" dirty="0"/>
-              <a:t> (tables) for </a:t>
-            </a:r>
-            <a:r>
-              <a:rPr lang="en-IN" dirty="0" err="1"/>
-              <a:t>busData</a:t>
-            </a:r>
-            <a:r>
-              <a:rPr lang="en-IN" dirty="0"/>
-              <a:t>, </a:t>
-            </a:r>
-            <a:r>
-              <a:rPr lang="en-IN" dirty="0" err="1"/>
-              <a:t>branchData</a:t>
-            </a:r>
-            <a:r>
-              <a:rPr lang="en-IN" dirty="0"/>
-              <a:t> (and a handful of other results). </a:t>
-            </a:r>
-            <a:r>
-              <a:rPr lang="en-IN" sz="1600" dirty="0"/>
-              <a:t>For convenient data retrieval, good visualization.</a:t>
-            </a:r>
-            <a:endParaRPr lang="en-IN" dirty="0"/>
-          </a:p>
-          <a:p>
-            <a:r>
-              <a:rPr lang="en-IN" dirty="0"/>
-              <a:t>Write functions in modules. Modules can be </a:t>
+              <a:t>Having a working </a:t>
+            </a:r>
+            <a:r>
+              <a:rPr lang="en-IN" b="1" dirty="0">
+                <a:solidFill>
+                  <a:srgbClr val="002060"/>
+                </a:solidFill>
+              </a:rPr>
+              <a:t>P1: </a:t>
             </a:r>
             <a:r>
               <a:rPr lang="en-IN" b="1" dirty="0" err="1">
@@ -11124,11 +10889,135 @@
                   <a:srgbClr val="002060"/>
                 </a:solidFill>
               </a:rPr>
-              <a:t>NKGPowerFlow</a:t>
+              <a:t>PowerFlow</a:t>
+            </a:r>
+            <a:r>
+              <a:rPr lang="en-IN" b="1" dirty="0">
+                <a:solidFill>
+                  <a:srgbClr val="002060"/>
+                </a:solidFill>
+              </a:rPr>
+              <a:t> </a:t>
             </a:r>
             <a:r>
               <a:rPr lang="en-IN" dirty="0"/>
-              <a:t>, </a:t>
+              <a:t>code is a prerequisite for a couple of other tasks: (</a:t>
+            </a:r>
+            <a:r>
+              <a:rPr lang="en-IN" b="1" dirty="0">
+                <a:solidFill>
+                  <a:schemeClr val="accent6">
+                    <a:lumMod val="75000"/>
+                  </a:schemeClr>
+                </a:solidFill>
+              </a:rPr>
+              <a:t>P4: </a:t>
+            </a:r>
+            <a:r>
+              <a:rPr lang="en-IN" b="1" dirty="0" err="1">
+                <a:solidFill>
+                  <a:schemeClr val="accent6">
+                    <a:lumMod val="75000"/>
+                  </a:schemeClr>
+                </a:solidFill>
+              </a:rPr>
+              <a:t>StateEstimation</a:t>
+            </a:r>
+            <a:r>
+              <a:rPr lang="en-IN" b="1" dirty="0">
+                <a:solidFill>
+                  <a:schemeClr val="accent2">
+                    <a:lumMod val="75000"/>
+                  </a:schemeClr>
+                </a:solidFill>
+              </a:rPr>
+              <a:t>, P5: </a:t>
+            </a:r>
+            <a:r>
+              <a:rPr lang="en-IN" b="1" dirty="0" err="1">
+                <a:solidFill>
+                  <a:schemeClr val="accent2">
+                    <a:lumMod val="75000"/>
+                  </a:schemeClr>
+                </a:solidFill>
+              </a:rPr>
+              <a:t>OptimalPowerFlow</a:t>
+            </a:r>
+            <a:r>
+              <a:rPr lang="en-IN" dirty="0"/>
+              <a:t>). </a:t>
+            </a:r>
+            <a:r>
+              <a:rPr lang="en-IN" sz="1400" dirty="0"/>
+              <a:t>NRPF only though.</a:t>
+            </a:r>
+            <a:endParaRPr lang="en-IN" dirty="0"/>
+          </a:p>
+          <a:p>
+            <a:r>
+              <a:rPr lang="en-IN" b="1" dirty="0">
+                <a:solidFill>
+                  <a:srgbClr val="C00000"/>
+                </a:solidFill>
+              </a:rPr>
+              <a:t>P3: ContinuationPowerFlow </a:t>
+            </a:r>
+            <a:r>
+              <a:rPr lang="en-IN" dirty="0"/>
+              <a:t>does NOT require the full implementation of </a:t>
+            </a:r>
+            <a:r>
+              <a:rPr lang="en-IN" b="1" dirty="0">
+                <a:solidFill>
+                  <a:srgbClr val="002060"/>
+                </a:solidFill>
+              </a:rPr>
+              <a:t>P1 </a:t>
+            </a:r>
+            <a:r>
+              <a:rPr lang="en-IN" i="1" dirty="0" err="1">
+                <a:solidFill>
+                  <a:srgbClr val="002060"/>
+                </a:solidFill>
+              </a:rPr>
+              <a:t>solveForPowerFlow</a:t>
+            </a:r>
+            <a:r>
+              <a:rPr lang="en-IN" dirty="0"/>
+              <a:t>, and can be done in parallel. </a:t>
+            </a:r>
+            <a:r>
+              <a:rPr lang="en-IN" sz="1600" dirty="0"/>
+              <a:t>Some functions from </a:t>
+            </a:r>
+            <a:r>
+              <a:rPr lang="en-IN" sz="1600" dirty="0">
+                <a:solidFill>
+                  <a:srgbClr val="002060"/>
+                </a:solidFill>
+              </a:rPr>
+              <a:t>P1, including construction of Jacobian,</a:t>
+            </a:r>
+            <a:r>
+              <a:rPr lang="en-IN" sz="1600" dirty="0"/>
+              <a:t> are required though.</a:t>
+            </a:r>
+            <a:endParaRPr lang="en-IN" dirty="0"/>
+          </a:p>
+          <a:p>
+            <a:r>
+              <a:rPr lang="en-IN" dirty="0"/>
+              <a:t>Only </a:t>
+            </a:r>
+            <a:r>
+              <a:rPr lang="en-IN" b="1" dirty="0">
+                <a:solidFill>
+                  <a:schemeClr val="bg2">
+                    <a:lumMod val="50000"/>
+                  </a:schemeClr>
+                </a:solidFill>
+              </a:rPr>
+              <a:t>P2: </a:t>
             </a:r>
             <a:r>
               <a:rPr lang="en-IN" b="1" dirty="0" err="1">
@@ -11138,63 +11027,105 @@
                   </a:schemeClr>
                 </a:solidFill>
               </a:rPr>
-              <a:t>NKGSparsePowerFlow</a:t>
+              <a:t>SparsePowerFlow</a:t>
+            </a:r>
+            <a:r>
+              <a:rPr lang="en-IN" b="1" dirty="0">
+                <a:solidFill>
+                  <a:schemeClr val="bg2">
+                    <a:lumMod val="50000"/>
+                  </a:schemeClr>
+                </a:solidFill>
+              </a:rPr>
+              <a:t> </a:t>
+            </a:r>
+            <a:r>
+              <a:rPr lang="en-IN" dirty="0"/>
+              <a:t>is a completely independent task, and can be done in parallel. </a:t>
+            </a:r>
+            <a:r>
+              <a:rPr lang="en-IN" sz="2000" dirty="0"/>
+              <a:t>In fact it is not permissible to use any assets from the other projects.</a:t>
+            </a:r>
+          </a:p>
+          <a:p>
+            <a:r>
+              <a:rPr lang="en-IN" dirty="0"/>
+              <a:t>Once </a:t>
+            </a:r>
+            <a:r>
+              <a:rPr lang="en-IN" b="1" dirty="0">
+                <a:solidFill>
+                  <a:srgbClr val="002060"/>
+                </a:solidFill>
+              </a:rPr>
+              <a:t>P1</a:t>
+            </a:r>
+            <a:r>
+              <a:rPr lang="en-IN" dirty="0"/>
+              <a:t> is completed ALL other projects can be completed in parallel, </a:t>
+            </a:r>
+            <a:r>
+              <a:rPr lang="en-IN" dirty="0" err="1"/>
+              <a:t>i.e</a:t>
+            </a:r>
+            <a:r>
+              <a:rPr lang="en-IN" dirty="0"/>
+              <a:t> </a:t>
+            </a:r>
+            <a:r>
+              <a:rPr lang="en-IN" b="1" dirty="0">
+                <a:solidFill>
+                  <a:schemeClr val="bg2">
+                    <a:lumMod val="50000"/>
+                  </a:schemeClr>
+                </a:solidFill>
+              </a:rPr>
+              <a:t>P2</a:t>
             </a:r>
             <a:r>
               <a:rPr lang="en-IN" dirty="0"/>
               <a:t>, </a:t>
             </a:r>
             <a:r>
-              <a:rPr lang="en-IN" b="1" dirty="0" err="1">
+              <a:rPr lang="en-IN" b="1" dirty="0">
                 <a:solidFill>
                   <a:srgbClr val="C00000"/>
                 </a:solidFill>
               </a:rPr>
-              <a:t>NKGContinuationPowerFlow</a:t>
+              <a:t>P3</a:t>
             </a:r>
             <a:r>
               <a:rPr lang="en-IN" dirty="0"/>
               <a:t>, </a:t>
             </a:r>
             <a:r>
-              <a:rPr lang="en-IN" b="1" dirty="0" err="1">
+              <a:rPr lang="en-IN" b="1" dirty="0">
                 <a:solidFill>
                   <a:schemeClr val="accent6">
                     <a:lumMod val="75000"/>
                   </a:schemeClr>
                 </a:solidFill>
               </a:rPr>
-              <a:t>NKGStateEstimation</a:t>
+              <a:t>P4</a:t>
             </a:r>
             <a:r>
               <a:rPr lang="en-IN" dirty="0"/>
               <a:t> and </a:t>
             </a:r>
             <a:r>
-              <a:rPr lang="en-IN" b="1" dirty="0" err="1">
+              <a:rPr lang="en-IN" b="1" dirty="0">
                 <a:solidFill>
                   <a:schemeClr val="accent2">
                     <a:lumMod val="75000"/>
                   </a:schemeClr>
                 </a:solidFill>
               </a:rPr>
-              <a:t>NKGOptimization</a:t>
+              <a:t>P5</a:t>
             </a:r>
             <a:r>
               <a:rPr lang="en-IN" dirty="0"/>
-              <a:t>. </a:t>
-            </a:r>
-            <a:r>
-              <a:rPr lang="en-IN" sz="1400" dirty="0"/>
-              <a:t>Unlike MATLAB where it is standard to write a single function in a single .m/.mlx file and just </a:t>
-            </a:r>
-            <a:r>
-              <a:rPr lang="en-IN" sz="1400" dirty="0" err="1"/>
-              <a:t>addpath</a:t>
-            </a:r>
-            <a:r>
-              <a:rPr lang="en-IN" sz="1400" dirty="0"/>
-              <a:t> the address of all the functions.</a:t>
+              <a:t> do NOT have any interdependencies.</a:t>
             </a:r>
           </a:p>
         </p:txBody>
@@ -11202,7 +11133,7 @@
     </p:spTree>
     <p:extLst>
       <p:ext uri="{BB962C8B-B14F-4D97-AF65-F5344CB8AC3E}">
-        <p14:creationId xmlns:p14="http://schemas.microsoft.com/office/powerpoint/2010/main" val="4245827623"/>
+        <p14:creationId xmlns:p14="http://schemas.microsoft.com/office/powerpoint/2010/main" val="3614275470"/>
       </p:ext>
     </p:extLst>
   </p:cSld>
@@ -11436,6 +11367,250 @@
 </file>
 
 <file path=ppt/slides/slide20.xml><?xml version="1.0" encoding="utf-8"?>
+<p:sld xmlns:a="http://schemas.openxmlformats.org/drawingml/2006/main" xmlns:r="http://schemas.openxmlformats.org/officeDocument/2006/relationships" xmlns:p="http://schemas.openxmlformats.org/presentationml/2006/main">
+  <p:cSld>
+    <p:spTree>
+      <p:nvGrpSpPr>
+        <p:cNvPr id="1" name=""/>
+        <p:cNvGrpSpPr/>
+        <p:nvPr/>
+      </p:nvGrpSpPr>
+      <p:grpSpPr>
+        <a:xfrm>
+          <a:off x="0" y="0"/>
+          <a:ext cx="0" cy="0"/>
+          <a:chOff x="0" y="0"/>
+          <a:chExt cx="0" cy="0"/>
+        </a:xfrm>
+      </p:grpSpPr>
+      <p:sp>
+        <p:nvSpPr>
+          <p:cNvPr id="2" name="Title 1">
+            <a:extLst>
+              <a:ext uri="{FF2B5EF4-FFF2-40B4-BE49-F238E27FC236}">
+                <a16:creationId xmlns:a16="http://schemas.microsoft.com/office/drawing/2014/main" id="{E3C2F43C-7AEF-F81D-5A1D-BA4D0EEFA722}"/>
+              </a:ext>
+            </a:extLst>
+          </p:cNvPr>
+          <p:cNvSpPr>
+            <a:spLocks noGrp="1"/>
+          </p:cNvSpPr>
+          <p:nvPr>
+            <p:ph type="title"/>
+          </p:nvPr>
+        </p:nvSpPr>
+        <p:spPr/>
+        <p:txBody>
+          <a:bodyPr/>
+          <a:lstStyle/>
+          <a:p>
+            <a:r>
+              <a:rPr lang="en-IN"/>
+              <a:t>Starting Design Decisions</a:t>
+            </a:r>
+            <a:endParaRPr lang="en-IN" dirty="0"/>
+          </a:p>
+        </p:txBody>
+      </p:sp>
+      <p:sp>
+        <p:nvSpPr>
+          <p:cNvPr id="3" name="Content Placeholder 2">
+            <a:extLst>
+              <a:ext uri="{FF2B5EF4-FFF2-40B4-BE49-F238E27FC236}">
+                <a16:creationId xmlns:a16="http://schemas.microsoft.com/office/drawing/2014/main" id="{47EC802A-58BC-49AC-B799-01F826A6262A}"/>
+              </a:ext>
+            </a:extLst>
+          </p:cNvPr>
+          <p:cNvSpPr>
+            <a:spLocks noGrp="1"/>
+          </p:cNvSpPr>
+          <p:nvPr>
+            <p:ph idx="1"/>
+          </p:nvPr>
+        </p:nvSpPr>
+        <p:spPr/>
+        <p:txBody>
+          <a:bodyPr>
+            <a:normAutofit/>
+          </a:bodyPr>
+          <a:lstStyle/>
+          <a:p>
+            <a:r>
+              <a:rPr lang="en-IN" dirty="0"/>
+              <a:t>A SINGLE main file, from where </a:t>
+            </a:r>
+            <a:r>
+              <a:rPr lang="en-IN" dirty="0" err="1"/>
+              <a:t>Dr.</a:t>
+            </a:r>
+            <a:r>
+              <a:rPr lang="en-IN" dirty="0"/>
+              <a:t> Noel can be shown all five projects with just a few clicks. </a:t>
+            </a:r>
+            <a:r>
+              <a:rPr lang="en-IN" sz="1800" dirty="0"/>
+              <a:t>This file should only contain meta information, like user defined variables. E.g. whether to </a:t>
+            </a:r>
+            <a:r>
+              <a:rPr lang="en-IN" sz="1800" dirty="0" err="1"/>
+              <a:t>plotResults</a:t>
+            </a:r>
+            <a:r>
+              <a:rPr lang="en-IN" sz="1800" dirty="0"/>
+              <a:t>, show </a:t>
+            </a:r>
+            <a:r>
+              <a:rPr lang="en-IN" sz="1800" dirty="0" err="1"/>
+              <a:t>yBus</a:t>
+            </a:r>
+            <a:r>
+              <a:rPr lang="en-IN" sz="1800" dirty="0"/>
+              <a:t>, save Jacobians, </a:t>
+            </a:r>
+            <a:r>
+              <a:rPr lang="en-IN" sz="1800" dirty="0" err="1"/>
+              <a:t>plotCPF</a:t>
+            </a:r>
+            <a:r>
+              <a:rPr lang="en-IN" sz="1800" dirty="0"/>
+              <a:t> curves, which is the chosen CPF bus, showing some symbolic formulae, saving tables, etc.</a:t>
+            </a:r>
+          </a:p>
+          <a:p>
+            <a:r>
+              <a:rPr lang="en-IN" dirty="0"/>
+              <a:t>Use </a:t>
+            </a:r>
+            <a:r>
+              <a:rPr lang="en-IN" dirty="0" err="1"/>
+              <a:t>DataFrames</a:t>
+            </a:r>
+            <a:r>
+              <a:rPr lang="en-IN" dirty="0"/>
+              <a:t> (tables) for </a:t>
+            </a:r>
+            <a:r>
+              <a:rPr lang="en-IN" dirty="0" err="1"/>
+              <a:t>busData</a:t>
+            </a:r>
+            <a:r>
+              <a:rPr lang="en-IN" dirty="0"/>
+              <a:t>, </a:t>
+            </a:r>
+            <a:r>
+              <a:rPr lang="en-IN" dirty="0" err="1"/>
+              <a:t>branchData</a:t>
+            </a:r>
+            <a:r>
+              <a:rPr lang="en-IN" dirty="0"/>
+              <a:t> (and a handful of other results). </a:t>
+            </a:r>
+            <a:r>
+              <a:rPr lang="en-IN" sz="1600" dirty="0"/>
+              <a:t>For convenient data retrieval, good visualization.</a:t>
+            </a:r>
+            <a:endParaRPr lang="en-IN" dirty="0"/>
+          </a:p>
+          <a:p>
+            <a:r>
+              <a:rPr lang="en-IN" dirty="0"/>
+              <a:t>Write functions in modules. Modules can be </a:t>
+            </a:r>
+            <a:r>
+              <a:rPr lang="en-IN" b="1" dirty="0" err="1">
+                <a:solidFill>
+                  <a:srgbClr val="002060"/>
+                </a:solidFill>
+              </a:rPr>
+              <a:t>NKGPowerFlow</a:t>
+            </a:r>
+            <a:r>
+              <a:rPr lang="en-IN" dirty="0"/>
+              <a:t>, </a:t>
+            </a:r>
+            <a:r>
+              <a:rPr lang="en-IN" b="1" dirty="0" err="1">
+                <a:solidFill>
+                  <a:schemeClr val="bg2">
+                    <a:lumMod val="50000"/>
+                  </a:schemeClr>
+                </a:solidFill>
+              </a:rPr>
+              <a:t>NKGSparsePowerFlow</a:t>
+            </a:r>
+            <a:r>
+              <a:rPr lang="en-IN" dirty="0"/>
+              <a:t>, </a:t>
+            </a:r>
+            <a:r>
+              <a:rPr lang="en-IN" b="1" dirty="0" err="1">
+                <a:solidFill>
+                  <a:srgbClr val="C00000"/>
+                </a:solidFill>
+              </a:rPr>
+              <a:t>NKGContinuationPowerFlow</a:t>
+            </a:r>
+            <a:r>
+              <a:rPr lang="en-IN" dirty="0"/>
+              <a:t>, </a:t>
+            </a:r>
+            <a:r>
+              <a:rPr lang="en-IN" b="1" dirty="0" err="1">
+                <a:solidFill>
+                  <a:schemeClr val="accent6">
+                    <a:lumMod val="75000"/>
+                  </a:schemeClr>
+                </a:solidFill>
+              </a:rPr>
+              <a:t>NKGStateEstimation</a:t>
+            </a:r>
+            <a:r>
+              <a:rPr lang="en-IN" dirty="0"/>
+              <a:t> and </a:t>
+            </a:r>
+            <a:r>
+              <a:rPr lang="en-IN" b="1" dirty="0" err="1">
+                <a:solidFill>
+                  <a:schemeClr val="accent2">
+                    <a:lumMod val="75000"/>
+                  </a:schemeClr>
+                </a:solidFill>
+              </a:rPr>
+              <a:t>NKGOptimization</a:t>
+            </a:r>
+            <a:r>
+              <a:rPr lang="en-IN" dirty="0"/>
+              <a:t>. </a:t>
+            </a:r>
+            <a:r>
+              <a:rPr lang="en-IN" sz="1400" dirty="0"/>
+              <a:t>Unlike MATLAB where it is standard to write a single function in a single .m/.mlx file and just </a:t>
+            </a:r>
+            <a:r>
+              <a:rPr lang="en-IN" sz="1400" dirty="0" err="1"/>
+              <a:t>addpath</a:t>
+            </a:r>
+            <a:r>
+              <a:rPr lang="en-IN" sz="1400" dirty="0"/>
+              <a:t> the address of all the functions.</a:t>
+            </a:r>
+          </a:p>
+        </p:txBody>
+      </p:sp>
+    </p:spTree>
+    <p:extLst>
+      <p:ext uri="{BB962C8B-B14F-4D97-AF65-F5344CB8AC3E}">
+        <p14:creationId xmlns:p14="http://schemas.microsoft.com/office/powerpoint/2010/main" val="4245827623"/>
+      </p:ext>
+    </p:extLst>
+  </p:cSld>
+  <p:clrMapOvr>
+    <a:masterClrMapping/>
+  </p:clrMapOvr>
+</p:sld>
+</file>
+
+<file path=ppt/slides/slide21.xml><?xml version="1.0" encoding="utf-8"?>
 <p:sld xmlns:a="http://schemas.openxmlformats.org/drawingml/2006/main" xmlns:r="http://schemas.openxmlformats.org/officeDocument/2006/relationships" xmlns:p="http://schemas.openxmlformats.org/presentationml/2006/main">
   <p:cSld>
     <p:bg>
@@ -11737,7 +11912,7 @@
 </p:sld>
 </file>
 
-<file path=ppt/slides/slide21.xml><?xml version="1.0" encoding="utf-8"?>
+<file path=ppt/slides/slide22.xml><?xml version="1.0" encoding="utf-8"?>
 <p:sld xmlns:a="http://schemas.openxmlformats.org/drawingml/2006/main" xmlns:r="http://schemas.openxmlformats.org/officeDocument/2006/relationships" xmlns:p="http://schemas.openxmlformats.org/presentationml/2006/main">
   <p:cSld>
     <p:bg>
@@ -12590,323 +12765,6 @@
 </p:sld>
 </file>
 
-<file path=ppt/slides/slide22.xml><?xml version="1.0" encoding="utf-8"?>
-<p:sld xmlns:a="http://schemas.openxmlformats.org/drawingml/2006/main" xmlns:r="http://schemas.openxmlformats.org/officeDocument/2006/relationships" xmlns:p="http://schemas.openxmlformats.org/presentationml/2006/main">
-  <p:cSld>
-    <p:spTree>
-      <p:nvGrpSpPr>
-        <p:cNvPr id="1" name=""/>
-        <p:cNvGrpSpPr/>
-        <p:nvPr/>
-      </p:nvGrpSpPr>
-      <p:grpSpPr>
-        <a:xfrm>
-          <a:off x="0" y="0"/>
-          <a:ext cx="0" cy="0"/>
-          <a:chOff x="0" y="0"/>
-          <a:chExt cx="0" cy="0"/>
-        </a:xfrm>
-      </p:grpSpPr>
-      <p:sp>
-        <p:nvSpPr>
-          <p:cNvPr id="2" name="Title 1">
-            <a:extLst>
-              <a:ext uri="{FF2B5EF4-FFF2-40B4-BE49-F238E27FC236}">
-                <a16:creationId xmlns:a16="http://schemas.microsoft.com/office/drawing/2014/main" id="{E3C2F43C-7AEF-F81D-5A1D-BA4D0EEFA722}"/>
-              </a:ext>
-            </a:extLst>
-          </p:cNvPr>
-          <p:cNvSpPr>
-            <a:spLocks noGrp="1"/>
-          </p:cNvSpPr>
-          <p:nvPr>
-            <p:ph type="title"/>
-          </p:nvPr>
-        </p:nvSpPr>
-        <p:spPr/>
-        <p:txBody>
-          <a:bodyPr/>
-          <a:lstStyle/>
-          <a:p>
-            <a:r>
-              <a:rPr lang="en-IN"/>
-              <a:t>Starting Design Decisions</a:t>
-            </a:r>
-            <a:endParaRPr lang="en-IN" dirty="0"/>
-          </a:p>
-        </p:txBody>
-      </p:sp>
-      <p:sp>
-        <p:nvSpPr>
-          <p:cNvPr id="3" name="Content Placeholder 2">
-            <a:extLst>
-              <a:ext uri="{FF2B5EF4-FFF2-40B4-BE49-F238E27FC236}">
-                <a16:creationId xmlns:a16="http://schemas.microsoft.com/office/drawing/2014/main" id="{47EC802A-58BC-49AC-B799-01F826A6262A}"/>
-              </a:ext>
-            </a:extLst>
-          </p:cNvPr>
-          <p:cNvSpPr>
-            <a:spLocks noGrp="1"/>
-          </p:cNvSpPr>
-          <p:nvPr>
-            <p:ph idx="1"/>
-          </p:nvPr>
-        </p:nvSpPr>
-        <p:spPr/>
-        <p:txBody>
-          <a:bodyPr>
-            <a:normAutofit fontScale="77500" lnSpcReduction="20000"/>
-          </a:bodyPr>
-          <a:lstStyle/>
-          <a:p>
-            <a:r>
-              <a:rPr lang="en-US" dirty="0">
-                <a:solidFill>
-                  <a:srgbClr val="FF0000"/>
-                </a:solidFill>
-              </a:rPr>
-              <a:t>Question</a:t>
-            </a:r>
-            <a:r>
-              <a:rPr lang="en-US" dirty="0"/>
-              <a:t>: Numerical parameters specific to an algorithm, like </a:t>
-            </a:r>
-            <a:r>
-              <a:rPr lang="en-US" sz="2000" dirty="0" err="1">
-                <a:latin typeface="Courier New" panose="02070309020205020404" pitchFamily="49" charset="0"/>
-                <a:cs typeface="Courier New" panose="02070309020205020404" pitchFamily="49" charset="0"/>
-              </a:rPr>
-              <a:t>toleranceLimit</a:t>
-            </a:r>
-            <a:r>
-              <a:rPr lang="en-US" dirty="0"/>
-              <a:t>, </a:t>
-            </a:r>
-            <a:r>
-              <a:rPr lang="en-US" sz="2000" dirty="0" err="1">
-                <a:latin typeface="Courier New" panose="02070309020205020404" pitchFamily="49" charset="0"/>
-                <a:cs typeface="Courier New" panose="02070309020205020404" pitchFamily="49" charset="0"/>
-              </a:rPr>
-              <a:t>maxIterations</a:t>
-            </a:r>
-            <a:r>
-              <a:rPr lang="en-US" dirty="0"/>
-              <a:t> for NRPF in </a:t>
-            </a:r>
-            <a:r>
-              <a:rPr lang="en-US" b="1" dirty="0">
-                <a:solidFill>
-                  <a:srgbClr val="002060"/>
-                </a:solidFill>
-              </a:rPr>
-              <a:t>P1</a:t>
-            </a:r>
-            <a:r>
-              <a:rPr lang="en-US" dirty="0"/>
-              <a:t>, </a:t>
-            </a:r>
-            <a:r>
-              <a:rPr lang="en-US" sz="2000" dirty="0" err="1">
-                <a:latin typeface="Courier New" panose="02070309020205020404" pitchFamily="49" charset="0"/>
-                <a:cs typeface="Courier New" panose="02070309020205020404" pitchFamily="49" charset="0"/>
-              </a:rPr>
-              <a:t>CPFItrMax</a:t>
-            </a:r>
-            <a:r>
-              <a:rPr lang="en-US" dirty="0"/>
-              <a:t>, </a:t>
-            </a:r>
-            <a:r>
-              <a:rPr lang="en-US" sz="2000" dirty="0" err="1">
-                <a:latin typeface="Courier New" panose="02070309020205020404" pitchFamily="49" charset="0"/>
-                <a:cs typeface="Courier New" panose="02070309020205020404" pitchFamily="49" charset="0"/>
-              </a:rPr>
-              <a:t>SectionItrMax</a:t>
-            </a:r>
-            <a:r>
-              <a:rPr lang="en-US" dirty="0"/>
-              <a:t>, </a:t>
-            </a:r>
-            <a:r>
-              <a:rPr lang="en-US" sz="2000" dirty="0">
-                <a:latin typeface="Courier New" panose="02070309020205020404" pitchFamily="49" charset="0"/>
-                <a:cs typeface="Courier New" panose="02070309020205020404" pitchFamily="49" charset="0"/>
-              </a:rPr>
-              <a:t>sigma1</a:t>
-            </a:r>
-            <a:r>
-              <a:rPr lang="en-US" dirty="0"/>
-              <a:t>, </a:t>
-            </a:r>
-            <a:r>
-              <a:rPr lang="en-US" sz="2000" dirty="0">
-                <a:latin typeface="Courier New" panose="02070309020205020404" pitchFamily="49" charset="0"/>
-                <a:cs typeface="Courier New" panose="02070309020205020404" pitchFamily="49" charset="0"/>
-              </a:rPr>
-              <a:t>2</a:t>
-            </a:r>
-            <a:r>
-              <a:rPr lang="en-US" dirty="0"/>
-              <a:t> and </a:t>
-            </a:r>
-            <a:r>
-              <a:rPr lang="en-US" sz="2000" dirty="0">
-                <a:latin typeface="Courier New" panose="02070309020205020404" pitchFamily="49" charset="0"/>
-                <a:cs typeface="Courier New" panose="02070309020205020404" pitchFamily="49" charset="0"/>
-              </a:rPr>
-              <a:t>3</a:t>
-            </a:r>
-            <a:r>
-              <a:rPr lang="en-US" dirty="0"/>
-              <a:t> for </a:t>
-            </a:r>
-            <a:r>
-              <a:rPr lang="en-US" b="1" dirty="0">
-                <a:solidFill>
-                  <a:srgbClr val="FF0000"/>
-                </a:solidFill>
-              </a:rPr>
-              <a:t>P3</a:t>
-            </a:r>
-            <a:r>
-              <a:rPr lang="en-US" dirty="0"/>
-              <a:t>, and so on.. which are NOT </a:t>
-            </a:r>
-            <a:r>
-              <a:rPr lang="en-US" dirty="0" err="1"/>
-              <a:t>gonna</a:t>
-            </a:r>
-            <a:r>
-              <a:rPr lang="en-US" dirty="0"/>
-              <a:t> be changed or altered by a Dr. Noel:</a:t>
-            </a:r>
-            <a:br>
-              <a:rPr lang="en-US" dirty="0"/>
-            </a:br>
-            <a:r>
-              <a:rPr lang="en-US" dirty="0"/>
-              <a:t>Should they be </a:t>
-            </a:r>
-          </a:p>
-          <a:p>
-            <a:pPr lvl="1"/>
-            <a:r>
-              <a:rPr lang="en-US" dirty="0"/>
-              <a:t>1. hidden from a user away in the function? </a:t>
-            </a:r>
-          </a:p>
-          <a:p>
-            <a:pPr lvl="2"/>
-            <a:r>
-              <a:rPr lang="en-US" dirty="0"/>
-              <a:t>Pros: </a:t>
-            </a:r>
-          </a:p>
-          <a:p>
-            <a:pPr lvl="3"/>
-            <a:r>
-              <a:rPr lang="en-US" dirty="0"/>
-              <a:t>Cleaner, more scrollable main file, functions have reduced input arguments. </a:t>
-            </a:r>
-          </a:p>
-          <a:p>
-            <a:pPr lvl="2"/>
-            <a:r>
-              <a:rPr lang="en-US" dirty="0"/>
-              <a:t>Cons: </a:t>
-            </a:r>
-          </a:p>
-          <a:p>
-            <a:pPr lvl="3"/>
-            <a:r>
-              <a:rPr lang="en-US" dirty="0"/>
-              <a:t>Can get annoying to change parameter values every time by going into a specific function/module during initial development</a:t>
-            </a:r>
-          </a:p>
-          <a:p>
-            <a:pPr lvl="1"/>
-            <a:r>
-              <a:rPr lang="en-US" dirty="0"/>
-              <a:t>Or 2. should they be </a:t>
-            </a:r>
-            <a:r>
-              <a:rPr lang="en-US" dirty="0" err="1"/>
-              <a:t>tinkerable</a:t>
-            </a:r>
-            <a:r>
-              <a:rPr lang="en-US" dirty="0"/>
-              <a:t> in the main file itself? (this is what I did) </a:t>
-            </a:r>
-          </a:p>
-          <a:p>
-            <a:pPr lvl="2"/>
-            <a:r>
-              <a:rPr lang="en-US" dirty="0"/>
-              <a:t>Pros: </a:t>
-            </a:r>
-          </a:p>
-          <a:p>
-            <a:pPr lvl="3"/>
-            <a:r>
-              <a:rPr lang="en-US" dirty="0"/>
-              <a:t>Highly </a:t>
-            </a:r>
-            <a:r>
-              <a:rPr lang="en-US" dirty="0" err="1"/>
-              <a:t>tinkerable</a:t>
-            </a:r>
-            <a:r>
-              <a:rPr lang="en-US" dirty="0"/>
-              <a:t> code making way for easier development time.</a:t>
-            </a:r>
-          </a:p>
-          <a:p>
-            <a:pPr lvl="3"/>
-            <a:r>
-              <a:rPr lang="en-US" dirty="0"/>
-              <a:t>The user operating the code via the main file feels truly powerful.</a:t>
-            </a:r>
-          </a:p>
-          <a:p>
-            <a:pPr lvl="2"/>
-            <a:r>
-              <a:rPr lang="en-US" dirty="0"/>
-              <a:t>Cons:</a:t>
-            </a:r>
-          </a:p>
-          <a:p>
-            <a:pPr lvl="3"/>
-            <a:r>
-              <a:rPr lang="en-US" dirty="0"/>
-              <a:t>Number of function arguments gets nasty for some complex algorithms</a:t>
-            </a:r>
-          </a:p>
-          <a:p>
-            <a:pPr lvl="3"/>
-            <a:r>
-              <a:rPr lang="en-US" dirty="0"/>
-              <a:t>Bigger main file. Parameters can feel out of place if the user is NOT interested in running a particular project at the time.</a:t>
-            </a:r>
-            <a:br>
-              <a:rPr lang="en-US" dirty="0"/>
-            </a:br>
-            <a:endParaRPr lang="en-IN" dirty="0"/>
-          </a:p>
-        </p:txBody>
-      </p:sp>
-    </p:spTree>
-    <p:extLst>
-      <p:ext uri="{BB962C8B-B14F-4D97-AF65-F5344CB8AC3E}">
-        <p14:creationId xmlns:p14="http://schemas.microsoft.com/office/powerpoint/2010/main" val="3677315932"/>
-      </p:ext>
-    </p:extLst>
-  </p:cSld>
-  <p:clrMapOvr>
-    <a:masterClrMapping/>
-  </p:clrMapOvr>
-</p:sld>
-</file>
-
 <file path=ppt/slides/slide23.xml><?xml version="1.0" encoding="utf-8"?>
 <p:sld xmlns:a="http://schemas.openxmlformats.org/drawingml/2006/main" xmlns:r="http://schemas.openxmlformats.org/officeDocument/2006/relationships" xmlns:p="http://schemas.openxmlformats.org/presentationml/2006/main">
   <p:cSld>
@@ -12929,7 +12787,7 @@
           <p:cNvPr id="2" name="Title 1">
             <a:extLst>
               <a:ext uri="{FF2B5EF4-FFF2-40B4-BE49-F238E27FC236}">
-                <a16:creationId xmlns:a16="http://schemas.microsoft.com/office/drawing/2014/main" id="{A907B655-ADC6-0DB3-D40C-B4A4F02C56AD}"/>
+                <a16:creationId xmlns:a16="http://schemas.microsoft.com/office/drawing/2014/main" id="{E3C2F43C-7AEF-F81D-5A1D-BA4D0EEFA722}"/>
               </a:ext>
             </a:extLst>
           </p:cNvPr>
@@ -12947,7 +12805,7 @@
           <a:p>
             <a:r>
               <a:rPr lang="en-IN"/>
-              <a:t>Sample functions in modules</a:t>
+              <a:t>Starting Design Decisions</a:t>
             </a:r>
             <a:endParaRPr lang="en-IN" dirty="0"/>
           </a:p>
@@ -12958,7 +12816,7 @@
           <p:cNvPr id="3" name="Content Placeholder 2">
             <a:extLst>
               <a:ext uri="{FF2B5EF4-FFF2-40B4-BE49-F238E27FC236}">
-                <a16:creationId xmlns:a16="http://schemas.microsoft.com/office/drawing/2014/main" id="{B248B06E-0246-4FEF-533A-B0C46C596083}"/>
+                <a16:creationId xmlns:a16="http://schemas.microsoft.com/office/drawing/2014/main" id="{47EC802A-58BC-49AC-B799-01F826A6262A}"/>
               </a:ext>
             </a:extLst>
           </p:cNvPr>
@@ -12972,241 +12830,249 @@
         <p:spPr/>
         <p:txBody>
           <a:bodyPr>
-            <a:normAutofit fontScale="92500" lnSpcReduction="10000"/>
+            <a:normAutofit fontScale="77500" lnSpcReduction="20000"/>
           </a:bodyPr>
           <a:lstStyle/>
           <a:p>
             <a:r>
-              <a:rPr lang="en-IN" b="1" dirty="0">
+              <a:rPr lang="en-US" dirty="0">
+                <a:solidFill>
+                  <a:srgbClr val="FF0000"/>
+                </a:solidFill>
+              </a:rPr>
+              <a:t>Question</a:t>
+            </a:r>
+            <a:r>
+              <a:rPr lang="en-US" dirty="0"/>
+              <a:t>: Numerical parameters specific to an algorithm, like </a:t>
+            </a:r>
+            <a:r>
+              <a:rPr lang="en-US" sz="2000" dirty="0" err="1">
+                <a:latin typeface="Courier New" panose="02070309020205020404" pitchFamily="49" charset="0"/>
+                <a:cs typeface="Courier New" panose="02070309020205020404" pitchFamily="49" charset="0"/>
+              </a:rPr>
+              <a:t>toleranceLimit</a:t>
+            </a:r>
+            <a:r>
+              <a:rPr lang="en-US" dirty="0"/>
+              <a:t>, </a:t>
+            </a:r>
+            <a:r>
+              <a:rPr lang="en-US" sz="2000" dirty="0" err="1">
+                <a:latin typeface="Courier New" panose="02070309020205020404" pitchFamily="49" charset="0"/>
+                <a:cs typeface="Courier New" panose="02070309020205020404" pitchFamily="49" charset="0"/>
+              </a:rPr>
+              <a:t>maxIterations</a:t>
+            </a:r>
+            <a:r>
+              <a:rPr lang="en-US" dirty="0"/>
+              <a:t> for NRPF in </a:t>
+            </a:r>
+            <a:r>
+              <a:rPr lang="en-US" b="1" dirty="0">
                 <a:solidFill>
                   <a:srgbClr val="002060"/>
                 </a:solidFill>
               </a:rPr>
-              <a:t>P1: </a:t>
-            </a:r>
-            <a:r>
-              <a:rPr lang="en-IN" b="1" dirty="0" err="1">
+              <a:t>P1</a:t>
+            </a:r>
+            <a:r>
+              <a:rPr lang="en-US" dirty="0"/>
+              <a:t>, </a:t>
+            </a:r>
+            <a:r>
+              <a:rPr lang="en-US" sz="2000" dirty="0" err="1">
+                <a:latin typeface="Courier New" panose="02070309020205020404" pitchFamily="49" charset="0"/>
+                <a:cs typeface="Courier New" panose="02070309020205020404" pitchFamily="49" charset="0"/>
+              </a:rPr>
+              <a:t>CPFItrMax</a:t>
+            </a:r>
+            <a:r>
+              <a:rPr lang="en-US" dirty="0"/>
+              <a:t>, </a:t>
+            </a:r>
+            <a:r>
+              <a:rPr lang="en-US" sz="2000" dirty="0" err="1">
+                <a:latin typeface="Courier New" panose="02070309020205020404" pitchFamily="49" charset="0"/>
+                <a:cs typeface="Courier New" panose="02070309020205020404" pitchFamily="49" charset="0"/>
+              </a:rPr>
+              <a:t>SectionItrMax</a:t>
+            </a:r>
+            <a:r>
+              <a:rPr lang="en-US" dirty="0"/>
+              <a:t>, </a:t>
+            </a:r>
+            <a:r>
+              <a:rPr lang="en-US" sz="2000" dirty="0">
+                <a:latin typeface="Courier New" panose="02070309020205020404" pitchFamily="49" charset="0"/>
+                <a:cs typeface="Courier New" panose="02070309020205020404" pitchFamily="49" charset="0"/>
+              </a:rPr>
+              <a:t>sigma1</a:t>
+            </a:r>
+            <a:r>
+              <a:rPr lang="en-US" dirty="0"/>
+              <a:t>, </a:t>
+            </a:r>
+            <a:r>
+              <a:rPr lang="en-US" sz="2000" dirty="0">
+                <a:latin typeface="Courier New" panose="02070309020205020404" pitchFamily="49" charset="0"/>
+                <a:cs typeface="Courier New" panose="02070309020205020404" pitchFamily="49" charset="0"/>
+              </a:rPr>
+              <a:t>2</a:t>
+            </a:r>
+            <a:r>
+              <a:rPr lang="en-US" dirty="0"/>
+              <a:t> and </a:t>
+            </a:r>
+            <a:r>
+              <a:rPr lang="en-US" sz="2000" dirty="0">
+                <a:latin typeface="Courier New" panose="02070309020205020404" pitchFamily="49" charset="0"/>
+                <a:cs typeface="Courier New" panose="02070309020205020404" pitchFamily="49" charset="0"/>
+              </a:rPr>
+              <a:t>3</a:t>
+            </a:r>
+            <a:r>
+              <a:rPr lang="en-US" dirty="0"/>
+              <a:t> for </a:t>
+            </a:r>
+            <a:r>
+              <a:rPr lang="en-US" b="1" dirty="0">
                 <a:solidFill>
-                  <a:srgbClr val="002060"/>
+                  <a:srgbClr val="FF0000"/>
                 </a:solidFill>
               </a:rPr>
-              <a:t>NKGPowerFlow</a:t>
-            </a:r>
-            <a:endParaRPr lang="en-IN" b="1" dirty="0">
-              <a:solidFill>
-                <a:srgbClr val="002060"/>
-              </a:solidFill>
-            </a:endParaRPr>
+              <a:t>P3</a:t>
+            </a:r>
+            <a:r>
+              <a:rPr lang="en-US" dirty="0"/>
+              <a:t>, and so on.. which are NOT </a:t>
+            </a:r>
+            <a:r>
+              <a:rPr lang="en-US" dirty="0" err="1"/>
+              <a:t>gonna</a:t>
+            </a:r>
+            <a:r>
+              <a:rPr lang="en-US" dirty="0"/>
+              <a:t> be changed or altered by a Dr. Noel:</a:t>
+            </a:r>
+            <a:br>
+              <a:rPr lang="en-US" dirty="0"/>
+            </a:br>
+            <a:r>
+              <a:rPr lang="en-US" dirty="0"/>
+              <a:t>Should they be </a:t>
+            </a:r>
           </a:p>
           <a:p>
             <a:pPr lvl="1"/>
             <a:r>
-              <a:rPr lang="en-IN" i="1" dirty="0" err="1"/>
-              <a:t>constructYBus</a:t>
-            </a:r>
-            <a:endParaRPr lang="en-IN" i="1" dirty="0"/>
+              <a:rPr lang="en-US" dirty="0"/>
+              <a:t>1. hidden from a user away in the function? </a:t>
+            </a:r>
+          </a:p>
+          <a:p>
+            <a:pPr lvl="2"/>
+            <a:r>
+              <a:rPr lang="en-US" dirty="0"/>
+              <a:t>Pros: </a:t>
+            </a:r>
+          </a:p>
+          <a:p>
+            <a:pPr lvl="3"/>
+            <a:r>
+              <a:rPr lang="en-US" dirty="0"/>
+              <a:t>Cleaner, more scrollable main file, functions have reduced input arguments. </a:t>
+            </a:r>
+          </a:p>
+          <a:p>
+            <a:pPr lvl="2"/>
+            <a:r>
+              <a:rPr lang="en-US" dirty="0"/>
+              <a:t>Cons: </a:t>
+            </a:r>
+          </a:p>
+          <a:p>
+            <a:pPr lvl="3"/>
+            <a:r>
+              <a:rPr lang="en-US" dirty="0"/>
+              <a:t>Can get annoying to change parameter values every time by going into a specific function/module during initial development</a:t>
+            </a:r>
           </a:p>
           <a:p>
             <a:pPr lvl="1"/>
             <a:r>
-              <a:rPr lang="en-IN" i="1" dirty="0" err="1"/>
-              <a:t>solveUsingPowerFlow</a:t>
-            </a:r>
-            <a:r>
-              <a:rPr lang="en-IN" dirty="0"/>
-              <a:t>: NRPF/FDPF  We can make it work for both </a:t>
-            </a:r>
-            <a:r>
-              <a:rPr lang="en-IN" dirty="0" err="1"/>
-              <a:t>powerFlowMethods</a:t>
-            </a:r>
-            <a:r>
-              <a:rPr lang="en-IN" dirty="0"/>
-              <a:t>: “NRPF” or “FDPF”.</a:t>
+              <a:rPr lang="en-US" dirty="0"/>
+              <a:t>Or 2. should they be </a:t>
+            </a:r>
+            <a:r>
+              <a:rPr lang="en-US" dirty="0" err="1"/>
+              <a:t>tinkerable</a:t>
+            </a:r>
+            <a:r>
+              <a:rPr lang="en-US" dirty="0"/>
+              <a:t> in the main file itself? (this is what I did) </a:t>
             </a:r>
           </a:p>
           <a:p>
             <a:pPr lvl="2"/>
             <a:r>
-              <a:rPr lang="en-IN" i="1" dirty="0" err="1"/>
-              <a:t>initializeVectors</a:t>
-            </a:r>
-            <a:r>
-              <a:rPr lang="en-IN" i="1" dirty="0"/>
-              <a:t>: </a:t>
-            </a:r>
-            <a:r>
-              <a:rPr lang="en-IN" dirty="0"/>
-              <a:t>Handy function which reads [</a:t>
-            </a:r>
-            <a:r>
-              <a:rPr lang="en-IN" dirty="0" err="1"/>
-              <a:t>busData</a:t>
-            </a:r>
-            <a:r>
-              <a:rPr lang="en-IN" dirty="0"/>
-              <a:t>, </a:t>
-            </a:r>
-            <a:r>
-              <a:rPr lang="en-IN" dirty="0" err="1"/>
-              <a:t>branchData</a:t>
-            </a:r>
-            <a:r>
-              <a:rPr lang="en-IN" dirty="0"/>
-              <a:t>] and can retrieve highly used parameter values like </a:t>
-            </a:r>
-            <a:r>
-              <a:rPr lang="en-IN" dirty="0" err="1"/>
-              <a:t>listOfPVBuses</a:t>
-            </a:r>
-            <a:r>
-              <a:rPr lang="en-IN" dirty="0"/>
-              <a:t>, </a:t>
-            </a:r>
-            <a:r>
-              <a:rPr lang="en-IN" dirty="0" err="1"/>
-              <a:t>nPQ</a:t>
-            </a:r>
-            <a:r>
-              <a:rPr lang="en-IN" dirty="0"/>
-              <a:t> (#PQ Buses), </a:t>
-            </a:r>
-            <a:r>
-              <a:rPr lang="en-IN" dirty="0" err="1"/>
-              <a:t>PSpecified</a:t>
-            </a:r>
-            <a:r>
-              <a:rPr lang="en-IN" dirty="0"/>
-              <a:t>, etc.</a:t>
+              <a:rPr lang="en-US" dirty="0"/>
+              <a:t>Pros: </a:t>
+            </a:r>
+          </a:p>
+          <a:p>
+            <a:pPr lvl="3"/>
+            <a:r>
+              <a:rPr lang="en-US" dirty="0"/>
+              <a:t>Highly </a:t>
+            </a:r>
+            <a:r>
+              <a:rPr lang="en-US" dirty="0" err="1"/>
+              <a:t>tinkerable</a:t>
+            </a:r>
+            <a:r>
+              <a:rPr lang="en-US" dirty="0"/>
+              <a:t> code making way for easier development time.</a:t>
+            </a:r>
+          </a:p>
+          <a:p>
+            <a:pPr lvl="3"/>
+            <a:r>
+              <a:rPr lang="en-US" dirty="0"/>
+              <a:t>The user operating the code via the main file feels truly powerful.</a:t>
             </a:r>
           </a:p>
           <a:p>
             <a:pPr lvl="2"/>
             <a:r>
-              <a:rPr lang="en-IN" i="1" dirty="0" err="1"/>
-              <a:t>computeBusInjections</a:t>
-            </a:r>
-            <a:r>
-              <a:rPr lang="en-IN" i="1" dirty="0"/>
-              <a:t>: calculate </a:t>
-            </a:r>
-            <a:r>
-              <a:rPr lang="en-IN" i="1" dirty="0" err="1"/>
-              <a:t>P_i</a:t>
-            </a:r>
-            <a:r>
-              <a:rPr lang="en-IN" i="1" dirty="0"/>
-              <a:t> and </a:t>
-            </a:r>
-            <a:r>
-              <a:rPr lang="en-IN" i="1" dirty="0" err="1"/>
-              <a:t>Q_i</a:t>
-            </a:r>
-            <a:endParaRPr lang="en-IN" i="1" dirty="0"/>
-          </a:p>
-          <a:p>
-            <a:pPr lvl="2"/>
-            <a:r>
-              <a:rPr lang="en-IN" i="1" dirty="0" err="1"/>
-              <a:t>computeMismatches</a:t>
-            </a:r>
-            <a:r>
-              <a:rPr lang="en-IN" dirty="0"/>
-              <a:t>: NRPF/FDPF a simple function which calculates mismatches (for every Powerflow iteration) by first computing power injections. Helpful in creation of diagonal Jacobian elements too.</a:t>
-            </a:r>
-          </a:p>
-          <a:p>
-            <a:pPr lvl="2"/>
-            <a:r>
-              <a:rPr lang="en-IN" i="1" dirty="0" err="1"/>
-              <a:t>constructJacobian</a:t>
-            </a:r>
-            <a:r>
-              <a:rPr lang="en-IN" dirty="0"/>
-              <a:t>: NRPF/FDPF Compute J11, J22 (and J12, J21 and J in case of NRPF)</a:t>
-            </a:r>
-          </a:p>
-          <a:p>
-            <a:pPr lvl="2"/>
-            <a:r>
-              <a:rPr lang="en-IN" i="1" dirty="0" err="1"/>
-              <a:t>solveUsingLU</a:t>
-            </a:r>
-            <a:r>
-              <a:rPr lang="en-IN" dirty="0"/>
-              <a:t>: Using given Jacobian (J11/J) and mismatch vector (</a:t>
-            </a:r>
-            <a:r>
-              <a:rPr lang="en-IN" dirty="0" err="1"/>
-              <a:t>delP</a:t>
-            </a:r>
-            <a:r>
-              <a:rPr lang="en-IN" dirty="0"/>
-              <a:t>/[</a:t>
-            </a:r>
-            <a:r>
-              <a:rPr lang="en-IN" dirty="0" err="1"/>
-              <a:t>delP</a:t>
-            </a:r>
-            <a:r>
-              <a:rPr lang="en-IN" dirty="0"/>
-              <a:t>; </a:t>
-            </a:r>
-            <a:r>
-              <a:rPr lang="en-IN" dirty="0" err="1"/>
-              <a:t>delQ</a:t>
-            </a:r>
-            <a:r>
-              <a:rPr lang="en-IN" dirty="0"/>
-              <a:t>]), compute correction vector (</a:t>
-            </a:r>
-            <a:r>
-              <a:rPr lang="en-IN" dirty="0" err="1"/>
-              <a:t>delDelta</a:t>
-            </a:r>
-            <a:r>
-              <a:rPr lang="en-IN" dirty="0"/>
-              <a:t>/[</a:t>
-            </a:r>
-            <a:r>
-              <a:rPr lang="en-IN" dirty="0" err="1"/>
-              <a:t>delDeltas</a:t>
-            </a:r>
-            <a:r>
-              <a:rPr lang="en-IN" dirty="0"/>
-              <a:t>; </a:t>
-            </a:r>
-            <a:r>
-              <a:rPr lang="en-IN" dirty="0" err="1"/>
-              <a:t>delV</a:t>
-            </a:r>
-            <a:r>
-              <a:rPr lang="en-IN" dirty="0"/>
-              <a:t>]).</a:t>
+              <a:rPr lang="en-US" dirty="0"/>
+              <a:t>Cons:</a:t>
             </a:r>
           </a:p>
           <a:p>
             <a:pPr lvl="3"/>
             <a:r>
-              <a:rPr lang="en-IN" dirty="0" err="1"/>
-              <a:t>solveUsingForwardSubstitution</a:t>
-            </a:r>
+              <a:rPr lang="en-US" dirty="0"/>
+              <a:t>Number of function arguments gets nasty for some complex algorithms</a:t>
+            </a:r>
+          </a:p>
+          <a:p>
+            <a:pPr lvl="3"/>
+            <a:r>
+              <a:rPr lang="en-US" dirty="0"/>
+              <a:t>Bigger main file. Parameters can feel out of place if the user is NOT interested in running a particular project at the time.</a:t>
+            </a:r>
+            <a:br>
+              <a:rPr lang="en-US" dirty="0"/>
+            </a:br>
             <a:endParaRPr lang="en-IN" dirty="0"/>
-          </a:p>
-          <a:p>
-            <a:pPr lvl="3"/>
-            <a:r>
-              <a:rPr lang="en-IN" dirty="0" err="1"/>
-              <a:t>solveUsingBackwardSubstituion</a:t>
-            </a:r>
-            <a:endParaRPr lang="en-IN" i="1" dirty="0"/>
           </a:p>
         </p:txBody>
       </p:sp>
     </p:spTree>
     <p:extLst>
       <p:ext uri="{BB962C8B-B14F-4D97-AF65-F5344CB8AC3E}">
-        <p14:creationId xmlns:p14="http://schemas.microsoft.com/office/powerpoint/2010/main" val="2074898235"/>
+        <p14:creationId xmlns:p14="http://schemas.microsoft.com/office/powerpoint/2010/main" val="3677315932"/>
       </p:ext>
     </p:extLst>
   </p:cSld>
@@ -13255,9 +13121,10 @@
           <a:lstStyle/>
           <a:p>
             <a:r>
-              <a:rPr lang="en-IN" dirty="0"/>
+              <a:rPr lang="en-IN"/>
               <a:t>Sample functions in modules</a:t>
             </a:r>
+            <a:endParaRPr lang="en-IN" dirty="0"/>
           </a:p>
         </p:txBody>
       </p:sp>
@@ -13280,7 +13147,7 @@
         <p:spPr/>
         <p:txBody>
           <a:bodyPr>
-            <a:normAutofit/>
+            <a:normAutofit fontScale="92500" lnSpcReduction="10000"/>
           </a:bodyPr>
           <a:lstStyle/>
           <a:p>
@@ -13300,94 +13167,221 @@
               </a:rPr>
               <a:t>NKGPowerFlow</a:t>
             </a:r>
-            <a:r>
-              <a:rPr lang="en-IN" b="1" dirty="0">
-                <a:solidFill>
-                  <a:srgbClr val="002060"/>
-                </a:solidFill>
-              </a:rPr>
-              <a:t> </a:t>
-            </a:r>
-            <a:r>
-              <a:rPr lang="en-IN" dirty="0"/>
-              <a:t>(contd.)</a:t>
-            </a:r>
-          </a:p>
-          <a:p>
-            <a:pPr lvl="1"/>
-            <a:r>
-              <a:rPr lang="en-IN" i="1" dirty="0" err="1"/>
-              <a:t>displayPowerFlowResults</a:t>
-            </a:r>
-            <a:r>
-              <a:rPr lang="en-IN" i="1" dirty="0"/>
-              <a:t>: </a:t>
-            </a:r>
-            <a:r>
-              <a:rPr lang="en-IN" dirty="0"/>
-              <a:t>A neat table containing [V, delta, P, Q] with easy to see rows called as ‘Bus 01’, ‘Bus 02’ …</a:t>
-            </a:r>
-          </a:p>
-          <a:p>
-            <a:pPr lvl="1"/>
-            <a:r>
-              <a:rPr lang="en-IN" i="1" dirty="0" err="1"/>
-              <a:t>plotPowerFlowResults</a:t>
-            </a:r>
-            <a:r>
-              <a:rPr lang="en-IN" i="1" dirty="0"/>
-              <a:t>: </a:t>
-            </a:r>
-            <a:r>
-              <a:rPr lang="en-IN" dirty="0"/>
-              <a:t>Compare your own results to the results in the CDF file, via two plots:</a:t>
-            </a:r>
-          </a:p>
-          <a:p>
-            <a:pPr lvl="2"/>
-            <a:r>
-              <a:rPr lang="en-IN" dirty="0"/>
-              <a:t>Relative percentage difference in </a:t>
-            </a:r>
-            <a:r>
-              <a:rPr lang="en-IN" dirty="0" err="1"/>
-              <a:t>pu</a:t>
-            </a:r>
-            <a:r>
-              <a:rPr lang="en-IN" dirty="0"/>
-              <a:t> Voltages</a:t>
-            </a:r>
-          </a:p>
-          <a:p>
-            <a:pPr lvl="2"/>
-            <a:r>
-              <a:rPr lang="en-IN" dirty="0"/>
-              <a:t>absolute difference in delta values.</a:t>
-            </a:r>
-          </a:p>
-          <a:p>
-            <a:r>
-              <a:rPr lang="en-IN" dirty="0">
-                <a:solidFill>
-                  <a:srgbClr val="C00000"/>
-                </a:solidFill>
-              </a:rPr>
-              <a:t>Caveat: Bus Switching is optional for evaluation, though in general not implementing it for bigger systems will lead to incorrect outcomes or even divergence.</a:t>
-            </a:r>
-          </a:p>
-          <a:p>
             <a:endParaRPr lang="en-IN" b="1" dirty="0">
               <a:solidFill>
                 <a:srgbClr val="002060"/>
               </a:solidFill>
             </a:endParaRPr>
           </a:p>
+          <a:p>
+            <a:pPr lvl="1"/>
+            <a:r>
+              <a:rPr lang="en-IN" i="1" dirty="0" err="1"/>
+              <a:t>constructYBus</a:t>
+            </a:r>
+            <a:endParaRPr lang="en-IN" i="1" dirty="0"/>
+          </a:p>
+          <a:p>
+            <a:pPr lvl="1"/>
+            <a:r>
+              <a:rPr lang="en-IN" i="1" dirty="0" err="1"/>
+              <a:t>solveUsingPowerFlow</a:t>
+            </a:r>
+            <a:r>
+              <a:rPr lang="en-IN" dirty="0"/>
+              <a:t>: NRPF/FDPF  We can make it work for both </a:t>
+            </a:r>
+            <a:r>
+              <a:rPr lang="en-IN" dirty="0" err="1"/>
+              <a:t>powerFlowMethods</a:t>
+            </a:r>
+            <a:r>
+              <a:rPr lang="en-IN" dirty="0"/>
+              <a:t>: “NRPF” or “FDPF”.</a:t>
+            </a:r>
+          </a:p>
+          <a:p>
+            <a:pPr lvl="2"/>
+            <a:r>
+              <a:rPr lang="en-IN" i="1" dirty="0" err="1"/>
+              <a:t>initializeVectors</a:t>
+            </a:r>
+            <a:r>
+              <a:rPr lang="en-IN" i="1" dirty="0"/>
+              <a:t>: </a:t>
+            </a:r>
+            <a:r>
+              <a:rPr lang="en-IN" dirty="0"/>
+              <a:t>Handy function which reads [</a:t>
+            </a:r>
+            <a:r>
+              <a:rPr lang="en-IN" dirty="0" err="1"/>
+              <a:t>busData</a:t>
+            </a:r>
+            <a:r>
+              <a:rPr lang="en-IN" dirty="0"/>
+              <a:t>, </a:t>
+            </a:r>
+            <a:r>
+              <a:rPr lang="en-IN" dirty="0" err="1"/>
+              <a:t>branchData</a:t>
+            </a:r>
+            <a:r>
+              <a:rPr lang="en-IN" dirty="0"/>
+              <a:t>] and can retrieve highly used parameter values like </a:t>
+            </a:r>
+            <a:r>
+              <a:rPr lang="en-IN" dirty="0" err="1"/>
+              <a:t>listOfPVBuses</a:t>
+            </a:r>
+            <a:r>
+              <a:rPr lang="en-IN" dirty="0"/>
+              <a:t>, </a:t>
+            </a:r>
+            <a:r>
+              <a:rPr lang="en-IN" dirty="0" err="1"/>
+              <a:t>nPQ</a:t>
+            </a:r>
+            <a:r>
+              <a:rPr lang="en-IN" dirty="0"/>
+              <a:t> (#PQ Buses), </a:t>
+            </a:r>
+            <a:r>
+              <a:rPr lang="en-IN" dirty="0" err="1"/>
+              <a:t>PSpecified</a:t>
+            </a:r>
+            <a:r>
+              <a:rPr lang="en-IN" dirty="0"/>
+              <a:t>, etc.</a:t>
+            </a:r>
+          </a:p>
+          <a:p>
+            <a:pPr lvl="2"/>
+            <a:r>
+              <a:rPr lang="en-IN" i="1" dirty="0" err="1"/>
+              <a:t>computeBusInjections</a:t>
+            </a:r>
+            <a:r>
+              <a:rPr lang="en-IN" i="1" dirty="0"/>
+              <a:t>: calculate </a:t>
+            </a:r>
+            <a:r>
+              <a:rPr lang="en-IN" i="1" dirty="0" err="1"/>
+              <a:t>P_i</a:t>
+            </a:r>
+            <a:r>
+              <a:rPr lang="en-IN" i="1" dirty="0"/>
+              <a:t> and </a:t>
+            </a:r>
+            <a:r>
+              <a:rPr lang="en-IN" i="1" dirty="0" err="1"/>
+              <a:t>Q_i</a:t>
+            </a:r>
+            <a:endParaRPr lang="en-IN" i="1" dirty="0"/>
+          </a:p>
+          <a:p>
+            <a:pPr lvl="2"/>
+            <a:r>
+              <a:rPr lang="en-IN" i="1" dirty="0" err="1"/>
+              <a:t>computeMismatches</a:t>
+            </a:r>
+            <a:r>
+              <a:rPr lang="en-IN" dirty="0"/>
+              <a:t>: NRPF/FDPF a simple function which calculates mismatches (for every Powerflow iteration) by first computing power injections. Helpful in creation of diagonal Jacobian elements too.</a:t>
+            </a:r>
+          </a:p>
+          <a:p>
+            <a:pPr lvl="2"/>
+            <a:r>
+              <a:rPr lang="en-IN" i="1" dirty="0" err="1"/>
+              <a:t>constructJacobian</a:t>
+            </a:r>
+            <a:r>
+              <a:rPr lang="en-IN" dirty="0"/>
+              <a:t>: NRPF/FDPF Compute J11, J22 (and J12, J21 and J in case of NRPF)</a:t>
+            </a:r>
+          </a:p>
+          <a:p>
+            <a:pPr lvl="2"/>
+            <a:r>
+              <a:rPr lang="en-IN" i="1" dirty="0" err="1"/>
+              <a:t>solveUsingLU</a:t>
+            </a:r>
+            <a:r>
+              <a:rPr lang="en-IN" dirty="0"/>
+              <a:t>: Using given Jacobian (J11/J) and mismatch vector (</a:t>
+            </a:r>
+            <a:r>
+              <a:rPr lang="en-IN" dirty="0" err="1"/>
+              <a:t>delP</a:t>
+            </a:r>
+            <a:r>
+              <a:rPr lang="en-IN" dirty="0"/>
+              <a:t>/[</a:t>
+            </a:r>
+            <a:r>
+              <a:rPr lang="en-IN" dirty="0" err="1"/>
+              <a:t>delP</a:t>
+            </a:r>
+            <a:r>
+              <a:rPr lang="en-IN" dirty="0"/>
+              <a:t>; </a:t>
+            </a:r>
+            <a:r>
+              <a:rPr lang="en-IN" dirty="0" err="1"/>
+              <a:t>delQ</a:t>
+            </a:r>
+            <a:r>
+              <a:rPr lang="en-IN" dirty="0"/>
+              <a:t>]), compute correction vector (</a:t>
+            </a:r>
+            <a:r>
+              <a:rPr lang="en-IN" dirty="0" err="1"/>
+              <a:t>delDelta</a:t>
+            </a:r>
+            <a:r>
+              <a:rPr lang="en-IN" dirty="0"/>
+              <a:t>/[</a:t>
+            </a:r>
+            <a:r>
+              <a:rPr lang="en-IN" dirty="0" err="1"/>
+              <a:t>delDeltas</a:t>
+            </a:r>
+            <a:r>
+              <a:rPr lang="en-IN" dirty="0"/>
+              <a:t>; </a:t>
+            </a:r>
+            <a:r>
+              <a:rPr lang="en-IN" dirty="0" err="1"/>
+              <a:t>delV</a:t>
+            </a:r>
+            <a:r>
+              <a:rPr lang="en-IN" dirty="0"/>
+              <a:t>]).</a:t>
+            </a:r>
+          </a:p>
+          <a:p>
+            <a:pPr lvl="3"/>
+            <a:r>
+              <a:rPr lang="en-IN" dirty="0" err="1"/>
+              <a:t>solveUsingForwardSubstitution</a:t>
+            </a:r>
+            <a:endParaRPr lang="en-IN" dirty="0"/>
+          </a:p>
+          <a:p>
+            <a:pPr lvl="3"/>
+            <a:r>
+              <a:rPr lang="en-IN" dirty="0" err="1"/>
+              <a:t>solveUsingBackwardSubstituion</a:t>
+            </a:r>
+            <a:endParaRPr lang="en-IN" i="1" dirty="0"/>
+          </a:p>
         </p:txBody>
       </p:sp>
     </p:spTree>
     <p:extLst>
       <p:ext uri="{BB962C8B-B14F-4D97-AF65-F5344CB8AC3E}">
-        <p14:creationId xmlns:p14="http://schemas.microsoft.com/office/powerpoint/2010/main" val="3009292720"/>
+        <p14:creationId xmlns:p14="http://schemas.microsoft.com/office/powerpoint/2010/main" val="2074898235"/>
       </p:ext>
     </p:extLst>
   </p:cSld>
@@ -13461,329 +13455,90 @@
         <p:spPr/>
         <p:txBody>
           <a:bodyPr>
-            <a:normAutofit fontScale="70000" lnSpcReduction="20000"/>
+            <a:normAutofit/>
           </a:bodyPr>
           <a:lstStyle/>
           <a:p>
             <a:r>
               <a:rPr lang="en-IN" b="1" dirty="0">
                 <a:solidFill>
-                  <a:schemeClr val="bg2">
-                    <a:lumMod val="50000"/>
-                  </a:schemeClr>
+                  <a:srgbClr val="002060"/>
                 </a:solidFill>
               </a:rPr>
-              <a:t>P2: </a:t>
+              <a:t>P1: </a:t>
             </a:r>
             <a:r>
               <a:rPr lang="en-IN" b="1" dirty="0" err="1">
                 <a:solidFill>
-                  <a:schemeClr val="bg2">
-                    <a:lumMod val="50000"/>
-                  </a:schemeClr>
+                  <a:srgbClr val="002060"/>
                 </a:solidFill>
               </a:rPr>
-              <a:t>NKGSparsePowerFlow</a:t>
-            </a:r>
-            <a:endParaRPr lang="en-IN" b="1" dirty="0">
-              <a:solidFill>
-                <a:schemeClr val="bg2">
-                  <a:lumMod val="50000"/>
-                </a:schemeClr>
-              </a:solidFill>
-            </a:endParaRPr>
-          </a:p>
-          <a:p>
+              <a:t>NKGPowerFlow</a:t>
+            </a:r>
+            <a:r>
+              <a:rPr lang="en-IN" b="1" dirty="0">
+                <a:solidFill>
+                  <a:srgbClr val="002060"/>
+                </a:solidFill>
+              </a:rPr>
+              <a:t> </a:t>
+            </a:r>
             <a:r>
               <a:rPr lang="en-IN" dirty="0"/>
-              <a:t>Need to rethink all implementations (check Caveat).</a:t>
-            </a:r>
-          </a:p>
-          <a:p>
+              <a:t>(contd.)</a:t>
+            </a:r>
+          </a:p>
+          <a:p>
+            <a:pPr lvl="1"/>
+            <a:r>
+              <a:rPr lang="en-IN" i="1" dirty="0" err="1"/>
+              <a:t>displayPowerFlowResults</a:t>
+            </a:r>
+            <a:r>
+              <a:rPr lang="en-IN" i="1" dirty="0"/>
+              <a:t>: </a:t>
+            </a:r>
             <a:r>
               <a:rPr lang="en-IN" dirty="0"/>
-              <a:t>function</a:t>
+              <a:t>A neat table containing [V, delta, P, Q] with easy to see rows called as ‘Bus 01’, ‘Bus 02’ …</a:t>
+            </a:r>
+          </a:p>
+          <a:p>
+            <a:pPr lvl="1"/>
+            <a:r>
+              <a:rPr lang="en-IN" i="1" dirty="0" err="1"/>
+              <a:t>plotPowerFlowResults</a:t>
             </a:r>
             <a:r>
               <a:rPr lang="en-IN" i="1" dirty="0"/>
-              <a:t> [</a:t>
-            </a:r>
-            <a:r>
-              <a:rPr lang="en-IN" i="1" dirty="0" err="1"/>
-              <a:t>nnzYBus</a:t>
-            </a:r>
-            <a:r>
-              <a:rPr lang="en-IN" i="1" dirty="0"/>
-              <a:t>, </a:t>
-            </a:r>
-            <a:r>
-              <a:rPr lang="en-IN" i="1" dirty="0" err="1"/>
-              <a:t>NYBus</a:t>
-            </a:r>
-            <a:r>
-              <a:rPr lang="en-IN" i="1" dirty="0"/>
-              <a:t>] = </a:t>
-            </a:r>
-            <a:r>
-              <a:rPr lang="en-IN" i="1" dirty="0" err="1"/>
-              <a:t>makeSparseYBus</a:t>
-            </a:r>
-            <a:r>
-              <a:rPr lang="en-IN" i="1" dirty="0"/>
-              <a:t>(</a:t>
-            </a:r>
-            <a:r>
-              <a:rPr lang="en-IN" i="1" dirty="0" err="1"/>
-              <a:t>busData</a:t>
-            </a:r>
-            <a:r>
-              <a:rPr lang="en-IN" i="1" dirty="0"/>
-              <a:t>, </a:t>
-            </a:r>
-            <a:r>
-              <a:rPr lang="en-IN" i="1" dirty="0" err="1"/>
-              <a:t>branchData</a:t>
-            </a:r>
-            <a:r>
-              <a:rPr lang="en-IN" i="1" dirty="0"/>
-              <a:t>)</a:t>
-            </a:r>
-          </a:p>
-          <a:p>
-            <a:pPr lvl="1"/>
-            <a:r>
-              <a:rPr lang="en-IN" i="1" dirty="0"/>
-              <a:t>[</a:t>
-            </a:r>
-            <a:r>
-              <a:rPr lang="en-IN" i="1" dirty="0" err="1"/>
-              <a:t>iYBus</a:t>
-            </a:r>
-            <a:r>
-              <a:rPr lang="en-IN" i="1" dirty="0"/>
-              <a:t>, </a:t>
-            </a:r>
-            <a:r>
-              <a:rPr lang="en-IN" i="1" dirty="0" err="1"/>
-              <a:t>jYBus</a:t>
-            </a:r>
-            <a:r>
-              <a:rPr lang="en-IN" i="1" dirty="0"/>
-              <a:t>, </a:t>
-            </a:r>
-            <a:r>
-              <a:rPr lang="en-IN" i="1" dirty="0" err="1"/>
-              <a:t>valYBus</a:t>
-            </a:r>
-            <a:r>
-              <a:rPr lang="en-IN" i="1" dirty="0"/>
-              <a:t>] = </a:t>
-            </a:r>
-            <a:r>
-              <a:rPr lang="en-IN" i="1" dirty="0" err="1"/>
-              <a:t>constructSparseYBusTable</a:t>
-            </a:r>
-            <a:r>
-              <a:rPr lang="en-IN" i="1" dirty="0"/>
-              <a:t>(</a:t>
-            </a:r>
-            <a:r>
-              <a:rPr lang="en-IN" i="1" dirty="0" err="1"/>
-              <a:t>busData</a:t>
-            </a:r>
-            <a:r>
-              <a:rPr lang="en-IN" i="1" dirty="0"/>
-              <a:t>, </a:t>
-            </a:r>
-            <a:r>
-              <a:rPr lang="en-IN" i="1" dirty="0" err="1"/>
-              <a:t>branchData</a:t>
-            </a:r>
-            <a:r>
-              <a:rPr lang="en-IN" i="1" dirty="0"/>
-              <a:t>)</a:t>
-            </a:r>
-          </a:p>
-          <a:p>
-            <a:pPr lvl="1"/>
-            <a:r>
-              <a:rPr lang="en-IN" i="1" dirty="0"/>
-              <a:t>[</a:t>
-            </a:r>
-            <a:r>
-              <a:rPr lang="en-IN" i="1" dirty="0" err="1"/>
-              <a:t>nnz</a:t>
-            </a:r>
-            <a:r>
-              <a:rPr lang="en-IN" i="1" dirty="0"/>
-              <a:t>, N] = </a:t>
-            </a:r>
-            <a:r>
-              <a:rPr lang="en-IN" i="1" dirty="0" err="1"/>
-              <a:t>sparmat</a:t>
-            </a:r>
-            <a:r>
-              <a:rPr lang="en-IN" i="1" dirty="0"/>
-              <a:t>([</a:t>
-            </a:r>
-            <a:r>
-              <a:rPr lang="en-IN" i="1" dirty="0" err="1"/>
-              <a:t>i</a:t>
-            </a:r>
-            <a:r>
-              <a:rPr lang="en-IN" i="1" dirty="0"/>
-              <a:t>, j, </a:t>
-            </a:r>
-            <a:r>
-              <a:rPr lang="en-IN" i="1" dirty="0" err="1"/>
-              <a:t>val</a:t>
-            </a:r>
-            <a:r>
-              <a:rPr lang="en-IN" i="1" dirty="0"/>
-              <a:t>])</a:t>
-            </a:r>
-          </a:p>
-          <a:p>
+              <a:t>: </a:t>
+            </a:r>
             <a:r>
               <a:rPr lang="en-IN" dirty="0"/>
-              <a:t>function </a:t>
-            </a:r>
-            <a:r>
-              <a:rPr lang="en-IN" i="1" dirty="0"/>
-              <a:t>[</a:t>
-            </a:r>
-            <a:r>
-              <a:rPr lang="en-IN" i="1" dirty="0" err="1"/>
-              <a:t>deltaP</a:t>
-            </a:r>
-            <a:r>
-              <a:rPr lang="en-IN" i="1" dirty="0"/>
-              <a:t>, </a:t>
-            </a:r>
-            <a:r>
-              <a:rPr lang="en-IN" i="1" dirty="0" err="1"/>
-              <a:t>deltaQ</a:t>
-            </a:r>
-            <a:r>
-              <a:rPr lang="en-IN" i="1" dirty="0"/>
-              <a:t>] = </a:t>
-            </a:r>
-            <a:r>
-              <a:rPr lang="en-IN" i="1" dirty="0" err="1"/>
-              <a:t>computeMismatchesViaSparseYBus</a:t>
-            </a:r>
-            <a:r>
-              <a:rPr lang="en-IN" i="1" dirty="0"/>
-              <a:t>(</a:t>
-            </a:r>
-            <a:r>
-              <a:rPr lang="en-IN" i="1" dirty="0" err="1"/>
-              <a:t>nnzYBus</a:t>
-            </a:r>
-            <a:r>
-              <a:rPr lang="en-IN" i="1" dirty="0"/>
-              <a:t>, </a:t>
-            </a:r>
-            <a:r>
-              <a:rPr lang="en-IN" i="1" dirty="0" err="1"/>
-              <a:t>NYBus</a:t>
-            </a:r>
-            <a:r>
-              <a:rPr lang="en-IN" i="1" dirty="0"/>
-              <a:t>, ..)</a:t>
-            </a:r>
-          </a:p>
-          <a:p>
-            <a:r>
-              <a:rPr lang="en-IN" i="1" dirty="0"/>
-              <a:t>function [</a:t>
-            </a:r>
-            <a:r>
-              <a:rPr lang="en-IN" i="1" dirty="0" err="1"/>
-              <a:t>nnzJ</a:t>
-            </a:r>
-            <a:r>
-              <a:rPr lang="en-IN" i="1" dirty="0"/>
-              <a:t>, NJ] = </a:t>
-            </a:r>
-            <a:r>
-              <a:rPr lang="en-IN" i="1" dirty="0" err="1"/>
-              <a:t>constructSparseJacobian</a:t>
-            </a:r>
-            <a:r>
-              <a:rPr lang="en-IN" i="1" dirty="0"/>
-              <a:t>(</a:t>
-            </a:r>
-            <a:r>
-              <a:rPr lang="en-IN" i="1" dirty="0" err="1"/>
-              <a:t>nnzYBus</a:t>
-            </a:r>
-            <a:r>
-              <a:rPr lang="en-IN" i="1" dirty="0"/>
-              <a:t>, </a:t>
-            </a:r>
-            <a:r>
-              <a:rPr lang="en-IN" i="1" dirty="0" err="1"/>
-              <a:t>NYBus</a:t>
-            </a:r>
-            <a:r>
-              <a:rPr lang="en-IN" i="1" dirty="0"/>
-              <a:t>, …)</a:t>
-            </a:r>
-          </a:p>
-          <a:p>
-            <a:r>
-              <a:rPr lang="en-IN" i="1" dirty="0"/>
-              <a:t>[</a:t>
-            </a:r>
-            <a:r>
-              <a:rPr lang="en-IN" i="1" dirty="0" err="1"/>
-              <a:t>nnzL</a:t>
-            </a:r>
-            <a:r>
-              <a:rPr lang="en-IN" i="1" dirty="0"/>
-              <a:t>, NL, </a:t>
-            </a:r>
-            <a:r>
-              <a:rPr lang="en-IN" i="1" dirty="0" err="1"/>
-              <a:t>nnzU</a:t>
-            </a:r>
-            <a:r>
-              <a:rPr lang="en-IN" i="1" dirty="0"/>
-              <a:t>, NU] = </a:t>
-            </a:r>
-            <a:r>
-              <a:rPr lang="en-IN" i="1" dirty="0" err="1"/>
-              <a:t>factorizeSparseLU</a:t>
-            </a:r>
-            <a:r>
-              <a:rPr lang="en-IN" i="1" dirty="0"/>
-              <a:t>(</a:t>
-            </a:r>
-            <a:r>
-              <a:rPr lang="en-IN" i="1" dirty="0" err="1"/>
-              <a:t>nnzJ</a:t>
-            </a:r>
-            <a:r>
-              <a:rPr lang="en-IN" i="1" dirty="0"/>
-              <a:t>, NJ)</a:t>
-            </a:r>
-          </a:p>
-          <a:p>
-            <a:pPr lvl="1"/>
-            <a:r>
-              <a:rPr lang="en-IN" i="1" dirty="0" err="1"/>
-              <a:t>updateSparseMatrix</a:t>
-            </a:r>
-            <a:endParaRPr lang="en-IN" i="1" dirty="0"/>
-          </a:p>
-          <a:p>
-            <a:pPr lvl="1"/>
-            <a:r>
-              <a:rPr lang="en-IN" i="1" dirty="0" err="1"/>
-              <a:t>computeSparseTriangularProduct</a:t>
-            </a:r>
-            <a:endParaRPr lang="en-IN" i="1" dirty="0"/>
+              <a:t>Compare your own results to the results in the CDF file, via two plots:</a:t>
+            </a:r>
+          </a:p>
+          <a:p>
+            <a:pPr lvl="2"/>
+            <a:r>
+              <a:rPr lang="en-IN" dirty="0"/>
+              <a:t>Relative percentage difference in </a:t>
+            </a:r>
+            <a:r>
+              <a:rPr lang="en-IN" dirty="0" err="1"/>
+              <a:t>pu</a:t>
+            </a:r>
+            <a:r>
+              <a:rPr lang="en-IN" dirty="0"/>
+              <a:t> Voltages</a:t>
+            </a:r>
+          </a:p>
+          <a:p>
+            <a:pPr lvl="2"/>
+            <a:r>
+              <a:rPr lang="en-IN" dirty="0"/>
+              <a:t>absolute difference in delta values.</a:t>
+            </a:r>
           </a:p>
           <a:p>
             <a:r>
@@ -13792,15 +13547,22 @@
                   <a:srgbClr val="C00000"/>
                 </a:solidFill>
               </a:rPr>
-              <a:t>Caveat: My own implementations were awkward. They were not adaptive to new inputs (i.e. they required all of the sparse inputs to be stated up front, no mechanism to make updates to existing sparse data structures). This later led to complications for performing even simple algorithms like LU Factorization (which is the last requirement as far as evaluation is concerned).</a:t>
-            </a:r>
+              <a:t>Caveat: Bus Switching is optional for evaluation, though in general not implementing it for bigger systems will lead to incorrect outcomes or even divergence.</a:t>
+            </a:r>
+          </a:p>
+          <a:p>
+            <a:endParaRPr lang="en-IN" b="1" dirty="0">
+              <a:solidFill>
+                <a:srgbClr val="002060"/>
+              </a:solidFill>
+            </a:endParaRPr>
           </a:p>
         </p:txBody>
       </p:sp>
     </p:spTree>
     <p:extLst>
       <p:ext uri="{BB962C8B-B14F-4D97-AF65-F5344CB8AC3E}">
-        <p14:creationId xmlns:p14="http://schemas.microsoft.com/office/powerpoint/2010/main" val="943132824"/>
+        <p14:creationId xmlns:p14="http://schemas.microsoft.com/office/powerpoint/2010/main" val="3009292720"/>
       </p:ext>
     </p:extLst>
   </p:cSld>
@@ -13874,126 +13636,346 @@
         <p:spPr/>
         <p:txBody>
           <a:bodyPr>
-            <a:normAutofit/>
+            <a:normAutofit fontScale="70000" lnSpcReduction="20000"/>
           </a:bodyPr>
           <a:lstStyle/>
           <a:p>
             <a:r>
               <a:rPr lang="en-IN" b="1" dirty="0">
                 <a:solidFill>
-                  <a:srgbClr val="FF0000"/>
+                  <a:schemeClr val="bg2">
+                    <a:lumMod val="50000"/>
+                  </a:schemeClr>
                 </a:solidFill>
               </a:rPr>
-              <a:t>P3: </a:t>
+              <a:t>P2: </a:t>
             </a:r>
             <a:r>
               <a:rPr lang="en-IN" b="1" dirty="0" err="1">
                 <a:solidFill>
-                  <a:srgbClr val="FF0000"/>
+                  <a:schemeClr val="bg2">
+                    <a:lumMod val="50000"/>
+                  </a:schemeClr>
                 </a:solidFill>
               </a:rPr>
-              <a:t>NKGContinuationPowerFlow</a:t>
+              <a:t>NKGSparsePowerFlow</a:t>
             </a:r>
             <a:endParaRPr lang="en-IN" b="1" dirty="0">
               <a:solidFill>
-                <a:srgbClr val="FF0000"/>
+                <a:schemeClr val="bg2">
+                  <a:lumMod val="50000"/>
+                </a:schemeClr>
               </a:solidFill>
             </a:endParaRPr>
           </a:p>
           <a:p>
+            <a:r>
+              <a:rPr lang="en-IN" dirty="0"/>
+              <a:t>Need to rethink all implementations (check Caveat).</a:t>
+            </a:r>
+          </a:p>
+          <a:p>
+            <a:r>
+              <a:rPr lang="en-IN" dirty="0"/>
+              <a:t>function</a:t>
+            </a:r>
+            <a:r>
+              <a:rPr lang="en-IN" i="1" dirty="0"/>
+              <a:t> [</a:t>
+            </a:r>
+            <a:r>
+              <a:rPr lang="en-IN" i="1" dirty="0" err="1"/>
+              <a:t>nnzYBus</a:t>
+            </a:r>
+            <a:r>
+              <a:rPr lang="en-IN" i="1" dirty="0"/>
+              <a:t>, </a:t>
+            </a:r>
+            <a:r>
+              <a:rPr lang="en-IN" i="1" dirty="0" err="1"/>
+              <a:t>NYBus</a:t>
+            </a:r>
+            <a:r>
+              <a:rPr lang="en-IN" i="1" dirty="0"/>
+              <a:t>] = </a:t>
+            </a:r>
+            <a:r>
+              <a:rPr lang="en-IN" i="1" dirty="0" err="1"/>
+              <a:t>makeSparseYBus</a:t>
+            </a:r>
+            <a:r>
+              <a:rPr lang="en-IN" i="1" dirty="0"/>
+              <a:t>(</a:t>
+            </a:r>
+            <a:r>
+              <a:rPr lang="en-IN" i="1" dirty="0" err="1"/>
+              <a:t>busData</a:t>
+            </a:r>
+            <a:r>
+              <a:rPr lang="en-IN" i="1" dirty="0"/>
+              <a:t>, </a:t>
+            </a:r>
+            <a:r>
+              <a:rPr lang="en-IN" i="1" dirty="0" err="1"/>
+              <a:t>branchData</a:t>
+            </a:r>
+            <a:r>
+              <a:rPr lang="en-IN" i="1" dirty="0"/>
+              <a:t>)</a:t>
+            </a:r>
+          </a:p>
+          <a:p>
             <a:pPr lvl="1"/>
             <a:r>
+              <a:rPr lang="en-IN" i="1" dirty="0"/>
+              <a:t>[</a:t>
+            </a:r>
+            <a:r>
+              <a:rPr lang="en-IN" i="1" dirty="0" err="1"/>
+              <a:t>iYBus</a:t>
+            </a:r>
+            <a:r>
+              <a:rPr lang="en-IN" i="1" dirty="0"/>
+              <a:t>, </a:t>
+            </a:r>
+            <a:r>
+              <a:rPr lang="en-IN" i="1" dirty="0" err="1"/>
+              <a:t>jYBus</a:t>
+            </a:r>
+            <a:r>
+              <a:rPr lang="en-IN" i="1" dirty="0"/>
+              <a:t>, </a:t>
+            </a:r>
+            <a:r>
+              <a:rPr lang="en-IN" i="1" dirty="0" err="1"/>
+              <a:t>valYBus</a:t>
+            </a:r>
+            <a:r>
+              <a:rPr lang="en-IN" i="1" dirty="0"/>
+              <a:t>] = </a:t>
+            </a:r>
+            <a:r>
+              <a:rPr lang="en-IN" i="1" dirty="0" err="1"/>
+              <a:t>constructSparseYBusTable</a:t>
+            </a:r>
+            <a:r>
+              <a:rPr lang="en-IN" i="1" dirty="0"/>
+              <a:t>(</a:t>
+            </a:r>
+            <a:r>
+              <a:rPr lang="en-IN" i="1" dirty="0" err="1"/>
+              <a:t>busData</a:t>
+            </a:r>
+            <a:r>
+              <a:rPr lang="en-IN" i="1" dirty="0"/>
+              <a:t>, </a:t>
+            </a:r>
+            <a:r>
+              <a:rPr lang="en-IN" i="1" dirty="0" err="1"/>
+              <a:t>branchData</a:t>
+            </a:r>
+            <a:r>
+              <a:rPr lang="en-IN" i="1" dirty="0"/>
+              <a:t>)</a:t>
+            </a:r>
+          </a:p>
+          <a:p>
+            <a:pPr lvl="1"/>
+            <a:r>
+              <a:rPr lang="en-IN" i="1" dirty="0"/>
+              <a:t>[</a:t>
+            </a:r>
+            <a:r>
+              <a:rPr lang="en-IN" i="1" dirty="0" err="1"/>
+              <a:t>nnz</a:t>
+            </a:r>
+            <a:r>
+              <a:rPr lang="en-IN" i="1" dirty="0"/>
+              <a:t>, N] = </a:t>
+            </a:r>
+            <a:r>
+              <a:rPr lang="en-IN" i="1" dirty="0" err="1"/>
+              <a:t>sparmat</a:t>
+            </a:r>
+            <a:r>
+              <a:rPr lang="en-IN" i="1" dirty="0"/>
+              <a:t>([</a:t>
+            </a:r>
+            <a:r>
+              <a:rPr lang="en-IN" i="1" dirty="0" err="1"/>
+              <a:t>i</a:t>
+            </a:r>
+            <a:r>
+              <a:rPr lang="en-IN" i="1" dirty="0"/>
+              <a:t>, j, </a:t>
+            </a:r>
+            <a:r>
+              <a:rPr lang="en-IN" i="1" dirty="0" err="1"/>
+              <a:t>val</a:t>
+            </a:r>
+            <a:r>
+              <a:rPr lang="en-IN" i="1" dirty="0"/>
+              <a:t>])</a:t>
+            </a:r>
+          </a:p>
+          <a:p>
+            <a:r>
               <a:rPr lang="en-IN" dirty="0"/>
-              <a:t>Dependencies: </a:t>
-            </a:r>
-            <a:r>
-              <a:rPr lang="en-IN" b="1" dirty="0" err="1">
+              <a:t>function </a:t>
+            </a:r>
+            <a:r>
+              <a:rPr lang="en-IN" i="1" dirty="0"/>
+              <a:t>[</a:t>
+            </a:r>
+            <a:r>
+              <a:rPr lang="en-IN" i="1" dirty="0" err="1"/>
+              <a:t>deltaP</a:t>
+            </a:r>
+            <a:r>
+              <a:rPr lang="en-IN" i="1" dirty="0"/>
+              <a:t>, </a:t>
+            </a:r>
+            <a:r>
+              <a:rPr lang="en-IN" i="1" dirty="0" err="1"/>
+              <a:t>deltaQ</a:t>
+            </a:r>
+            <a:r>
+              <a:rPr lang="en-IN" i="1" dirty="0"/>
+              <a:t>] = </a:t>
+            </a:r>
+            <a:r>
+              <a:rPr lang="en-IN" i="1" dirty="0" err="1"/>
+              <a:t>computeMismatchesViaSparseYBus</a:t>
+            </a:r>
+            <a:r>
+              <a:rPr lang="en-IN" i="1" dirty="0"/>
+              <a:t>(</a:t>
+            </a:r>
+            <a:r>
+              <a:rPr lang="en-IN" i="1" dirty="0" err="1"/>
+              <a:t>nnzYBus</a:t>
+            </a:r>
+            <a:r>
+              <a:rPr lang="en-IN" i="1" dirty="0"/>
+              <a:t>, </a:t>
+            </a:r>
+            <a:r>
+              <a:rPr lang="en-IN" i="1" dirty="0" err="1"/>
+              <a:t>NYBus</a:t>
+            </a:r>
+            <a:r>
+              <a:rPr lang="en-IN" i="1" dirty="0"/>
+              <a:t>, ..)</a:t>
+            </a:r>
+          </a:p>
+          <a:p>
+            <a:r>
+              <a:rPr lang="en-IN" i="1" dirty="0"/>
+              <a:t>function [</a:t>
+            </a:r>
+            <a:r>
+              <a:rPr lang="en-IN" i="1" dirty="0" err="1"/>
+              <a:t>nnzJ</a:t>
+            </a:r>
+            <a:r>
+              <a:rPr lang="en-IN" i="1" dirty="0"/>
+              <a:t>, NJ] = </a:t>
+            </a:r>
+            <a:r>
+              <a:rPr lang="en-IN" i="1" dirty="0" err="1"/>
+              <a:t>constructSparseJacobian</a:t>
+            </a:r>
+            <a:r>
+              <a:rPr lang="en-IN" i="1" dirty="0"/>
+              <a:t>(</a:t>
+            </a:r>
+            <a:r>
+              <a:rPr lang="en-IN" i="1" dirty="0" err="1"/>
+              <a:t>nnzYBus</a:t>
+            </a:r>
+            <a:r>
+              <a:rPr lang="en-IN" i="1" dirty="0"/>
+              <a:t>, </a:t>
+            </a:r>
+            <a:r>
+              <a:rPr lang="en-IN" i="1" dirty="0" err="1"/>
+              <a:t>NYBus</a:t>
+            </a:r>
+            <a:r>
+              <a:rPr lang="en-IN" i="1" dirty="0"/>
+              <a:t>, …)</a:t>
+            </a:r>
+          </a:p>
+          <a:p>
+            <a:r>
+              <a:rPr lang="en-IN" i="1" dirty="0"/>
+              <a:t>[</a:t>
+            </a:r>
+            <a:r>
+              <a:rPr lang="en-IN" i="1" dirty="0" err="1"/>
+              <a:t>nnzL</a:t>
+            </a:r>
+            <a:r>
+              <a:rPr lang="en-IN" i="1" dirty="0"/>
+              <a:t>, NL, </a:t>
+            </a:r>
+            <a:r>
+              <a:rPr lang="en-IN" i="1" dirty="0" err="1"/>
+              <a:t>nnzU</a:t>
+            </a:r>
+            <a:r>
+              <a:rPr lang="en-IN" i="1" dirty="0"/>
+              <a:t>, NU] = </a:t>
+            </a:r>
+            <a:r>
+              <a:rPr lang="en-IN" i="1" dirty="0" err="1"/>
+              <a:t>factorizeSparseLU</a:t>
+            </a:r>
+            <a:r>
+              <a:rPr lang="en-IN" i="1" dirty="0"/>
+              <a:t>(</a:t>
+            </a:r>
+            <a:r>
+              <a:rPr lang="en-IN" i="1" dirty="0" err="1"/>
+              <a:t>nnzJ</a:t>
+            </a:r>
+            <a:r>
+              <a:rPr lang="en-IN" i="1" dirty="0"/>
+              <a:t>, NJ)</a:t>
+            </a:r>
+          </a:p>
+          <a:p>
+            <a:pPr lvl="1"/>
+            <a:r>
+              <a:rPr lang="en-IN" i="1" dirty="0" err="1"/>
+              <a:t>updateSparseMatrix</a:t>
+            </a:r>
+            <a:endParaRPr lang="en-IN" i="1" dirty="0"/>
+          </a:p>
+          <a:p>
+            <a:pPr lvl="1"/>
+            <a:r>
+              <a:rPr lang="en-IN" i="1" dirty="0" err="1"/>
+              <a:t>computeSparseTriangularProduct</a:t>
+            </a:r>
+            <a:endParaRPr lang="en-IN" i="1" dirty="0"/>
+          </a:p>
+          <a:p>
+            <a:r>
+              <a:rPr lang="en-IN" dirty="0">
                 <a:solidFill>
-                  <a:srgbClr val="002060"/>
+                  <a:srgbClr val="C00000"/>
                 </a:solidFill>
               </a:rPr>
-              <a:t>NKGPowerFlow</a:t>
-            </a:r>
-            <a:r>
-              <a:rPr lang="en-IN" dirty="0"/>
-              <a:t>: </a:t>
-            </a:r>
-            <a:r>
-              <a:rPr lang="en-IN" i="1" dirty="0" err="1"/>
-              <a:t>initializeVectors</a:t>
-            </a:r>
-            <a:r>
-              <a:rPr lang="en-IN" dirty="0"/>
-              <a:t>, </a:t>
-            </a:r>
-            <a:r>
-              <a:rPr lang="en-IN" i="1" dirty="0" err="1"/>
-              <a:t>computeBusInjections</a:t>
-            </a:r>
-            <a:r>
-              <a:rPr lang="en-IN" i="1" dirty="0"/>
-              <a:t>,  </a:t>
-            </a:r>
-            <a:r>
-              <a:rPr lang="en-IN" i="1" dirty="0" err="1"/>
-              <a:t>solveUsingLU</a:t>
-            </a:r>
-            <a:endParaRPr lang="en-IN" i="1" dirty="0"/>
-          </a:p>
-          <a:p>
-            <a:pPr lvl="1"/>
-            <a:r>
-              <a:rPr lang="en-IN" dirty="0"/>
-              <a:t>A few more functions, like </a:t>
-            </a:r>
-            <a:r>
-              <a:rPr lang="en-IN" i="1" dirty="0" err="1"/>
-              <a:t>PredictorFunction</a:t>
-            </a:r>
-            <a:r>
-              <a:rPr lang="en-IN" i="1" dirty="0"/>
-              <a:t> </a:t>
-            </a:r>
-            <a:r>
-              <a:rPr lang="en-IN" dirty="0"/>
-              <a:t>and </a:t>
-            </a:r>
-            <a:r>
-              <a:rPr lang="en-IN" i="1" dirty="0" err="1"/>
-              <a:t>CorrectorFunction</a:t>
-            </a:r>
-            <a:r>
-              <a:rPr lang="en-IN" dirty="0"/>
-              <a:t> </a:t>
-            </a:r>
-            <a:r>
-              <a:rPr lang="en-IN" sz="1600" dirty="0"/>
-              <a:t>(I just refactored a whole script by my project team mate, so for me it’s still in just one script, not too long.)</a:t>
-            </a:r>
-            <a:endParaRPr lang="en-IN" dirty="0"/>
-          </a:p>
-          <a:p>
-            <a:pPr lvl="1"/>
-            <a:r>
-              <a:rPr lang="en-IN" i="1" dirty="0" err="1"/>
-              <a:t>plotCPFPlots</a:t>
-            </a:r>
-            <a:endParaRPr lang="en-IN" i="1" dirty="0"/>
-          </a:p>
-          <a:p>
-            <a:pPr lvl="1"/>
-            <a:r>
-              <a:rPr lang="en-IN" i="1" dirty="0" err="1"/>
-              <a:t>displayCPFResults</a:t>
-            </a:r>
-            <a:endParaRPr lang="en-IN" i="1" dirty="0"/>
+              <a:t>Caveat: My own implementations were awkward. They were not adaptive to new inputs (i.e. they required all of the sparse inputs to be stated up front, no mechanism to make updates to existing sparse data structures). This later led to complications for performing even simple algorithms like LU Factorization (which is the last requirement as far as evaluation is concerned).</a:t>
+            </a:r>
           </a:p>
         </p:txBody>
       </p:sp>
     </p:spTree>
     <p:extLst>
       <p:ext uri="{BB962C8B-B14F-4D97-AF65-F5344CB8AC3E}">
-        <p14:creationId xmlns:p14="http://schemas.microsoft.com/office/powerpoint/2010/main" val="2938050309"/>
+        <p14:creationId xmlns:p14="http://schemas.microsoft.com/office/powerpoint/2010/main" val="943132824"/>
       </p:ext>
     </p:extLst>
   </p:cSld>
@@ -14074,82 +14056,119 @@
             <a:r>
               <a:rPr lang="en-IN" b="1" dirty="0">
                 <a:solidFill>
-                  <a:schemeClr val="accent6">
-                    <a:lumMod val="75000"/>
-                  </a:schemeClr>
+                  <a:srgbClr val="FF0000"/>
                 </a:solidFill>
               </a:rPr>
-              <a:t>P4: </a:t>
+              <a:t>P3: </a:t>
             </a:r>
             <a:r>
               <a:rPr lang="en-IN" b="1" dirty="0" err="1">
                 <a:solidFill>
-                  <a:schemeClr val="accent6">
-                    <a:lumMod val="75000"/>
-                  </a:schemeClr>
+                  <a:srgbClr val="FF0000"/>
                 </a:solidFill>
               </a:rPr>
-              <a:t>NKGStateEstimation</a:t>
+              <a:t>NKGContinuationPowerFlow</a:t>
             </a:r>
             <a:endParaRPr lang="en-IN" b="1" dirty="0">
               <a:solidFill>
-                <a:schemeClr val="accent6">
-                  <a:lumMod val="75000"/>
-                </a:schemeClr>
+                <a:srgbClr val="FF0000"/>
               </a:solidFill>
             </a:endParaRPr>
           </a:p>
           <a:p>
+            <a:pPr lvl="1"/>
             <a:r>
               <a:rPr lang="en-IN" dirty="0"/>
-              <a:t>(My project partner completely did it.)</a:t>
-            </a:r>
-          </a:p>
-          <a:p>
-            <a:r>
-              <a:rPr lang="en-IN" dirty="0"/>
-              <a:t>Requires Powerflow results from </a:t>
-            </a:r>
-            <a:r>
-              <a:rPr lang="en-IN" b="1" dirty="0">
+              <a:t>Dependencies: </a:t>
+            </a:r>
+            <a:r>
+              <a:rPr lang="en-IN" b="1" dirty="0" err="1">
                 <a:solidFill>
                   <a:srgbClr val="002060"/>
                 </a:solidFill>
               </a:rPr>
-              <a:t>P1 </a:t>
+              <a:t>NKGPowerFlow</a:t>
             </a:r>
             <a:r>
               <a:rPr lang="en-IN" dirty="0"/>
-              <a:t>for branch currents.</a:t>
-            </a:r>
-          </a:p>
-          <a:p>
+              <a:t>: </a:t>
+            </a:r>
+            <a:r>
+              <a:rPr lang="en-IN" i="1" dirty="0" err="1"/>
+              <a:t>initializeVectors</a:t>
+            </a:r>
             <a:r>
               <a:rPr lang="en-IN" dirty="0"/>
-              <a:t>Likely requires using a lot of symbolic variables. Although he did it by literally writing out all of the derivative equations.</a:t>
-            </a:r>
-          </a:p>
-          <a:p>
+              <a:t>, </a:t>
+            </a:r>
+            <a:r>
+              <a:rPr lang="en-IN" i="1" dirty="0" err="1"/>
+              <a:t>computeBusInjections</a:t>
+            </a:r>
+            <a:r>
+              <a:rPr lang="en-IN" i="1" dirty="0"/>
+              <a:t>,  </a:t>
+            </a:r>
+            <a:r>
+              <a:rPr lang="en-IN" i="1" dirty="0" err="1"/>
+              <a:t>solveUsingLU</a:t>
+            </a:r>
+            <a:endParaRPr lang="en-IN" i="1" dirty="0"/>
+          </a:p>
+          <a:p>
+            <a:pPr lvl="1"/>
             <a:r>
               <a:rPr lang="en-IN" dirty="0"/>
-              <a:t>Then some addition of noise to the currents.</a:t>
-            </a:r>
-          </a:p>
-          <a:p>
+              <a:t>A few more functions, like </a:t>
+            </a:r>
+            <a:r>
+              <a:rPr lang="en-IN" i="1" dirty="0" err="1"/>
+              <a:t>PredictorFunction</a:t>
+            </a:r>
+            <a:r>
+              <a:rPr lang="en-IN" i="1" dirty="0"/>
+              <a:t> </a:t>
+            </a:r>
             <a:r>
               <a:rPr lang="en-IN" dirty="0"/>
-              <a:t>Then formation of H matrix, to be used in an iterative computation.</a:t>
-            </a:r>
-          </a:p>
-          <a:p>
+              <a:t>and </a:t>
+            </a:r>
+            <a:r>
+              <a:rPr lang="en-IN" i="1" dirty="0" err="1"/>
+              <a:t>CorrectorFunction</a:t>
+            </a:r>
+            <a:r>
+              <a:rPr lang="en-IN" dirty="0"/>
+              <a:t> </a:t>
+            </a:r>
+            <a:r>
+              <a:rPr lang="en-IN" sz="1600" dirty="0"/>
+              <a:t>(I just refactored a whole script by my project team mate, so for me it’s still in just one script, not too long.)</a:t>
+            </a:r>
             <a:endParaRPr lang="en-IN" dirty="0"/>
+          </a:p>
+          <a:p>
+            <a:pPr lvl="1"/>
+            <a:r>
+              <a:rPr lang="en-IN" i="1" dirty="0" err="1"/>
+              <a:t>plotCPFPlots</a:t>
+            </a:r>
+            <a:endParaRPr lang="en-IN" i="1" dirty="0"/>
+          </a:p>
+          <a:p>
+            <a:pPr lvl="1"/>
+            <a:r>
+              <a:rPr lang="en-IN" i="1" dirty="0" err="1"/>
+              <a:t>displayCPFResults</a:t>
+            </a:r>
+            <a:endParaRPr lang="en-IN" i="1" dirty="0"/>
           </a:p>
         </p:txBody>
       </p:sp>
     </p:spTree>
     <p:extLst>
       <p:ext uri="{BB962C8B-B14F-4D97-AF65-F5344CB8AC3E}">
-        <p14:creationId xmlns:p14="http://schemas.microsoft.com/office/powerpoint/2010/main" val="1123651161"/>
+        <p14:creationId xmlns:p14="http://schemas.microsoft.com/office/powerpoint/2010/main" val="2938050309"/>
       </p:ext>
     </p:extLst>
   </p:cSld>
@@ -14230,6 +14249,162 @@
             <a:r>
               <a:rPr lang="en-IN" b="1" dirty="0">
                 <a:solidFill>
+                  <a:schemeClr val="accent6">
+                    <a:lumMod val="75000"/>
+                  </a:schemeClr>
+                </a:solidFill>
+              </a:rPr>
+              <a:t>P4: </a:t>
+            </a:r>
+            <a:r>
+              <a:rPr lang="en-IN" b="1" dirty="0" err="1">
+                <a:solidFill>
+                  <a:schemeClr val="accent6">
+                    <a:lumMod val="75000"/>
+                  </a:schemeClr>
+                </a:solidFill>
+              </a:rPr>
+              <a:t>NKGStateEstimation</a:t>
+            </a:r>
+            <a:endParaRPr lang="en-IN" b="1" dirty="0">
+              <a:solidFill>
+                <a:schemeClr val="accent6">
+                  <a:lumMod val="75000"/>
+                </a:schemeClr>
+              </a:solidFill>
+            </a:endParaRPr>
+          </a:p>
+          <a:p>
+            <a:r>
+              <a:rPr lang="en-IN" dirty="0"/>
+              <a:t>(My project partner completely did it.)</a:t>
+            </a:r>
+          </a:p>
+          <a:p>
+            <a:r>
+              <a:rPr lang="en-IN" dirty="0"/>
+              <a:t>Requires Powerflow results from </a:t>
+            </a:r>
+            <a:r>
+              <a:rPr lang="en-IN" b="1" dirty="0">
+                <a:solidFill>
+                  <a:srgbClr val="002060"/>
+                </a:solidFill>
+              </a:rPr>
+              <a:t>P1 </a:t>
+            </a:r>
+            <a:r>
+              <a:rPr lang="en-IN" dirty="0"/>
+              <a:t>for branch currents.</a:t>
+            </a:r>
+          </a:p>
+          <a:p>
+            <a:r>
+              <a:rPr lang="en-IN" dirty="0"/>
+              <a:t>Likely requires using a lot of symbolic variables. Although he did it by literally writing out all of the derivative equations.</a:t>
+            </a:r>
+          </a:p>
+          <a:p>
+            <a:r>
+              <a:rPr lang="en-IN" dirty="0"/>
+              <a:t>Then some addition of noise to the currents.</a:t>
+            </a:r>
+          </a:p>
+          <a:p>
+            <a:r>
+              <a:rPr lang="en-IN" dirty="0"/>
+              <a:t>Then formation of H matrix, to be used in an iterative computation.</a:t>
+            </a:r>
+          </a:p>
+          <a:p>
+            <a:endParaRPr lang="en-IN" dirty="0"/>
+          </a:p>
+        </p:txBody>
+      </p:sp>
+    </p:spTree>
+    <p:extLst>
+      <p:ext uri="{BB962C8B-B14F-4D97-AF65-F5344CB8AC3E}">
+        <p14:creationId xmlns:p14="http://schemas.microsoft.com/office/powerpoint/2010/main" val="1123651161"/>
+      </p:ext>
+    </p:extLst>
+  </p:cSld>
+  <p:clrMapOvr>
+    <a:masterClrMapping/>
+  </p:clrMapOvr>
+</p:sld>
+</file>
+
+<file path=ppt/slides/slide29.xml><?xml version="1.0" encoding="utf-8"?>
+<p:sld xmlns:a="http://schemas.openxmlformats.org/drawingml/2006/main" xmlns:r="http://schemas.openxmlformats.org/officeDocument/2006/relationships" xmlns:p="http://schemas.openxmlformats.org/presentationml/2006/main">
+  <p:cSld>
+    <p:spTree>
+      <p:nvGrpSpPr>
+        <p:cNvPr id="1" name=""/>
+        <p:cNvGrpSpPr/>
+        <p:nvPr/>
+      </p:nvGrpSpPr>
+      <p:grpSpPr>
+        <a:xfrm>
+          <a:off x="0" y="0"/>
+          <a:ext cx="0" cy="0"/>
+          <a:chOff x="0" y="0"/>
+          <a:chExt cx="0" cy="0"/>
+        </a:xfrm>
+      </p:grpSpPr>
+      <p:sp>
+        <p:nvSpPr>
+          <p:cNvPr id="2" name="Title 1">
+            <a:extLst>
+              <a:ext uri="{FF2B5EF4-FFF2-40B4-BE49-F238E27FC236}">
+                <a16:creationId xmlns:a16="http://schemas.microsoft.com/office/drawing/2014/main" id="{A907B655-ADC6-0DB3-D40C-B4A4F02C56AD}"/>
+              </a:ext>
+            </a:extLst>
+          </p:cNvPr>
+          <p:cNvSpPr>
+            <a:spLocks noGrp="1"/>
+          </p:cNvSpPr>
+          <p:nvPr>
+            <p:ph type="title"/>
+          </p:nvPr>
+        </p:nvSpPr>
+        <p:spPr/>
+        <p:txBody>
+          <a:bodyPr/>
+          <a:lstStyle/>
+          <a:p>
+            <a:r>
+              <a:rPr lang="en-IN" dirty="0"/>
+              <a:t>Sample functions in modules</a:t>
+            </a:r>
+          </a:p>
+        </p:txBody>
+      </p:sp>
+      <p:sp>
+        <p:nvSpPr>
+          <p:cNvPr id="3" name="Content Placeholder 2">
+            <a:extLst>
+              <a:ext uri="{FF2B5EF4-FFF2-40B4-BE49-F238E27FC236}">
+                <a16:creationId xmlns:a16="http://schemas.microsoft.com/office/drawing/2014/main" id="{B248B06E-0246-4FEF-533A-B0C46C596083}"/>
+              </a:ext>
+            </a:extLst>
+          </p:cNvPr>
+          <p:cNvSpPr>
+            <a:spLocks noGrp="1"/>
+          </p:cNvSpPr>
+          <p:nvPr>
+            <p:ph idx="1"/>
+          </p:nvPr>
+        </p:nvSpPr>
+        <p:spPr/>
+        <p:txBody>
+          <a:bodyPr>
+            <a:normAutofit/>
+          </a:bodyPr>
+          <a:lstStyle/>
+          <a:p>
+            <a:r>
+              <a:rPr lang="en-IN" b="1" dirty="0">
+                <a:solidFill>
                   <a:schemeClr val="accent2">
                     <a:lumMod val="75000"/>
                   </a:schemeClr>
@@ -14375,7 +14550,225 @@
 </p:sld>
 </file>
 
-<file path=ppt/slides/slide29.xml><?xml version="1.0" encoding="utf-8"?>
+<file path=ppt/slides/slide3.xml><?xml version="1.0" encoding="utf-8"?>
+<p:sld xmlns:a="http://schemas.openxmlformats.org/drawingml/2006/main" xmlns:r="http://schemas.openxmlformats.org/officeDocument/2006/relationships" xmlns:p="http://schemas.openxmlformats.org/presentationml/2006/main">
+  <p:cSld>
+    <p:bg>
+      <p:bgPr>
+        <a:solidFill>
+          <a:schemeClr val="bg1"/>
+        </a:solidFill>
+        <a:effectLst/>
+      </p:bgPr>
+    </p:bg>
+    <p:spTree>
+      <p:nvGrpSpPr>
+        <p:cNvPr id="1" name=""/>
+        <p:cNvGrpSpPr/>
+        <p:nvPr/>
+      </p:nvGrpSpPr>
+      <p:grpSpPr>
+        <a:xfrm>
+          <a:off x="0" y="0"/>
+          <a:ext cx="0" cy="0"/>
+          <a:chOff x="0" y="0"/>
+          <a:chExt cx="0" cy="0"/>
+        </a:xfrm>
+      </p:grpSpPr>
+      <p:sp useBgFill="1">
+        <p:nvSpPr>
+          <p:cNvPr id="59" name="Rectangle 58">
+            <a:extLst>
+              <a:ext uri="{FF2B5EF4-FFF2-40B4-BE49-F238E27FC236}">
+                <a16:creationId xmlns:a16="http://schemas.microsoft.com/office/drawing/2014/main" id="{53F29798-D584-4792-9B62-3F5F5C36D619}"/>
+              </a:ext>
+              <a:ext uri="{C183D7F6-B498-43B3-948B-1728B52AA6E4}">
+                <adec:decorative xmlns:adec="http://schemas.microsoft.com/office/drawing/2017/decorative" val="1"/>
+              </a:ext>
+            </a:extLst>
+          </p:cNvPr>
+          <p:cNvSpPr>
+            <a:spLocks noGrp="1" noRot="1" noChangeAspect="1" noMove="1" noResize="1" noEditPoints="1" noAdjustHandles="1" noChangeArrowheads="1" noChangeShapeType="1" noTextEdit="1"/>
+          </p:cNvSpPr>
+          <p:nvPr>
+            <p:extLst>
+              <p:ext uri="{386F3935-93C4-4BCD-93E2-E3B085C9AB24}">
+                <p16:designElem xmlns:p16="http://schemas.microsoft.com/office/powerpoint/2015/main" val="1"/>
+              </p:ext>
+            </p:extLst>
+          </p:nvPr>
+        </p:nvSpPr>
+        <p:spPr>
+          <a:xfrm>
+            <a:off x="0" y="0"/>
+            <a:ext cx="12188952" cy="6858000"/>
+          </a:xfrm>
+          <a:prstGeom prst="rect">
+            <a:avLst/>
+          </a:prstGeom>
+          <a:ln>
+            <a:noFill/>
+          </a:ln>
+        </p:spPr>
+        <p:style>
+          <a:lnRef idx="2">
+            <a:schemeClr val="accent1">
+              <a:shade val="50000"/>
+            </a:schemeClr>
+          </a:lnRef>
+          <a:fillRef idx="1">
+            <a:schemeClr val="accent1"/>
+          </a:fillRef>
+          <a:effectRef idx="0">
+            <a:schemeClr val="accent1"/>
+          </a:effectRef>
+          <a:fontRef idx="minor">
+            <a:schemeClr val="lt1"/>
+          </a:fontRef>
+        </p:style>
+        <p:txBody>
+          <a:bodyPr rtlCol="0" anchor="ctr"/>
+          <a:lstStyle/>
+          <a:p>
+            <a:pPr algn="ctr"/>
+            <a:endParaRPr lang="en-US"/>
+          </a:p>
+        </p:txBody>
+      </p:sp>
+      <p:sp>
+        <p:nvSpPr>
+          <p:cNvPr id="2" name="Title 1">
+            <a:extLst>
+              <a:ext uri="{FF2B5EF4-FFF2-40B4-BE49-F238E27FC236}">
+                <a16:creationId xmlns:a16="http://schemas.microsoft.com/office/drawing/2014/main" id="{67A20612-6EA0-7C56-0CC6-3CA67365DFF8}"/>
+              </a:ext>
+            </a:extLst>
+          </p:cNvPr>
+          <p:cNvSpPr>
+            <a:spLocks noGrp="1"/>
+          </p:cNvSpPr>
+          <p:nvPr>
+            <p:ph type="title"/>
+          </p:nvPr>
+        </p:nvSpPr>
+        <p:spPr>
+          <a:xfrm>
+            <a:off x="838200" y="184805"/>
+            <a:ext cx="10515600" cy="1505883"/>
+          </a:xfrm>
+        </p:spPr>
+        <p:style>
+          <a:lnRef idx="2">
+            <a:schemeClr val="accent2"/>
+          </a:lnRef>
+          <a:fillRef idx="1">
+            <a:schemeClr val="lt1"/>
+          </a:fillRef>
+          <a:effectRef idx="0">
+            <a:schemeClr val="accent2"/>
+          </a:effectRef>
+          <a:fontRef idx="minor">
+            <a:schemeClr val="dk1"/>
+          </a:fontRef>
+        </p:style>
+        <p:txBody>
+          <a:bodyPr vert="horz" lIns="91440" tIns="45720" rIns="91440" bIns="45720" rtlCol="0" anchor="ctr">
+            <a:normAutofit/>
+          </a:bodyPr>
+          <a:lstStyle/>
+          <a:p>
+            <a:r>
+              <a:rPr lang="en-US" sz="4800" kern="1200">
+                <a:solidFill>
+                  <a:schemeClr val="tx1"/>
+                </a:solidFill>
+                <a:latin typeface="+mj-lt"/>
+                <a:ea typeface="+mj-ea"/>
+                <a:cs typeface="+mj-cs"/>
+              </a:rPr>
+              <a:t>Current Objective: Develop a One-Page Abstract for the proposed Julia Package</a:t>
+            </a:r>
+          </a:p>
+        </p:txBody>
+      </p:sp>
+      <p:pic>
+        <p:nvPicPr>
+          <p:cNvPr id="12" name="Picture 11">
+            <a:extLst>
+              <a:ext uri="{FF2B5EF4-FFF2-40B4-BE49-F238E27FC236}">
+                <a16:creationId xmlns:a16="http://schemas.microsoft.com/office/drawing/2014/main" id="{2C715FE7-D1BA-896B-C1EA-E8DFF32B6708}"/>
+              </a:ext>
+            </a:extLst>
+          </p:cNvPr>
+          <p:cNvPicPr>
+            <a:picLocks noChangeAspect="1"/>
+          </p:cNvPicPr>
+          <p:nvPr/>
+        </p:nvPicPr>
+        <p:blipFill rotWithShape="1">
+          <a:blip r:embed="rId2"/>
+          <a:srcRect r="29"/>
+          <a:stretch/>
+        </p:blipFill>
+        <p:spPr>
+          <a:xfrm>
+            <a:off x="838200" y="2244022"/>
+            <a:ext cx="10512547" cy="3653110"/>
+          </a:xfrm>
+          <a:prstGeom prst="rect">
+            <a:avLst/>
+          </a:prstGeom>
+          <a:ln>
+            <a:solidFill>
+              <a:srgbClr val="FF0000"/>
+            </a:solidFill>
+          </a:ln>
+        </p:spPr>
+      </p:pic>
+      <p:pic>
+        <p:nvPicPr>
+          <p:cNvPr id="4" name="Picture 3">
+            <a:extLst>
+              <a:ext uri="{FF2B5EF4-FFF2-40B4-BE49-F238E27FC236}">
+                <a16:creationId xmlns:a16="http://schemas.microsoft.com/office/drawing/2014/main" id="{FE2107A1-B221-59F0-46FD-9C233BBFA9AA}"/>
+              </a:ext>
+            </a:extLst>
+          </p:cNvPr>
+          <p:cNvPicPr>
+            <a:picLocks noChangeAspect="1"/>
+          </p:cNvPicPr>
+          <p:nvPr/>
+        </p:nvPicPr>
+        <p:blipFill>
+          <a:blip r:embed="rId3"/>
+          <a:stretch>
+            <a:fillRect/>
+          </a:stretch>
+        </p:blipFill>
+        <p:spPr>
+          <a:xfrm>
+            <a:off x="634227" y="6044540"/>
+            <a:ext cx="10920492" cy="628655"/>
+          </a:xfrm>
+          <a:prstGeom prst="rect">
+            <a:avLst/>
+          </a:prstGeom>
+        </p:spPr>
+      </p:pic>
+    </p:spTree>
+    <p:extLst>
+      <p:ext uri="{BB962C8B-B14F-4D97-AF65-F5344CB8AC3E}">
+        <p14:creationId xmlns:p14="http://schemas.microsoft.com/office/powerpoint/2010/main" val="1432101322"/>
+      </p:ext>
+    </p:extLst>
+  </p:cSld>
+  <p:clrMapOvr>
+    <a:masterClrMapping/>
+  </p:clrMapOvr>
+</p:sld>
+</file>
+
+<file path=ppt/slides/slide30.xml><?xml version="1.0" encoding="utf-8"?>
 <p:sld xmlns:a="http://schemas.openxmlformats.org/drawingml/2006/main" xmlns:r="http://schemas.openxmlformats.org/officeDocument/2006/relationships" xmlns:p="http://schemas.openxmlformats.org/presentationml/2006/main">
   <p:cSld>
     <p:spTree>
@@ -15187,225 +15580,7 @@
 </p:sld>
 </file>
 
-<file path=ppt/slides/slide3.xml><?xml version="1.0" encoding="utf-8"?>
-<p:sld xmlns:a="http://schemas.openxmlformats.org/drawingml/2006/main" xmlns:r="http://schemas.openxmlformats.org/officeDocument/2006/relationships" xmlns:p="http://schemas.openxmlformats.org/presentationml/2006/main">
-  <p:cSld>
-    <p:bg>
-      <p:bgPr>
-        <a:solidFill>
-          <a:schemeClr val="bg1"/>
-        </a:solidFill>
-        <a:effectLst/>
-      </p:bgPr>
-    </p:bg>
-    <p:spTree>
-      <p:nvGrpSpPr>
-        <p:cNvPr id="1" name=""/>
-        <p:cNvGrpSpPr/>
-        <p:nvPr/>
-      </p:nvGrpSpPr>
-      <p:grpSpPr>
-        <a:xfrm>
-          <a:off x="0" y="0"/>
-          <a:ext cx="0" cy="0"/>
-          <a:chOff x="0" y="0"/>
-          <a:chExt cx="0" cy="0"/>
-        </a:xfrm>
-      </p:grpSpPr>
-      <p:sp useBgFill="1">
-        <p:nvSpPr>
-          <p:cNvPr id="59" name="Rectangle 58">
-            <a:extLst>
-              <a:ext uri="{FF2B5EF4-FFF2-40B4-BE49-F238E27FC236}">
-                <a16:creationId xmlns:a16="http://schemas.microsoft.com/office/drawing/2014/main" id="{53F29798-D584-4792-9B62-3F5F5C36D619}"/>
-              </a:ext>
-              <a:ext uri="{C183D7F6-B498-43B3-948B-1728B52AA6E4}">
-                <adec:decorative xmlns:adec="http://schemas.microsoft.com/office/drawing/2017/decorative" val="1"/>
-              </a:ext>
-            </a:extLst>
-          </p:cNvPr>
-          <p:cNvSpPr>
-            <a:spLocks noGrp="1" noRot="1" noChangeAspect="1" noMove="1" noResize="1" noEditPoints="1" noAdjustHandles="1" noChangeArrowheads="1" noChangeShapeType="1" noTextEdit="1"/>
-          </p:cNvSpPr>
-          <p:nvPr>
-            <p:extLst>
-              <p:ext uri="{386F3935-93C4-4BCD-93E2-E3B085C9AB24}">
-                <p16:designElem xmlns:p16="http://schemas.microsoft.com/office/powerpoint/2015/main" val="1"/>
-              </p:ext>
-            </p:extLst>
-          </p:nvPr>
-        </p:nvSpPr>
-        <p:spPr>
-          <a:xfrm>
-            <a:off x="0" y="0"/>
-            <a:ext cx="12188952" cy="6858000"/>
-          </a:xfrm>
-          <a:prstGeom prst="rect">
-            <a:avLst/>
-          </a:prstGeom>
-          <a:ln>
-            <a:noFill/>
-          </a:ln>
-        </p:spPr>
-        <p:style>
-          <a:lnRef idx="2">
-            <a:schemeClr val="accent1">
-              <a:shade val="50000"/>
-            </a:schemeClr>
-          </a:lnRef>
-          <a:fillRef idx="1">
-            <a:schemeClr val="accent1"/>
-          </a:fillRef>
-          <a:effectRef idx="0">
-            <a:schemeClr val="accent1"/>
-          </a:effectRef>
-          <a:fontRef idx="minor">
-            <a:schemeClr val="lt1"/>
-          </a:fontRef>
-        </p:style>
-        <p:txBody>
-          <a:bodyPr rtlCol="0" anchor="ctr"/>
-          <a:lstStyle/>
-          <a:p>
-            <a:pPr algn="ctr"/>
-            <a:endParaRPr lang="en-US"/>
-          </a:p>
-        </p:txBody>
-      </p:sp>
-      <p:sp>
-        <p:nvSpPr>
-          <p:cNvPr id="2" name="Title 1">
-            <a:extLst>
-              <a:ext uri="{FF2B5EF4-FFF2-40B4-BE49-F238E27FC236}">
-                <a16:creationId xmlns:a16="http://schemas.microsoft.com/office/drawing/2014/main" id="{67A20612-6EA0-7C56-0CC6-3CA67365DFF8}"/>
-              </a:ext>
-            </a:extLst>
-          </p:cNvPr>
-          <p:cNvSpPr>
-            <a:spLocks noGrp="1"/>
-          </p:cNvSpPr>
-          <p:nvPr>
-            <p:ph type="title"/>
-          </p:nvPr>
-        </p:nvSpPr>
-        <p:spPr>
-          <a:xfrm>
-            <a:off x="838200" y="184805"/>
-            <a:ext cx="10515600" cy="1505883"/>
-          </a:xfrm>
-        </p:spPr>
-        <p:style>
-          <a:lnRef idx="2">
-            <a:schemeClr val="accent2"/>
-          </a:lnRef>
-          <a:fillRef idx="1">
-            <a:schemeClr val="lt1"/>
-          </a:fillRef>
-          <a:effectRef idx="0">
-            <a:schemeClr val="accent2"/>
-          </a:effectRef>
-          <a:fontRef idx="minor">
-            <a:schemeClr val="dk1"/>
-          </a:fontRef>
-        </p:style>
-        <p:txBody>
-          <a:bodyPr vert="horz" lIns="91440" tIns="45720" rIns="91440" bIns="45720" rtlCol="0" anchor="ctr">
-            <a:normAutofit/>
-          </a:bodyPr>
-          <a:lstStyle/>
-          <a:p>
-            <a:r>
-              <a:rPr lang="en-US" sz="4800" kern="1200">
-                <a:solidFill>
-                  <a:schemeClr val="tx1"/>
-                </a:solidFill>
-                <a:latin typeface="+mj-lt"/>
-                <a:ea typeface="+mj-ea"/>
-                <a:cs typeface="+mj-cs"/>
-              </a:rPr>
-              <a:t>Current Objective: Develop a One-Page Abstract for the proposed Julia Package</a:t>
-            </a:r>
-          </a:p>
-        </p:txBody>
-      </p:sp>
-      <p:pic>
-        <p:nvPicPr>
-          <p:cNvPr id="12" name="Picture 11">
-            <a:extLst>
-              <a:ext uri="{FF2B5EF4-FFF2-40B4-BE49-F238E27FC236}">
-                <a16:creationId xmlns:a16="http://schemas.microsoft.com/office/drawing/2014/main" id="{2C715FE7-D1BA-896B-C1EA-E8DFF32B6708}"/>
-              </a:ext>
-            </a:extLst>
-          </p:cNvPr>
-          <p:cNvPicPr>
-            <a:picLocks noChangeAspect="1"/>
-          </p:cNvPicPr>
-          <p:nvPr/>
-        </p:nvPicPr>
-        <p:blipFill rotWithShape="1">
-          <a:blip r:embed="rId2"/>
-          <a:srcRect r="29"/>
-          <a:stretch/>
-        </p:blipFill>
-        <p:spPr>
-          <a:xfrm>
-            <a:off x="838200" y="2244022"/>
-            <a:ext cx="10512547" cy="3653110"/>
-          </a:xfrm>
-          <a:prstGeom prst="rect">
-            <a:avLst/>
-          </a:prstGeom>
-          <a:ln>
-            <a:solidFill>
-              <a:srgbClr val="FF0000"/>
-            </a:solidFill>
-          </a:ln>
-        </p:spPr>
-      </p:pic>
-      <p:pic>
-        <p:nvPicPr>
-          <p:cNvPr id="4" name="Picture 3">
-            <a:extLst>
-              <a:ext uri="{FF2B5EF4-FFF2-40B4-BE49-F238E27FC236}">
-                <a16:creationId xmlns:a16="http://schemas.microsoft.com/office/drawing/2014/main" id="{FE2107A1-B221-59F0-46FD-9C233BBFA9AA}"/>
-              </a:ext>
-            </a:extLst>
-          </p:cNvPr>
-          <p:cNvPicPr>
-            <a:picLocks noChangeAspect="1"/>
-          </p:cNvPicPr>
-          <p:nvPr/>
-        </p:nvPicPr>
-        <p:blipFill>
-          <a:blip r:embed="rId3"/>
-          <a:stretch>
-            <a:fillRect/>
-          </a:stretch>
-        </p:blipFill>
-        <p:spPr>
-          <a:xfrm>
-            <a:off x="634227" y="6044540"/>
-            <a:ext cx="10920492" cy="628655"/>
-          </a:xfrm>
-          <a:prstGeom prst="rect">
-            <a:avLst/>
-          </a:prstGeom>
-        </p:spPr>
-      </p:pic>
-    </p:spTree>
-    <p:extLst>
-      <p:ext uri="{BB962C8B-B14F-4D97-AF65-F5344CB8AC3E}">
-        <p14:creationId xmlns:p14="http://schemas.microsoft.com/office/powerpoint/2010/main" val="1432101322"/>
-      </p:ext>
-    </p:extLst>
-  </p:cSld>
-  <p:clrMapOvr>
-    <a:masterClrMapping/>
-  </p:clrMapOvr>
-</p:sld>
-</file>
-
-<file path=ppt/slides/slide30.xml><?xml version="1.0" encoding="utf-8"?>
+<file path=ppt/slides/slide31.xml><?xml version="1.0" encoding="utf-8"?>
 <p:sld xmlns:a="http://schemas.openxmlformats.org/drawingml/2006/main" xmlns:r="http://schemas.openxmlformats.org/officeDocument/2006/relationships" xmlns:p="http://schemas.openxmlformats.org/presentationml/2006/main">
   <p:cSld>
     <p:spTree>
@@ -15539,7 +15714,7 @@
 </p:sld>
 </file>
 
-<file path=ppt/slides/slide31.xml><?xml version="1.0" encoding="utf-8"?>
+<file path=ppt/slides/slide32.xml><?xml version="1.0" encoding="utf-8"?>
 <p:sld xmlns:a="http://schemas.openxmlformats.org/drawingml/2006/main" xmlns:r="http://schemas.openxmlformats.org/officeDocument/2006/relationships" xmlns:p="http://schemas.openxmlformats.org/presentationml/2006/main">
   <p:cSld>
     <p:spTree>
@@ -17150,7 +17325,7 @@
           <p:cNvPr id="2" name="Title 1">
             <a:extLst>
               <a:ext uri="{FF2B5EF4-FFF2-40B4-BE49-F238E27FC236}">
-                <a16:creationId xmlns:a16="http://schemas.microsoft.com/office/drawing/2014/main" id="{A8A7A435-95A5-2381-42D2-9193E39FE483}"/>
+                <a16:creationId xmlns:a16="http://schemas.microsoft.com/office/drawing/2014/main" id="{E08CA0C9-860B-ADD5-F8DB-2FB06F37C4E3}"/>
               </a:ext>
             </a:extLst>
           </p:cNvPr>
@@ -17163,38 +17338,14 @@
         </p:nvSpPr>
         <p:spPr/>
         <p:txBody>
-          <a:bodyPr>
-            <a:normAutofit fontScale="90000"/>
-          </a:bodyPr>
+          <a:bodyPr/>
           <a:lstStyle/>
           <a:p>
             <a:r>
-              <a:rPr lang="en-IN" dirty="0"/>
-              <a:t>Objective: Deploy a </a:t>
-            </a:r>
-            <a:r>
-              <a:rPr lang="en-IN" dirty="0">
-                <a:solidFill>
-                  <a:srgbClr val="7030A0"/>
-                </a:solidFill>
-              </a:rPr>
-              <a:t>Julia</a:t>
-            </a:r>
-            <a:r>
-              <a:rPr lang="en-IN" dirty="0"/>
-              <a:t> package for Power System Analysis</a:t>
-            </a:r>
-            <a:br>
-              <a:rPr lang="en-IN" dirty="0"/>
-            </a:br>
-            <a:r>
-              <a:rPr lang="en-IN" sz="2200" dirty="0"/>
-              <a:t>and possibly Power System Stability and Control too</a:t>
-            </a:r>
-            <a:r>
-              <a:rPr lang="en-IN" dirty="0"/>
-              <a:t>.</a:t>
-            </a:r>
+              <a:rPr lang="en-US" dirty="0"/>
+              <a:t>Collaboration in GitHub</a:t>
+            </a:r>
+            <a:endParaRPr lang="en-IN" dirty="0"/>
           </a:p>
         </p:txBody>
       </p:sp>
@@ -17203,7 +17354,7 @@
           <p:cNvPr id="3" name="Content Placeholder 2">
             <a:extLst>
               <a:ext uri="{FF2B5EF4-FFF2-40B4-BE49-F238E27FC236}">
-                <a16:creationId xmlns:a16="http://schemas.microsoft.com/office/drawing/2014/main" id="{C0E4BDB6-1746-85CD-0FAA-2319229CCEB3}"/>
+                <a16:creationId xmlns:a16="http://schemas.microsoft.com/office/drawing/2014/main" id="{374E0139-771F-0AA2-D52B-A4CC5B605EE3}"/>
               </a:ext>
             </a:extLst>
           </p:cNvPr>
@@ -17214,113 +17365,93 @@
             <p:ph idx="1"/>
           </p:nvPr>
         </p:nvSpPr>
-        <p:spPr>
-          <a:xfrm>
-            <a:off x="701723" y="1982575"/>
-            <a:ext cx="10515600" cy="4351338"/>
-          </a:xfrm>
-        </p:spPr>
+        <p:spPr/>
         <p:txBody>
           <a:bodyPr>
-            <a:normAutofit fontScale="92500" lnSpcReduction="10000"/>
+            <a:normAutofit fontScale="85000" lnSpcReduction="10000"/>
           </a:bodyPr>
           <a:lstStyle/>
           <a:p>
-            <a:pPr marL="457200" lvl="1" indent="0">
-              <a:buNone/>
-            </a:pPr>
-            <a:r>
-              <a:rPr lang="en-IN" sz="2600" dirty="0"/>
-              <a:t>What will be its contents?</a:t>
+            <a:r>
+              <a:rPr lang="en-US" dirty="0"/>
+              <a:t>My knowledge of GitHub is very rudimentary. </a:t>
             </a:r>
           </a:p>
           <a:p>
             <a:pPr lvl="1"/>
             <a:r>
-              <a:rPr lang="en-IN" sz="2600" dirty="0"/>
-              <a:t>Same as the requirements of EE 521 (Analysis of Power Systems), which are:</a:t>
+              <a:rPr lang="en-US" dirty="0"/>
+              <a:t>Before starting to work on a new function in your branch, check that your branch is up to date with the latest functionalities of the main branch. You can use Branch-&gt;Update with main branch for </a:t>
+            </a:r>
+            <a:r>
+              <a:rPr lang="en-US"/>
+              <a:t>the same.</a:t>
+            </a:r>
+            <a:endParaRPr lang="en-US" dirty="0"/>
+          </a:p>
+          <a:p>
+            <a:pPr lvl="1"/>
+            <a:r>
+              <a:rPr lang="en-US" dirty="0"/>
+              <a:t>Accepting a Pull Request (which means adding stuff from your branch to the main branch) best works when there are little to no conflicts.</a:t>
+            </a:r>
+          </a:p>
+          <a:p>
+            <a:pPr lvl="1"/>
+            <a:r>
+              <a:rPr lang="en-US" dirty="0"/>
+              <a:t>To make sure that there are little to no conflict:</a:t>
             </a:r>
           </a:p>
           <a:p>
             <a:pPr lvl="2"/>
             <a:r>
-              <a:rPr lang="en-IN" dirty="0"/>
-              <a:t>Power Flow (Newton Raphson Power Flow, Decoupled Power Flow, Fast Decoupled Power Flow).</a:t>
+              <a:rPr lang="en-US" dirty="0"/>
+              <a:t>Use your dedicated test file for testing the functions you’re creating.</a:t>
             </a:r>
           </a:p>
           <a:p>
             <a:pPr lvl="2"/>
             <a:r>
-              <a:rPr lang="en-IN" dirty="0"/>
-              <a:t>Sparse Power Flow</a:t>
+              <a:rPr lang="en-US" dirty="0"/>
+              <a:t>Write your functions in a separate module.</a:t>
             </a:r>
           </a:p>
           <a:p>
             <a:pPr lvl="2"/>
             <a:r>
-              <a:rPr lang="en-IN" dirty="0"/>
-              <a:t>Continuation Power Flow</a:t>
+              <a:rPr lang="en-US" dirty="0"/>
+              <a:t>Once you’re able to ascertain that your functions actually work, move them from that temporary module into the required module.</a:t>
             </a:r>
           </a:p>
           <a:p>
             <a:pPr lvl="2"/>
             <a:r>
-              <a:rPr lang="en-IN" dirty="0"/>
-              <a:t>State Estimation in Power Systems</a:t>
+              <a:rPr lang="en-US" dirty="0"/>
+              <a:t>If your function was NOT present in the required module, there will likely be no conflicts for merging.</a:t>
             </a:r>
           </a:p>
           <a:p>
             <a:pPr lvl="2"/>
             <a:r>
-              <a:rPr lang="en-IN" dirty="0"/>
-              <a:t>Optimal Power Flow</a:t>
+              <a:rPr lang="en-US" dirty="0"/>
+              <a:t>If your function has altered the state of the previous module, it will likely be the only conflict for merging, in which case you can confidently overwrite the previous code in </a:t>
+            </a:r>
+            <a:r>
+              <a:rPr lang="en-US" dirty="0" err="1"/>
+              <a:t>th</a:t>
+            </a:r>
+            <a:r>
+              <a:rPr lang="en-US" dirty="0"/>
+              <a:t> main branch, knowing that you’re the only one working on that function. </a:t>
             </a:r>
           </a:p>
           <a:p>
             <a:pPr lvl="1"/>
             <a:r>
-              <a:rPr lang="en-IN" sz="2600" dirty="0"/>
-              <a:t>Possibly also the requirements of EE 523 (Power System Stability and Control):</a:t>
-            </a:r>
-          </a:p>
-          <a:p>
-            <a:pPr lvl="2"/>
-            <a:r>
-              <a:rPr lang="en-IN" sz="2100" dirty="0"/>
-              <a:t>Power System Dynamic Initialization</a:t>
-            </a:r>
-          </a:p>
-          <a:p>
-            <a:pPr lvl="2"/>
-            <a:r>
-              <a:rPr lang="en-IN" sz="2100" dirty="0"/>
-              <a:t>Small-Signal Stability Analysis</a:t>
-            </a:r>
-          </a:p>
-          <a:p>
-            <a:pPr lvl="2"/>
-            <a:r>
-              <a:rPr lang="en-IN" sz="2100" dirty="0"/>
-              <a:t>Transient Stability Analysis</a:t>
-            </a:r>
-          </a:p>
-          <a:p>
-            <a:pPr lvl="1"/>
-            <a:r>
-              <a:rPr lang="en-IN" dirty="0"/>
-              <a:t>A IEEE Common Data Format (CDF) parser in Julia, for reading the system data.</a:t>
-            </a:r>
-          </a:p>
-          <a:p>
-            <a:pPr lvl="1"/>
-            <a:endParaRPr lang="en-IN" dirty="0"/>
-          </a:p>
-          <a:p>
-            <a:pPr lvl="1"/>
-            <a:endParaRPr lang="en-IN" dirty="0"/>
-          </a:p>
-          <a:p>
-            <a:pPr lvl="1"/>
+              <a:rPr lang="en-US" dirty="0"/>
+              <a:t>If all else fails, we can always revert to a previous, working version of the main branch.	</a:t>
+            </a:r>
             <a:endParaRPr lang="en-IN" dirty="0"/>
           </a:p>
         </p:txBody>
@@ -17328,7 +17459,7 @@
     </p:spTree>
     <p:extLst>
       <p:ext uri="{BB962C8B-B14F-4D97-AF65-F5344CB8AC3E}">
-        <p14:creationId xmlns:p14="http://schemas.microsoft.com/office/powerpoint/2010/main" val="178580332"/>
+        <p14:creationId xmlns:p14="http://schemas.microsoft.com/office/powerpoint/2010/main" val="1616489273"/>
       </p:ext>
     </p:extLst>
   </p:cSld>
@@ -17432,7 +17563,7 @@
         </p:spPr>
         <p:txBody>
           <a:bodyPr>
-            <a:normAutofit/>
+            <a:normAutofit fontScale="92500" lnSpcReduction="10000"/>
           </a:bodyPr>
           <a:lstStyle/>
           <a:p>
@@ -17440,50 +17571,86 @@
               <a:buNone/>
             </a:pPr>
             <a:r>
+              <a:rPr lang="en-IN" sz="2600" dirty="0"/>
+              <a:t>What will be its contents?</a:t>
+            </a:r>
+          </a:p>
+          <a:p>
+            <a:pPr lvl="1"/>
+            <a:r>
+              <a:rPr lang="en-IN" sz="2600" dirty="0"/>
+              <a:t>Same as the requirements of EE 521 (Analysis of Power Systems), which are:</a:t>
+            </a:r>
+          </a:p>
+          <a:p>
+            <a:pPr lvl="2"/>
+            <a:r>
               <a:rPr lang="en-IN" dirty="0"/>
-              <a:t>Why deploy this package?</a:t>
+              <a:t>Power Flow (Newton Raphson Power Flow, Decoupled Power Flow, Fast Decoupled Power Flow).</a:t>
+            </a:r>
+          </a:p>
+          <a:p>
+            <a:pPr lvl="2"/>
+            <a:r>
+              <a:rPr lang="en-IN" dirty="0"/>
+              <a:t>Sparse Power Flow</a:t>
+            </a:r>
+          </a:p>
+          <a:p>
+            <a:pPr lvl="2"/>
+            <a:r>
+              <a:rPr lang="en-IN" dirty="0"/>
+              <a:t>Continuation Power Flow</a:t>
+            </a:r>
+          </a:p>
+          <a:p>
+            <a:pPr lvl="2"/>
+            <a:r>
+              <a:rPr lang="en-IN" dirty="0"/>
+              <a:t>State Estimation in Power Systems</a:t>
+            </a:r>
+          </a:p>
+          <a:p>
+            <a:pPr lvl="2"/>
+            <a:r>
+              <a:rPr lang="en-IN" dirty="0"/>
+              <a:t>Optimal Power Flow</a:t>
             </a:r>
           </a:p>
           <a:p>
             <a:pPr lvl="1"/>
             <a:r>
+              <a:rPr lang="en-IN" sz="2600" dirty="0"/>
+              <a:t>Possibly also the requirements of EE 523 (Power System Stability and Control):</a:t>
+            </a:r>
+          </a:p>
+          <a:p>
+            <a:pPr lvl="2"/>
+            <a:r>
+              <a:rPr lang="en-IN" sz="2100" dirty="0"/>
+              <a:t>Power System Dynamic Initialization</a:t>
+            </a:r>
+          </a:p>
+          <a:p>
+            <a:pPr lvl="2"/>
+            <a:r>
+              <a:rPr lang="en-IN" sz="2100" dirty="0"/>
+              <a:t>Small-Signal Stability Analysis</a:t>
+            </a:r>
+          </a:p>
+          <a:p>
+            <a:pPr lvl="2"/>
+            <a:r>
+              <a:rPr lang="en-IN" sz="2100" dirty="0"/>
+              <a:t>Transient Stability Analysis</a:t>
+            </a:r>
+          </a:p>
+          <a:p>
+            <a:pPr lvl="1"/>
+            <a:r>
               <a:rPr lang="en-IN" dirty="0"/>
-              <a:t>Two of us have to finish working on EE 521 projects anyway.</a:t>
-            </a:r>
-          </a:p>
-          <a:p>
-            <a:pPr lvl="1"/>
-            <a:r>
-              <a:rPr lang="en-IN" dirty="0"/>
-              <a:t>Working on a large project like this is the best way to truly gain expertise in a new language, here </a:t>
-            </a:r>
-            <a:r>
-              <a:rPr lang="en-IN" dirty="0">
-                <a:solidFill>
-                  <a:srgbClr val="7030A0"/>
-                </a:solidFill>
-              </a:rPr>
-              <a:t>Julia</a:t>
-            </a:r>
-            <a:r>
-              <a:rPr lang="en-IN" dirty="0"/>
-              <a:t>.</a:t>
-            </a:r>
-          </a:p>
-          <a:p>
-            <a:pPr lvl="1"/>
-            <a:r>
-              <a:rPr lang="en-IN" dirty="0"/>
-              <a:t>We realized that codes written by the students, and codes available to the faculties are kind of outdated, generally with little to no scope of scalability, and therefore no scope of deployment.</a:t>
-            </a:r>
-          </a:p>
-          <a:p>
-            <a:pPr lvl="1"/>
-            <a:endParaRPr lang="en-IN" dirty="0"/>
-          </a:p>
-          <a:p>
-            <a:pPr lvl="1"/>
-            <a:endParaRPr lang="en-IN" dirty="0"/>
+              <a:t>A IEEE Common Data Format (CDF) parser in Julia, for reading the system data.</a:t>
+            </a:r>
           </a:p>
           <a:p>
             <a:pPr lvl="1"/>
@@ -17502,7 +17669,7 @@
     </p:spTree>
     <p:extLst>
       <p:ext uri="{BB962C8B-B14F-4D97-AF65-F5344CB8AC3E}">
-        <p14:creationId xmlns:p14="http://schemas.microsoft.com/office/powerpoint/2010/main" val="713914853"/>
+        <p14:creationId xmlns:p14="http://schemas.microsoft.com/office/powerpoint/2010/main" val="178580332"/>
       </p:ext>
     </p:extLst>
   </p:cSld>
@@ -17808,23 +17975,6 @@
 </file>
 
 <file path=customXml/item1.xml><?xml version="1.0" encoding="utf-8"?>
-<?mso-contentType ?>
-<FormTemplates xmlns="http://schemas.microsoft.com/sharepoint/v3/contenttype/forms">
-  <Display>DocumentLibraryForm</Display>
-  <Edit>DocumentLibraryForm</Edit>
-  <New>DocumentLibraryForm</New>
-</FormTemplates>
-</file>
-
-<file path=customXml/item2.xml><?xml version="1.0" encoding="utf-8"?>
-<p:properties xmlns:p="http://schemas.microsoft.com/office/2006/metadata/properties" xmlns:xsi="http://www.w3.org/2001/XMLSchema-instance" xmlns:pc="http://schemas.microsoft.com/office/infopath/2007/PartnerControls">
-  <documentManagement>
-    <_activity xmlns="07b86a79-a0e0-4fae-97d8-d960552457a2" xsi:nil="true"/>
-  </documentManagement>
-</p:properties>
-</file>
-
-<file path=customXml/item3.xml><?xml version="1.0" encoding="utf-8"?>
 <ct:contentTypeSchema xmlns:ct="http://schemas.microsoft.com/office/2006/metadata/contentType" xmlns:ma="http://schemas.microsoft.com/office/2006/metadata/properties/metaAttributes" ct:_="" ma:_="" ma:contentTypeName="Document" ma:contentTypeID="0x0101008EDD631CF16A9D4597B7910261C15C8D" ma:contentTypeVersion="8" ma:contentTypeDescription="Create a new document." ma:contentTypeScope="" ma:versionID="6df697ab8c469b327c4ca0ad6150b4d8">
   <xsd:schema xmlns:xsd="http://www.w3.org/2001/XMLSchema" xmlns:xs="http://www.w3.org/2001/XMLSchema" xmlns:p="http://schemas.microsoft.com/office/2006/metadata/properties" xmlns:ns3="07b86a79-a0e0-4fae-97d8-d960552457a2" xmlns:ns4="40f16175-07f6-4179-a7d3-44240c48c007" targetNamespace="http://schemas.microsoft.com/office/2006/metadata/properties" ma:root="true" ma:fieldsID="82c1df116234835aaac4f6705de5e513" ns3:_="" ns4:_="">
     <xsd:import namespace="07b86a79-a0e0-4fae-97d8-d960552457a2"/>
@@ -18013,32 +18163,24 @@
 </ct:contentTypeSchema>
 </file>
 
-<file path=customXml/itemProps1.xml><?xml version="1.0" encoding="utf-8"?>
-<ds:datastoreItem xmlns:ds="http://schemas.openxmlformats.org/officeDocument/2006/customXml" ds:itemID="{8397E5B5-CBAB-4D43-BECA-E802B196F34B}">
-  <ds:schemaRefs>
-    <ds:schemaRef ds:uri="http://schemas.microsoft.com/sharepoint/v3/contenttype/forms"/>
-  </ds:schemaRefs>
-</ds:datastoreItem>
+<file path=customXml/item2.xml><?xml version="1.0" encoding="utf-8"?>
+<?mso-contentType ?>
+<FormTemplates xmlns="http://schemas.microsoft.com/sharepoint/v3/contenttype/forms">
+  <Display>DocumentLibraryForm</Display>
+  <Edit>DocumentLibraryForm</Edit>
+  <New>DocumentLibraryForm</New>
+</FormTemplates>
 </file>
 
-<file path=customXml/itemProps2.xml><?xml version="1.0" encoding="utf-8"?>
-<ds:datastoreItem xmlns:ds="http://schemas.openxmlformats.org/officeDocument/2006/customXml" ds:itemID="{8C02F8EE-7320-4FCF-B11C-9EEC626F5FA8}">
-  <ds:schemaRefs>
-    <ds:schemaRef ds:uri="http://purl.org/dc/dcmitype/"/>
-    <ds:schemaRef ds:uri="http://schemas.microsoft.com/office/2006/metadata/properties"/>
-    <ds:schemaRef ds:uri="http://schemas.microsoft.com/office/2006/documentManagement/types"/>
-    <ds:schemaRef ds:uri="http://purl.org/dc/elements/1.1/"/>
-    <ds:schemaRef ds:uri="http://schemas.microsoft.com/office/infopath/2007/PartnerControls"/>
-    <ds:schemaRef ds:uri="07b86a79-a0e0-4fae-97d8-d960552457a2"/>
-    <ds:schemaRef ds:uri="http://schemas.openxmlformats.org/package/2006/metadata/core-properties"/>
-    <ds:schemaRef ds:uri="40f16175-07f6-4179-a7d3-44240c48c007"/>
-    <ds:schemaRef ds:uri="http://www.w3.org/XML/1998/namespace"/>
-    <ds:schemaRef ds:uri="http://purl.org/dc/terms/"/>
-  </ds:schemaRefs>
-</ds:datastoreItem>
+<file path=customXml/item3.xml><?xml version="1.0" encoding="utf-8"?>
+<p:properties xmlns:p="http://schemas.microsoft.com/office/2006/metadata/properties" xmlns:xsi="http://www.w3.org/2001/XMLSchema-instance" xmlns:pc="http://schemas.microsoft.com/office/infopath/2007/PartnerControls">
+  <documentManagement>
+    <_activity xmlns="07b86a79-a0e0-4fae-97d8-d960552457a2" xsi:nil="true"/>
+  </documentManagement>
+</p:properties>
 </file>
 
-<file path=customXml/itemProps3.xml><?xml version="1.0" encoding="utf-8"?>
+<file path=customXml/itemProps1.xml><?xml version="1.0" encoding="utf-8"?>
 <ds:datastoreItem xmlns:ds="http://schemas.openxmlformats.org/officeDocument/2006/customXml" ds:itemID="{837DA910-2E67-4D61-A7CC-4E283793B666}">
   <ds:schemaRefs>
     <ds:schemaRef ds:uri="http://schemas.microsoft.com/office/2006/metadata/contentType"/>
@@ -18055,4 +18197,29 @@
     <ds:schemaRef ds:uri="http://schemas.microsoft.com/internal/obd"/>
   </ds:schemaRefs>
 </ds:datastoreItem>
+</file>
+
+<file path=customXml/itemProps2.xml><?xml version="1.0" encoding="utf-8"?>
+<ds:datastoreItem xmlns:ds="http://schemas.openxmlformats.org/officeDocument/2006/customXml" ds:itemID="{8397E5B5-CBAB-4D43-BECA-E802B196F34B}">
+  <ds:schemaRefs>
+    <ds:schemaRef ds:uri="http://schemas.microsoft.com/sharepoint/v3/contenttype/forms"/>
+  </ds:schemaRefs>
+</ds:datastoreItem>
+</file>
+
+<file path=customXml/itemProps3.xml><?xml version="1.0" encoding="utf-8"?>
+<ds:datastoreItem xmlns:ds="http://schemas.openxmlformats.org/officeDocument/2006/customXml" ds:itemID="{8C02F8EE-7320-4FCF-B11C-9EEC626F5FA8}">
+  <ds:schemaRefs>
+    <ds:schemaRef ds:uri="http://purl.org/dc/dcmitype/"/>
+    <ds:schemaRef ds:uri="http://schemas.microsoft.com/office/2006/metadata/properties"/>
+    <ds:schemaRef ds:uri="http://schemas.microsoft.com/office/2006/documentManagement/types"/>
+    <ds:schemaRef ds:uri="http://purl.org/dc/elements/1.1/"/>
+    <ds:schemaRef ds:uri="http://schemas.microsoft.com/office/infopath/2007/PartnerControls"/>
+    <ds:schemaRef ds:uri="07b86a79-a0e0-4fae-97d8-d960552457a2"/>
+    <ds:schemaRef ds:uri="http://schemas.openxmlformats.org/package/2006/metadata/core-properties"/>
+    <ds:schemaRef ds:uri="40f16175-07f6-4179-a7d3-44240c48c007"/>
+    <ds:schemaRef ds:uri="http://www.w3.org/XML/1998/namespace"/>
+    <ds:schemaRef ds:uri="http://purl.org/dc/terms/"/>
+  </ds:schemaRefs>
+</ds:datastoreItem>
 </file>
</xml_diff>